<commit_message>
modify the statistics of USC-120 test report
</commit_message>
<xml_diff>
--- a/kpi/Test Automation_Demo.pptx
+++ b/kpi/Test Automation_Demo.pptx
@@ -158,7 +158,7 @@
   </p:defaultTextStyle>
   <p:extLst>
     <p:ext uri="{EFAFB233-063F-42B5-8137-9DF3F51BA10A}">
-      <p15:sldGuideLst xmlns="" xmlns:p15="http://schemas.microsoft.com/office/powerpoint/2012/main">
+      <p15:sldGuideLst xmlns:p15="http://schemas.microsoft.com/office/powerpoint/2012/main" xmlns="">
         <p15:guide id="1" orient="horz" pos="1620">
           <p15:clr>
             <a:srgbClr val="A4A3A4"/>
@@ -172,7 +172,7 @@
       </p15:sldGuideLst>
     </p:ext>
     <p:ext uri="{2D200454-40CA-4A62-9FC3-DE9A4176ACB9}">
-      <p15:notesGuideLst xmlns="" xmlns:p15="http://schemas.microsoft.com/office/powerpoint/2012/main">
+      <p15:notesGuideLst xmlns:p15="http://schemas.microsoft.com/office/powerpoint/2012/main" xmlns="">
         <p15:guide id="1" orient="horz" pos="3223">
           <p15:clr>
             <a:srgbClr val="A4A3A4"/>
@@ -6897,16 +6897,6 @@
               </a:rPr>
               <a:t>Luminance automation</a:t>
             </a:r>
-            <a:r>
-              <a:rPr lang="en-US" altLang="zh-TW" sz="2800" kern="0" dirty="0" smtClean="0">
-                <a:solidFill>
-                  <a:srgbClr val="003366"/>
-                </a:solidFill>
-                <a:latin typeface="Times New Roman" panose="02020603050405020304" pitchFamily="18" charset="0"/>
-                <a:cs typeface="Times New Roman" panose="02020603050405020304" pitchFamily="18" charset="0"/>
-              </a:rPr>
-              <a:t/>
-            </a:r>
             <a:br>
               <a:rPr lang="en-US" altLang="zh-TW" sz="2800" kern="0" dirty="0" smtClean="0">
                 <a:solidFill>
@@ -7142,16 +7132,6 @@
               </a:rPr>
               <a:t>installation</a:t>
             </a:r>
-            <a:r>
-              <a:rPr lang="en-US" altLang="zh-TW" sz="2800" kern="0" dirty="0" smtClean="0">
-                <a:solidFill>
-                  <a:srgbClr val="003366"/>
-                </a:solidFill>
-                <a:latin typeface="Times New Roman" panose="02020603050405020304" pitchFamily="18" charset="0"/>
-                <a:cs typeface="Times New Roman" panose="02020603050405020304" pitchFamily="18" charset="0"/>
-              </a:rPr>
-              <a:t/>
-            </a:r>
             <a:br>
               <a:rPr lang="en-US" altLang="zh-TW" sz="2800" kern="0" dirty="0" smtClean="0">
                 <a:solidFill>
@@ -7366,16 +7346,6 @@
                 <a:cs typeface="Times New Roman" panose="02020603050405020304" pitchFamily="18" charset="0"/>
               </a:rPr>
               <a:t>Continuous integration</a:t>
-            </a:r>
-            <a:r>
-              <a:rPr lang="en-US" altLang="zh-TW" sz="2800" kern="0" dirty="0" smtClean="0">
-                <a:solidFill>
-                  <a:srgbClr val="003366"/>
-                </a:solidFill>
-                <a:latin typeface="Times New Roman" panose="02020603050405020304" pitchFamily="18" charset="0"/>
-                <a:cs typeface="Times New Roman" panose="02020603050405020304" pitchFamily="18" charset="0"/>
-              </a:rPr>
-              <a:t/>
             </a:r>
             <a:br>
               <a:rPr lang="en-US" altLang="zh-TW" sz="2800" kern="0" dirty="0" smtClean="0">
@@ -12004,7 +11974,14 @@
                 <a:latin typeface="Times New Roman" panose="02020603050405020304" pitchFamily="18" charset="0"/>
                 <a:cs typeface="Times New Roman" panose="02020603050405020304" pitchFamily="18" charset="0"/>
               </a:rPr>
-              <a:t>Android 8.0.1</a:t>
+              <a:t>Android </a:t>
+            </a:r>
+            <a:r>
+              <a:rPr lang="en-US" altLang="zh-TW" sz="1400" dirty="0" smtClean="0">
+                <a:latin typeface="Times New Roman" panose="02020603050405020304" pitchFamily="18" charset="0"/>
+                <a:cs typeface="Times New Roman" panose="02020603050405020304" pitchFamily="18" charset="0"/>
+              </a:rPr>
+              <a:t>8.1.0</a:t>
             </a:r>
             <a:r>
               <a:rPr lang="zh-TW" altLang="en-US" sz="1400" dirty="0" smtClean="0">
@@ -12025,7 +12002,21 @@
                 <a:latin typeface="Times New Roman" panose="02020603050405020304" pitchFamily="18" charset="0"/>
                 <a:cs typeface="Times New Roman" panose="02020603050405020304" pitchFamily="18" charset="0"/>
               </a:rPr>
-              <a:t>RJ-45), Android 8.0.1 (OTG)</a:t>
+              <a:t>RJ-45), Android </a:t>
+            </a:r>
+            <a:r>
+              <a:rPr lang="en-US" altLang="zh-TW" sz="1400" dirty="0" smtClean="0">
+                <a:latin typeface="Times New Roman" panose="02020603050405020304" pitchFamily="18" charset="0"/>
+                <a:cs typeface="Times New Roman" panose="02020603050405020304" pitchFamily="18" charset="0"/>
+              </a:rPr>
+              <a:t>8.1.0 (</a:t>
+            </a:r>
+            <a:r>
+              <a:rPr lang="en-US" altLang="zh-TW" sz="1400" dirty="0" smtClean="0">
+                <a:latin typeface="Times New Roman" panose="02020603050405020304" pitchFamily="18" charset="0"/>
+                <a:cs typeface="Times New Roman" panose="02020603050405020304" pitchFamily="18" charset="0"/>
+              </a:rPr>
+              <a:t>OTG)</a:t>
             </a:r>
           </a:p>
           <a:p>
@@ -12109,14 +12100,7 @@
                 <a:latin typeface="Times New Roman" panose="02020603050405020304" pitchFamily="18" charset="0"/>
                 <a:cs typeface="Times New Roman" panose="02020603050405020304" pitchFamily="18" charset="0"/>
               </a:rPr>
-              <a:t>Continuous </a:t>
-            </a:r>
-            <a:r>
-              <a:rPr lang="en-US" sz="1800" dirty="0" smtClean="0">
-                <a:latin typeface="Times New Roman" panose="02020603050405020304" pitchFamily="18" charset="0"/>
-                <a:cs typeface="Times New Roman" panose="02020603050405020304" pitchFamily="18" charset="0"/>
-              </a:rPr>
-              <a:t>integration</a:t>
+              <a:t>Continuous integration</a:t>
             </a:r>
             <a:endParaRPr lang="en-US" altLang="zh-TW" sz="1800" dirty="0">
               <a:latin typeface="Times New Roman" panose="02020603050405020304" pitchFamily="18" charset="0"/>
@@ -12392,16 +12376,6 @@
                 <a:cs typeface="Times New Roman" panose="02020603050405020304" pitchFamily="18" charset="0"/>
               </a:rPr>
               <a:t>Roaming automatic tool</a:t>
-            </a:r>
-            <a:r>
-              <a:rPr lang="en-US" altLang="zh-TW" sz="2800" kern="0" dirty="0" smtClean="0">
-                <a:solidFill>
-                  <a:srgbClr val="003366"/>
-                </a:solidFill>
-                <a:latin typeface="Times New Roman" panose="02020603050405020304" pitchFamily="18" charset="0"/>
-                <a:cs typeface="Times New Roman" panose="02020603050405020304" pitchFamily="18" charset="0"/>
-              </a:rPr>
-              <a:t/>
             </a:r>
             <a:br>
               <a:rPr lang="en-US" altLang="zh-TW" sz="2800" kern="0" dirty="0" smtClean="0">

</xml_diff>

<commit_message>
update test automation for Q1 ppt
</commit_message>
<xml_diff>
--- a/kpi/Test Automation_Demo.pptx
+++ b/kpi/Test Automation_Demo.pptx
@@ -5,10 +5,10 @@
     <p:sldMasterId id="2147484176" r:id="rId1"/>
   </p:sldMasterIdLst>
   <p:notesMasterIdLst>
-    <p:notesMasterId r:id="rId23"/>
+    <p:notesMasterId r:id="rId24"/>
   </p:notesMasterIdLst>
   <p:handoutMasterIdLst>
-    <p:handoutMasterId r:id="rId24"/>
+    <p:handoutMasterId r:id="rId25"/>
   </p:handoutMasterIdLst>
   <p:sldIdLst>
     <p:sldId id="524" r:id="rId2"/>
@@ -29,9 +29,10 @@
     <p:sldId id="555" r:id="rId17"/>
     <p:sldId id="556" r:id="rId18"/>
     <p:sldId id="557" r:id="rId19"/>
-    <p:sldId id="559" r:id="rId20"/>
-    <p:sldId id="551" r:id="rId21"/>
-    <p:sldId id="523" r:id="rId22"/>
+    <p:sldId id="565" r:id="rId20"/>
+    <p:sldId id="559" r:id="rId21"/>
+    <p:sldId id="551" r:id="rId22"/>
+    <p:sldId id="523" r:id="rId23"/>
   </p:sldIdLst>
   <p:sldSz cx="9144000" cy="5143500" type="screen16x9"/>
   <p:notesSz cx="7099300" cy="10234613"/>
@@ -162,7 +163,7 @@
   </p:defaultTextStyle>
   <p:extLst>
     <p:ext uri="{EFAFB233-063F-42B5-8137-9DF3F51BA10A}">
-      <p15:sldGuideLst xmlns:p15="http://schemas.microsoft.com/office/powerpoint/2012/main" xmlns="">
+      <p15:sldGuideLst xmlns="" xmlns:p15="http://schemas.microsoft.com/office/powerpoint/2012/main">
         <p15:guide id="1" orient="horz" pos="1620">
           <p15:clr>
             <a:srgbClr val="A4A3A4"/>
@@ -176,7 +177,7 @@
       </p15:sldGuideLst>
     </p:ext>
     <p:ext uri="{2D200454-40CA-4A62-9FC3-DE9A4176ACB9}">
-      <p15:notesGuideLst xmlns:p15="http://schemas.microsoft.com/office/powerpoint/2012/main" xmlns="">
+      <p15:notesGuideLst xmlns="" xmlns:p15="http://schemas.microsoft.com/office/powerpoint/2012/main">
         <p15:guide id="1" orient="horz" pos="3223">
           <p15:clr>
             <a:srgbClr val="A4A3A4"/>
@@ -1898,7 +1899,7 @@
     </p:spTree>
     <p:extLst>
       <p:ext uri="{BB962C8B-B14F-4D97-AF65-F5344CB8AC3E}">
-        <p14:creationId xmlns:p14="http://schemas.microsoft.com/office/powerpoint/2010/main" val="770017496"/>
+        <p14:creationId xmlns:p14="http://schemas.microsoft.com/office/powerpoint/2010/main" val="1957161656"/>
       </p:ext>
     </p:extLst>
   </p:cSld>
@@ -1927,21 +1928,19 @@
       </p:grpSpPr>
       <p:sp>
         <p:nvSpPr>
-          <p:cNvPr id="45058" name="投影片圖像版面配置區 1"/>
+          <p:cNvPr id="2" name="投影片圖像版面配置區 1"/>
           <p:cNvSpPr>
-            <a:spLocks noGrp="1" noRot="1" noChangeAspect="1" noTextEdit="1"/>
+            <a:spLocks noGrp="1" noRot="1" noChangeAspect="1"/>
           </p:cNvSpPr>
           <p:nvPr>
             <p:ph type="sldImg"/>
           </p:nvPr>
         </p:nvSpPr>
-        <p:spPr>
-          <a:ln/>
-        </p:spPr>
+        <p:spPr/>
       </p:sp>
       <p:sp>
         <p:nvSpPr>
-          <p:cNvPr id="45059" name="備忘稿版面配置區 2"/>
+          <p:cNvPr id="3" name="備忘稿版面配置區 2"/>
           <p:cNvSpPr>
             <a:spLocks noGrp="1"/>
           </p:cNvSpPr>
@@ -1949,220 +1948,45 @@
             <p:ph type="body" idx="1"/>
           </p:nvPr>
         </p:nvSpPr>
-        <p:spPr>
-          <a:noFill/>
-          <a:ln/>
-          <a:extLst>
-            <a:ext uri="{909E8E84-426E-40DD-AFC4-6F175D3DCCD1}">
-              <a14:hiddenFill xmlns:a14="http://schemas.microsoft.com/office/drawing/2010/main">
-                <a:solidFill>
-                  <a:srgbClr val="FFFFFF"/>
-                </a:solidFill>
-              </a14:hiddenFill>
-            </a:ext>
-            <a:ext uri="{91240B29-F687-4F45-9708-019B960494DF}">
-              <a14:hiddenLine xmlns:a14="http://schemas.microsoft.com/office/drawing/2010/main" w="9525">
-                <a:solidFill>
-                  <a:srgbClr val="000000"/>
-                </a:solidFill>
-                <a:miter lim="800000"/>
-                <a:headEnd/>
-                <a:tailEnd/>
-              </a14:hiddenLine>
-            </a:ext>
-          </a:extLst>
-        </p:spPr>
+        <p:spPr/>
         <p:txBody>
           <a:bodyPr/>
           <a:lstStyle/>
           <a:p>
-            <a:endParaRPr lang="zh-TW" altLang="en-US" dirty="0" smtClean="0">
-              <a:latin typeface="Arial" panose="020B0604020202020204" pitchFamily="34" charset="0"/>
-            </a:endParaRPr>
+            <a:endParaRPr lang="zh-TW" altLang="en-US" dirty="0"/>
           </a:p>
         </p:txBody>
       </p:sp>
       <p:sp>
         <p:nvSpPr>
-          <p:cNvPr id="45060" name="投影片編號版面配置區 3"/>
+          <p:cNvPr id="4" name="投影片編號版面配置區 3"/>
           <p:cNvSpPr>
             <a:spLocks noGrp="1"/>
           </p:cNvSpPr>
           <p:nvPr>
-            <p:ph type="sldNum" sz="quarter" idx="5"/>
+            <p:ph type="sldNum" sz="quarter" idx="10"/>
           </p:nvPr>
         </p:nvSpPr>
-        <p:spPr>
-          <a:noFill/>
-          <a:ln/>
-          <a:extLst>
-            <a:ext uri="{909E8E84-426E-40DD-AFC4-6F175D3DCCD1}">
-              <a14:hiddenFill xmlns:a14="http://schemas.microsoft.com/office/drawing/2010/main">
-                <a:solidFill>
-                  <a:srgbClr val="FFFFFF"/>
-                </a:solidFill>
-              </a14:hiddenFill>
-            </a:ext>
-            <a:ext uri="{91240B29-F687-4F45-9708-019B960494DF}">
-              <a14:hiddenLine xmlns:a14="http://schemas.microsoft.com/office/drawing/2010/main" w="9525">
-                <a:solidFill>
-                  <a:srgbClr val="000000"/>
-                </a:solidFill>
-                <a:miter lim="800000"/>
-                <a:headEnd/>
-                <a:tailEnd/>
-              </a14:hiddenLine>
-            </a:ext>
-          </a:extLst>
-        </p:spPr>
+        <p:spPr/>
         <p:txBody>
           <a:bodyPr/>
-          <a:lstStyle>
-            <a:lvl1pPr defTabSz="990600" eaLnBrk="0" hangingPunct="0">
-              <a:spcBef>
-                <a:spcPct val="30000"/>
-              </a:spcBef>
-              <a:defRPr kumimoji="1" sz="1200">
-                <a:solidFill>
-                  <a:schemeClr val="tx1"/>
-                </a:solidFill>
-                <a:latin typeface="Arial" panose="020B0604020202020204" pitchFamily="34" charset="0"/>
-                <a:ea typeface="新細明體" panose="02020500000000000000" pitchFamily="18" charset="-120"/>
-              </a:defRPr>
-            </a:lvl1pPr>
-            <a:lvl2pPr marL="742950" indent="-285750" defTabSz="990600" eaLnBrk="0" hangingPunct="0">
-              <a:spcBef>
-                <a:spcPct val="30000"/>
-              </a:spcBef>
-              <a:defRPr kumimoji="1" sz="1200">
-                <a:solidFill>
-                  <a:schemeClr val="tx1"/>
-                </a:solidFill>
-                <a:latin typeface="Arial" panose="020B0604020202020204" pitchFamily="34" charset="0"/>
-                <a:ea typeface="新細明體" panose="02020500000000000000" pitchFamily="18" charset="-120"/>
-              </a:defRPr>
-            </a:lvl2pPr>
-            <a:lvl3pPr marL="1143000" indent="-228600" defTabSz="990600" eaLnBrk="0" hangingPunct="0">
-              <a:spcBef>
-                <a:spcPct val="30000"/>
-              </a:spcBef>
-              <a:defRPr kumimoji="1" sz="1200">
-                <a:solidFill>
-                  <a:schemeClr val="tx1"/>
-                </a:solidFill>
-                <a:latin typeface="Arial" panose="020B0604020202020204" pitchFamily="34" charset="0"/>
-                <a:ea typeface="新細明體" panose="02020500000000000000" pitchFamily="18" charset="-120"/>
-              </a:defRPr>
-            </a:lvl3pPr>
-            <a:lvl4pPr marL="1600200" indent="-228600" defTabSz="990600" eaLnBrk="0" hangingPunct="0">
-              <a:spcBef>
-                <a:spcPct val="30000"/>
-              </a:spcBef>
-              <a:defRPr kumimoji="1" sz="1200">
-                <a:solidFill>
-                  <a:schemeClr val="tx1"/>
-                </a:solidFill>
-                <a:latin typeface="Arial" panose="020B0604020202020204" pitchFamily="34" charset="0"/>
-                <a:ea typeface="新細明體" panose="02020500000000000000" pitchFamily="18" charset="-120"/>
-              </a:defRPr>
-            </a:lvl4pPr>
-            <a:lvl5pPr marL="2057400" indent="-228600" defTabSz="990600" eaLnBrk="0" hangingPunct="0">
-              <a:spcBef>
-                <a:spcPct val="30000"/>
-              </a:spcBef>
-              <a:defRPr kumimoji="1" sz="1200">
-                <a:solidFill>
-                  <a:schemeClr val="tx1"/>
-                </a:solidFill>
-                <a:latin typeface="Arial" panose="020B0604020202020204" pitchFamily="34" charset="0"/>
-                <a:ea typeface="新細明體" panose="02020500000000000000" pitchFamily="18" charset="-120"/>
-              </a:defRPr>
-            </a:lvl5pPr>
-            <a:lvl6pPr marL="2514600" indent="-228600" defTabSz="990600" eaLnBrk="0" fontAlgn="base" hangingPunct="0">
-              <a:spcBef>
-                <a:spcPct val="30000"/>
-              </a:spcBef>
-              <a:spcAft>
-                <a:spcPct val="0"/>
-              </a:spcAft>
-              <a:defRPr kumimoji="1" sz="1200">
-                <a:solidFill>
-                  <a:schemeClr val="tx1"/>
-                </a:solidFill>
-                <a:latin typeface="Arial" panose="020B0604020202020204" pitchFamily="34" charset="0"/>
-                <a:ea typeface="新細明體" panose="02020500000000000000" pitchFamily="18" charset="-120"/>
-              </a:defRPr>
-            </a:lvl6pPr>
-            <a:lvl7pPr marL="2971800" indent="-228600" defTabSz="990600" eaLnBrk="0" fontAlgn="base" hangingPunct="0">
-              <a:spcBef>
-                <a:spcPct val="30000"/>
-              </a:spcBef>
-              <a:spcAft>
-                <a:spcPct val="0"/>
-              </a:spcAft>
-              <a:defRPr kumimoji="1" sz="1200">
-                <a:solidFill>
-                  <a:schemeClr val="tx1"/>
-                </a:solidFill>
-                <a:latin typeface="Arial" panose="020B0604020202020204" pitchFamily="34" charset="0"/>
-                <a:ea typeface="新細明體" panose="02020500000000000000" pitchFamily="18" charset="-120"/>
-              </a:defRPr>
-            </a:lvl7pPr>
-            <a:lvl8pPr marL="3429000" indent="-228600" defTabSz="990600" eaLnBrk="0" fontAlgn="base" hangingPunct="0">
-              <a:spcBef>
-                <a:spcPct val="30000"/>
-              </a:spcBef>
-              <a:spcAft>
-                <a:spcPct val="0"/>
-              </a:spcAft>
-              <a:defRPr kumimoji="1" sz="1200">
-                <a:solidFill>
-                  <a:schemeClr val="tx1"/>
-                </a:solidFill>
-                <a:latin typeface="Arial" panose="020B0604020202020204" pitchFamily="34" charset="0"/>
-                <a:ea typeface="新細明體" panose="02020500000000000000" pitchFamily="18" charset="-120"/>
-              </a:defRPr>
-            </a:lvl8pPr>
-            <a:lvl9pPr marL="3886200" indent="-228600" defTabSz="990600" eaLnBrk="0" fontAlgn="base" hangingPunct="0">
-              <a:spcBef>
-                <a:spcPct val="30000"/>
-              </a:spcBef>
-              <a:spcAft>
-                <a:spcPct val="0"/>
-              </a:spcAft>
-              <a:defRPr kumimoji="1" sz="1200">
-                <a:solidFill>
-                  <a:schemeClr val="tx1"/>
-                </a:solidFill>
-                <a:latin typeface="Arial" panose="020B0604020202020204" pitchFamily="34" charset="0"/>
-                <a:ea typeface="新細明體" panose="02020500000000000000" pitchFamily="18" charset="-120"/>
-              </a:defRPr>
-            </a:lvl9pPr>
-          </a:lstStyle>
-          <a:p>
-            <a:pPr eaLnBrk="1" hangingPunct="1">
-              <a:spcBef>
-                <a:spcPct val="0"/>
-              </a:spcBef>
-            </a:pPr>
-            <a:fld id="{4F672D5D-8C01-4901-B5D5-EB0622AA9DF3}" type="slidenum">
-              <a:rPr lang="en-US" altLang="zh-TW" sz="1300">
-                <a:latin typeface="Garamond" panose="02020404030301010803" pitchFamily="18" charset="0"/>
-              </a:rPr>
-              <a:pPr eaLnBrk="1" hangingPunct="1">
-                <a:spcBef>
-                  <a:spcPct val="0"/>
-                </a:spcBef>
-              </a:pPr>
+          <a:lstStyle/>
+          <a:p>
+            <a:fld id="{5FAE23DA-1601-498D-B2E3-972800982184}" type="slidenum">
+              <a:rPr lang="en-US" altLang="zh-TW" smtClean="0"/>
+              <a:pPr/>
               <a:t>21</a:t>
             </a:fld>
-            <a:endParaRPr lang="en-US" altLang="zh-TW" sz="1300">
-              <a:latin typeface="Garamond" panose="02020404030301010803" pitchFamily="18" charset="0"/>
-            </a:endParaRPr>
+            <a:endParaRPr lang="en-US" altLang="zh-TW"/>
           </a:p>
         </p:txBody>
       </p:sp>
     </p:spTree>
+    <p:extLst>
+      <p:ext uri="{BB962C8B-B14F-4D97-AF65-F5344CB8AC3E}">
+        <p14:creationId xmlns:p14="http://schemas.microsoft.com/office/powerpoint/2010/main" val="770017496"/>
+      </p:ext>
+    </p:extLst>
   </p:cSld>
   <p:clrMapOvr>
     <a:masterClrMapping/>
@@ -2248,6 +2072,268 @@
         <p14:creationId xmlns:p14="http://schemas.microsoft.com/office/powerpoint/2010/main" val="586126112"/>
       </p:ext>
     </p:extLst>
+  </p:cSld>
+  <p:clrMapOvr>
+    <a:masterClrMapping/>
+  </p:clrMapOvr>
+</p:notes>
+</file>
+
+<file path=ppt/notesSlides/notesSlide20.xml><?xml version="1.0" encoding="utf-8"?>
+<p:notes xmlns:a="http://schemas.openxmlformats.org/drawingml/2006/main" xmlns:r="http://schemas.openxmlformats.org/officeDocument/2006/relationships" xmlns:p="http://schemas.openxmlformats.org/presentationml/2006/main">
+  <p:cSld>
+    <p:spTree>
+      <p:nvGrpSpPr>
+        <p:cNvPr id="1" name=""/>
+        <p:cNvGrpSpPr/>
+        <p:nvPr/>
+      </p:nvGrpSpPr>
+      <p:grpSpPr>
+        <a:xfrm>
+          <a:off x="0" y="0"/>
+          <a:ext cx="0" cy="0"/>
+          <a:chOff x="0" y="0"/>
+          <a:chExt cx="0" cy="0"/>
+        </a:xfrm>
+      </p:grpSpPr>
+      <p:sp>
+        <p:nvSpPr>
+          <p:cNvPr id="45058" name="投影片圖像版面配置區 1"/>
+          <p:cNvSpPr>
+            <a:spLocks noGrp="1" noRot="1" noChangeAspect="1" noTextEdit="1"/>
+          </p:cNvSpPr>
+          <p:nvPr>
+            <p:ph type="sldImg"/>
+          </p:nvPr>
+        </p:nvSpPr>
+        <p:spPr>
+          <a:ln/>
+        </p:spPr>
+      </p:sp>
+      <p:sp>
+        <p:nvSpPr>
+          <p:cNvPr id="45059" name="備忘稿版面配置區 2"/>
+          <p:cNvSpPr>
+            <a:spLocks noGrp="1"/>
+          </p:cNvSpPr>
+          <p:nvPr>
+            <p:ph type="body" idx="1"/>
+          </p:nvPr>
+        </p:nvSpPr>
+        <p:spPr>
+          <a:noFill/>
+          <a:ln/>
+          <a:extLst>
+            <a:ext uri="{909E8E84-426E-40DD-AFC4-6F175D3DCCD1}">
+              <a14:hiddenFill xmlns:a14="http://schemas.microsoft.com/office/drawing/2010/main">
+                <a:solidFill>
+                  <a:srgbClr val="FFFFFF"/>
+                </a:solidFill>
+              </a14:hiddenFill>
+            </a:ext>
+            <a:ext uri="{91240B29-F687-4F45-9708-019B960494DF}">
+              <a14:hiddenLine xmlns:a14="http://schemas.microsoft.com/office/drawing/2010/main" w="9525">
+                <a:solidFill>
+                  <a:srgbClr val="000000"/>
+                </a:solidFill>
+                <a:miter lim="800000"/>
+                <a:headEnd/>
+                <a:tailEnd/>
+              </a14:hiddenLine>
+            </a:ext>
+          </a:extLst>
+        </p:spPr>
+        <p:txBody>
+          <a:bodyPr/>
+          <a:lstStyle/>
+          <a:p>
+            <a:endParaRPr lang="zh-TW" altLang="en-US" dirty="0" smtClean="0">
+              <a:latin typeface="Arial" panose="020B0604020202020204" pitchFamily="34" charset="0"/>
+            </a:endParaRPr>
+          </a:p>
+        </p:txBody>
+      </p:sp>
+      <p:sp>
+        <p:nvSpPr>
+          <p:cNvPr id="45060" name="投影片編號版面配置區 3"/>
+          <p:cNvSpPr>
+            <a:spLocks noGrp="1"/>
+          </p:cNvSpPr>
+          <p:nvPr>
+            <p:ph type="sldNum" sz="quarter" idx="5"/>
+          </p:nvPr>
+        </p:nvSpPr>
+        <p:spPr>
+          <a:noFill/>
+          <a:ln/>
+          <a:extLst>
+            <a:ext uri="{909E8E84-426E-40DD-AFC4-6F175D3DCCD1}">
+              <a14:hiddenFill xmlns:a14="http://schemas.microsoft.com/office/drawing/2010/main">
+                <a:solidFill>
+                  <a:srgbClr val="FFFFFF"/>
+                </a:solidFill>
+              </a14:hiddenFill>
+            </a:ext>
+            <a:ext uri="{91240B29-F687-4F45-9708-019B960494DF}">
+              <a14:hiddenLine xmlns:a14="http://schemas.microsoft.com/office/drawing/2010/main" w="9525">
+                <a:solidFill>
+                  <a:srgbClr val="000000"/>
+                </a:solidFill>
+                <a:miter lim="800000"/>
+                <a:headEnd/>
+                <a:tailEnd/>
+              </a14:hiddenLine>
+            </a:ext>
+          </a:extLst>
+        </p:spPr>
+        <p:txBody>
+          <a:bodyPr/>
+          <a:lstStyle>
+            <a:lvl1pPr defTabSz="990600" eaLnBrk="0" hangingPunct="0">
+              <a:spcBef>
+                <a:spcPct val="30000"/>
+              </a:spcBef>
+              <a:defRPr kumimoji="1" sz="1200">
+                <a:solidFill>
+                  <a:schemeClr val="tx1"/>
+                </a:solidFill>
+                <a:latin typeface="Arial" panose="020B0604020202020204" pitchFamily="34" charset="0"/>
+                <a:ea typeface="新細明體" panose="02020500000000000000" pitchFamily="18" charset="-120"/>
+              </a:defRPr>
+            </a:lvl1pPr>
+            <a:lvl2pPr marL="742950" indent="-285750" defTabSz="990600" eaLnBrk="0" hangingPunct="0">
+              <a:spcBef>
+                <a:spcPct val="30000"/>
+              </a:spcBef>
+              <a:defRPr kumimoji="1" sz="1200">
+                <a:solidFill>
+                  <a:schemeClr val="tx1"/>
+                </a:solidFill>
+                <a:latin typeface="Arial" panose="020B0604020202020204" pitchFamily="34" charset="0"/>
+                <a:ea typeface="新細明體" panose="02020500000000000000" pitchFamily="18" charset="-120"/>
+              </a:defRPr>
+            </a:lvl2pPr>
+            <a:lvl3pPr marL="1143000" indent="-228600" defTabSz="990600" eaLnBrk="0" hangingPunct="0">
+              <a:spcBef>
+                <a:spcPct val="30000"/>
+              </a:spcBef>
+              <a:defRPr kumimoji="1" sz="1200">
+                <a:solidFill>
+                  <a:schemeClr val="tx1"/>
+                </a:solidFill>
+                <a:latin typeface="Arial" panose="020B0604020202020204" pitchFamily="34" charset="0"/>
+                <a:ea typeface="新細明體" panose="02020500000000000000" pitchFamily="18" charset="-120"/>
+              </a:defRPr>
+            </a:lvl3pPr>
+            <a:lvl4pPr marL="1600200" indent="-228600" defTabSz="990600" eaLnBrk="0" hangingPunct="0">
+              <a:spcBef>
+                <a:spcPct val="30000"/>
+              </a:spcBef>
+              <a:defRPr kumimoji="1" sz="1200">
+                <a:solidFill>
+                  <a:schemeClr val="tx1"/>
+                </a:solidFill>
+                <a:latin typeface="Arial" panose="020B0604020202020204" pitchFamily="34" charset="0"/>
+                <a:ea typeface="新細明體" panose="02020500000000000000" pitchFamily="18" charset="-120"/>
+              </a:defRPr>
+            </a:lvl4pPr>
+            <a:lvl5pPr marL="2057400" indent="-228600" defTabSz="990600" eaLnBrk="0" hangingPunct="0">
+              <a:spcBef>
+                <a:spcPct val="30000"/>
+              </a:spcBef>
+              <a:defRPr kumimoji="1" sz="1200">
+                <a:solidFill>
+                  <a:schemeClr val="tx1"/>
+                </a:solidFill>
+                <a:latin typeface="Arial" panose="020B0604020202020204" pitchFamily="34" charset="0"/>
+                <a:ea typeface="新細明體" panose="02020500000000000000" pitchFamily="18" charset="-120"/>
+              </a:defRPr>
+            </a:lvl5pPr>
+            <a:lvl6pPr marL="2514600" indent="-228600" defTabSz="990600" eaLnBrk="0" fontAlgn="base" hangingPunct="0">
+              <a:spcBef>
+                <a:spcPct val="30000"/>
+              </a:spcBef>
+              <a:spcAft>
+                <a:spcPct val="0"/>
+              </a:spcAft>
+              <a:defRPr kumimoji="1" sz="1200">
+                <a:solidFill>
+                  <a:schemeClr val="tx1"/>
+                </a:solidFill>
+                <a:latin typeface="Arial" panose="020B0604020202020204" pitchFamily="34" charset="0"/>
+                <a:ea typeface="新細明體" panose="02020500000000000000" pitchFamily="18" charset="-120"/>
+              </a:defRPr>
+            </a:lvl6pPr>
+            <a:lvl7pPr marL="2971800" indent="-228600" defTabSz="990600" eaLnBrk="0" fontAlgn="base" hangingPunct="0">
+              <a:spcBef>
+                <a:spcPct val="30000"/>
+              </a:spcBef>
+              <a:spcAft>
+                <a:spcPct val="0"/>
+              </a:spcAft>
+              <a:defRPr kumimoji="1" sz="1200">
+                <a:solidFill>
+                  <a:schemeClr val="tx1"/>
+                </a:solidFill>
+                <a:latin typeface="Arial" panose="020B0604020202020204" pitchFamily="34" charset="0"/>
+                <a:ea typeface="新細明體" panose="02020500000000000000" pitchFamily="18" charset="-120"/>
+              </a:defRPr>
+            </a:lvl7pPr>
+            <a:lvl8pPr marL="3429000" indent="-228600" defTabSz="990600" eaLnBrk="0" fontAlgn="base" hangingPunct="0">
+              <a:spcBef>
+                <a:spcPct val="30000"/>
+              </a:spcBef>
+              <a:spcAft>
+                <a:spcPct val="0"/>
+              </a:spcAft>
+              <a:defRPr kumimoji="1" sz="1200">
+                <a:solidFill>
+                  <a:schemeClr val="tx1"/>
+                </a:solidFill>
+                <a:latin typeface="Arial" panose="020B0604020202020204" pitchFamily="34" charset="0"/>
+                <a:ea typeface="新細明體" panose="02020500000000000000" pitchFamily="18" charset="-120"/>
+              </a:defRPr>
+            </a:lvl8pPr>
+            <a:lvl9pPr marL="3886200" indent="-228600" defTabSz="990600" eaLnBrk="0" fontAlgn="base" hangingPunct="0">
+              <a:spcBef>
+                <a:spcPct val="30000"/>
+              </a:spcBef>
+              <a:spcAft>
+                <a:spcPct val="0"/>
+              </a:spcAft>
+              <a:defRPr kumimoji="1" sz="1200">
+                <a:solidFill>
+                  <a:schemeClr val="tx1"/>
+                </a:solidFill>
+                <a:latin typeface="Arial" panose="020B0604020202020204" pitchFamily="34" charset="0"/>
+                <a:ea typeface="新細明體" panose="02020500000000000000" pitchFamily="18" charset="-120"/>
+              </a:defRPr>
+            </a:lvl9pPr>
+          </a:lstStyle>
+          <a:p>
+            <a:pPr eaLnBrk="1" hangingPunct="1">
+              <a:spcBef>
+                <a:spcPct val="0"/>
+              </a:spcBef>
+            </a:pPr>
+            <a:fld id="{4F672D5D-8C01-4901-B5D5-EB0622AA9DF3}" type="slidenum">
+              <a:rPr lang="en-US" altLang="zh-TW" sz="1300">
+                <a:latin typeface="Garamond" panose="02020404030301010803" pitchFamily="18" charset="0"/>
+              </a:rPr>
+              <a:pPr eaLnBrk="1" hangingPunct="1">
+                <a:spcBef>
+                  <a:spcPct val="0"/>
+                </a:spcBef>
+              </a:pPr>
+              <a:t>22</a:t>
+            </a:fld>
+            <a:endParaRPr lang="en-US" altLang="zh-TW" sz="1300">
+              <a:latin typeface="Garamond" panose="02020404030301010803" pitchFamily="18" charset="0"/>
+            </a:endParaRPr>
+          </a:p>
+        </p:txBody>
+      </p:sp>
+    </p:spTree>
   </p:cSld>
   <p:clrMapOvr>
     <a:masterClrMapping/>
@@ -6557,7 +6643,27 @@
                 <a:latin typeface="Times New Roman" panose="02020603050405020304" pitchFamily="18" charset="0"/>
                 <a:cs typeface="Times New Roman" panose="02020603050405020304" pitchFamily="18" charset="0"/>
               </a:rPr>
-              <a:t>Roaming automatic tool</a:t>
+              <a:t>Roaming </a:t>
+            </a:r>
+            <a:r>
+              <a:rPr lang="en-US" altLang="zh-TW" sz="2800" kern="0" dirty="0">
+                <a:solidFill>
+                  <a:srgbClr val="003366"/>
+                </a:solidFill>
+                <a:latin typeface="Times New Roman" panose="02020603050405020304" pitchFamily="18" charset="0"/>
+                <a:cs typeface="Times New Roman" panose="02020603050405020304" pitchFamily="18" charset="0"/>
+              </a:rPr>
+              <a:t>automation</a:t>
+            </a:r>
+            <a:r>
+              <a:rPr lang="en-US" altLang="zh-TW" sz="2800" kern="0" dirty="0" smtClean="0">
+                <a:solidFill>
+                  <a:srgbClr val="003366"/>
+                </a:solidFill>
+                <a:latin typeface="Times New Roman" panose="02020603050405020304" pitchFamily="18" charset="0"/>
+                <a:cs typeface="Times New Roman" panose="02020603050405020304" pitchFamily="18" charset="0"/>
+              </a:rPr>
+              <a:t/>
             </a:r>
             <a:br>
               <a:rPr lang="en-US" altLang="zh-TW" sz="2800" kern="0" dirty="0" smtClean="0">
@@ -7006,7 +7112,27 @@
                 <a:latin typeface="Times New Roman" panose="02020603050405020304" pitchFamily="18" charset="0"/>
                 <a:cs typeface="Times New Roman" panose="02020603050405020304" pitchFamily="18" charset="0"/>
               </a:rPr>
-              <a:t>Roaming automatic tool</a:t>
+              <a:t>Roaming </a:t>
+            </a:r>
+            <a:r>
+              <a:rPr lang="en-US" altLang="zh-TW" sz="2800" kern="0" dirty="0">
+                <a:solidFill>
+                  <a:srgbClr val="003366"/>
+                </a:solidFill>
+                <a:latin typeface="Times New Roman" panose="02020603050405020304" pitchFamily="18" charset="0"/>
+                <a:cs typeface="Times New Roman" panose="02020603050405020304" pitchFamily="18" charset="0"/>
+              </a:rPr>
+              <a:t>automation</a:t>
+            </a:r>
+            <a:r>
+              <a:rPr lang="en-US" altLang="zh-TW" sz="2800" kern="0" dirty="0" smtClean="0">
+                <a:solidFill>
+                  <a:srgbClr val="003366"/>
+                </a:solidFill>
+                <a:latin typeface="Times New Roman" panose="02020603050405020304" pitchFamily="18" charset="0"/>
+                <a:cs typeface="Times New Roman" panose="02020603050405020304" pitchFamily="18" charset="0"/>
+              </a:rPr>
+              <a:t/>
             </a:r>
             <a:br>
               <a:rPr lang="en-US" altLang="zh-TW" sz="2800" kern="0" dirty="0" smtClean="0">
@@ -7423,17 +7549,17 @@
                 <a:latin typeface="Times New Roman" panose="02020603050405020304" pitchFamily="18" charset="0"/>
                 <a:cs typeface="Times New Roman" panose="02020603050405020304" pitchFamily="18" charset="0"/>
               </a:rPr>
-              <a:t>on/off mode automatic </a:t>
-            </a:r>
-            <a:r>
-              <a:rPr lang="en-US" altLang="zh-TW" sz="2800" kern="0" dirty="0" smtClean="0">
+              <a:t>on/off mode </a:t>
+            </a:r>
+            <a:r>
+              <a:rPr lang="en-US" altLang="zh-TW" sz="2800" kern="0" dirty="0">
                 <a:solidFill>
                   <a:srgbClr val="003366"/>
                 </a:solidFill>
                 <a:latin typeface="Times New Roman" panose="02020603050405020304" pitchFamily="18" charset="0"/>
                 <a:cs typeface="Times New Roman" panose="02020603050405020304" pitchFamily="18" charset="0"/>
               </a:rPr>
-              <a:t>tool</a:t>
+              <a:t>automation</a:t>
             </a:r>
             <a:r>
               <a:rPr lang="en-US" altLang="zh-TW" sz="2800" kern="0" dirty="0">
@@ -7717,17 +7843,17 @@
                 <a:latin typeface="Times New Roman" panose="02020603050405020304" pitchFamily="18" charset="0"/>
                 <a:cs typeface="Times New Roman" panose="02020603050405020304" pitchFamily="18" charset="0"/>
               </a:rPr>
-              <a:t>on/off mode automatic </a:t>
-            </a:r>
-            <a:r>
-              <a:rPr lang="en-US" altLang="zh-TW" sz="2800" kern="0" dirty="0" smtClean="0">
+              <a:t>on/off mode </a:t>
+            </a:r>
+            <a:r>
+              <a:rPr lang="en-US" altLang="zh-TW" sz="2800" kern="0" dirty="0">
                 <a:solidFill>
                   <a:srgbClr val="003366"/>
                 </a:solidFill>
                 <a:latin typeface="Times New Roman" panose="02020603050405020304" pitchFamily="18" charset="0"/>
                 <a:cs typeface="Times New Roman" panose="02020603050405020304" pitchFamily="18" charset="0"/>
               </a:rPr>
-              <a:t>tool</a:t>
+              <a:t>automation</a:t>
             </a:r>
             <a:r>
               <a:rPr lang="en-US" altLang="zh-TW" sz="2800" kern="0" dirty="0">
@@ -7994,17 +8120,17 @@
                 <a:latin typeface="Times New Roman" panose="02020603050405020304" pitchFamily="18" charset="0"/>
                 <a:cs typeface="Times New Roman" panose="02020603050405020304" pitchFamily="18" charset="0"/>
               </a:rPr>
-              <a:t>on/off mode automatic </a:t>
-            </a:r>
-            <a:r>
-              <a:rPr lang="en-US" altLang="zh-TW" sz="2800" kern="0" dirty="0" smtClean="0">
+              <a:t>on/off mode </a:t>
+            </a:r>
+            <a:r>
+              <a:rPr lang="en-US" altLang="zh-TW" sz="2800" kern="0" dirty="0">
                 <a:solidFill>
                   <a:srgbClr val="003366"/>
                 </a:solidFill>
                 <a:latin typeface="Times New Roman" panose="02020603050405020304" pitchFamily="18" charset="0"/>
                 <a:cs typeface="Times New Roman" panose="02020603050405020304" pitchFamily="18" charset="0"/>
               </a:rPr>
-              <a:t>tool</a:t>
+              <a:t>automation</a:t>
             </a:r>
             <a:r>
               <a:rPr lang="en-US" altLang="zh-TW" sz="2800" kern="0" dirty="0">
@@ -8253,7 +8379,27 @@
                 <a:latin typeface="Times New Roman" panose="02020603050405020304" pitchFamily="18" charset="0"/>
                 <a:cs typeface="Times New Roman" panose="02020603050405020304" pitchFamily="18" charset="0"/>
               </a:rPr>
-              <a:t>frequency switch automatic tool (2.4G, 5G)</a:t>
+              <a:t>frequency switch </a:t>
+            </a:r>
+            <a:r>
+              <a:rPr lang="en-US" altLang="zh-TW" sz="2800" kern="0" dirty="0">
+                <a:solidFill>
+                  <a:srgbClr val="003366"/>
+                </a:solidFill>
+                <a:latin typeface="Times New Roman" panose="02020603050405020304" pitchFamily="18" charset="0"/>
+                <a:cs typeface="Times New Roman" panose="02020603050405020304" pitchFamily="18" charset="0"/>
+              </a:rPr>
+              <a:t>automation </a:t>
+            </a:r>
+            <a:r>
+              <a:rPr lang="en-US" altLang="zh-TW" sz="2800" kern="0" dirty="0">
+                <a:solidFill>
+                  <a:srgbClr val="003366"/>
+                </a:solidFill>
+                <a:latin typeface="Times New Roman" panose="02020603050405020304" pitchFamily="18" charset="0"/>
+                <a:cs typeface="Times New Roman" panose="02020603050405020304" pitchFamily="18" charset="0"/>
+              </a:rPr>
+              <a:t>(2.4G, 5G)</a:t>
             </a:r>
             <a:br>
               <a:rPr lang="en-US" altLang="zh-TW" sz="2800" kern="0" dirty="0">
@@ -9172,14 +9318,34 @@
               <a:defRPr/>
             </a:pPr>
             <a:r>
-              <a:rPr lang="en-US" altLang="zh-TW" sz="2800" kern="0" dirty="0" smtClean="0">
+              <a:rPr lang="en-US" altLang="zh-TW" sz="2800" kern="0" dirty="0" err="1" smtClean="0">
                 <a:solidFill>
                   <a:srgbClr val="003366"/>
                 </a:solidFill>
                 <a:latin typeface="Times New Roman" panose="02020603050405020304" pitchFamily="18" charset="0"/>
                 <a:cs typeface="Times New Roman" panose="02020603050405020304" pitchFamily="18" charset="0"/>
               </a:rPr>
-              <a:t>Continuous integration</a:t>
+              <a:t>BurnInTest</a:t>
+            </a:r>
+            <a:r>
+              <a:rPr lang="en-US" altLang="zh-TW" sz="2800" kern="0" dirty="0" smtClean="0">
+                <a:solidFill>
+                  <a:srgbClr val="003366"/>
+                </a:solidFill>
+                <a:latin typeface="Times New Roman" panose="02020603050405020304" pitchFamily="18" charset="0"/>
+                <a:cs typeface="Times New Roman" panose="02020603050405020304" pitchFamily="18" charset="0"/>
+              </a:rPr>
+              <a:t> Automation</a:t>
+            </a:r>
+            <a:r>
+              <a:rPr lang="en-US" altLang="zh-TW" sz="2800" kern="0" dirty="0" smtClean="0">
+                <a:solidFill>
+                  <a:srgbClr val="003366"/>
+                </a:solidFill>
+                <a:latin typeface="Times New Roman" panose="02020603050405020304" pitchFamily="18" charset="0"/>
+                <a:cs typeface="Times New Roman" panose="02020603050405020304" pitchFamily="18" charset="0"/>
+              </a:rPr>
+              <a:t/>
             </a:r>
             <a:br>
               <a:rPr lang="en-US" altLang="zh-TW" sz="2800" kern="0" dirty="0" smtClean="0">
@@ -9203,7 +9369,7 @@
     </p:spTree>
     <p:extLst>
       <p:ext uri="{BB962C8B-B14F-4D97-AF65-F5344CB8AC3E}">
-        <p14:creationId xmlns:p14="http://schemas.microsoft.com/office/powerpoint/2010/main" val="932677482"/>
+        <p14:creationId xmlns:p14="http://schemas.microsoft.com/office/powerpoint/2010/main" val="149749913"/>
       </p:ext>
     </p:extLst>
   </p:cSld>
@@ -9855,6 +10021,265 @@
           <a:bodyPr/>
           <a:lstStyle/>
           <a:p>
+            <a:pPr marL="342900" lvl="1" indent="-342900" eaLnBrk="1" hangingPunct="1">
+              <a:buFont typeface="Arial" charset="0"/>
+              <a:buChar char="•"/>
+              <a:defRPr/>
+            </a:pPr>
+            <a:r>
+              <a:rPr lang="en-US" altLang="zh-TW" sz="1800" dirty="0">
+                <a:latin typeface="Times New Roman" panose="02020603050405020304" pitchFamily="18" charset="0"/>
+                <a:cs typeface="Times New Roman" panose="02020603050405020304" pitchFamily="18" charset="0"/>
+              </a:rPr>
+              <a:t>System Structure</a:t>
+            </a:r>
+          </a:p>
+          <a:p>
+            <a:pPr eaLnBrk="1" hangingPunct="1">
+              <a:buFont typeface="Arial" charset="0"/>
+              <a:buChar char="•"/>
+              <a:defRPr/>
+            </a:pPr>
+            <a:endParaRPr lang="en-US" altLang="zh-TW" sz="1800" dirty="0">
+              <a:latin typeface="Times New Roman" panose="02020603050405020304" pitchFamily="18" charset="0"/>
+              <a:cs typeface="Times New Roman" panose="02020603050405020304" pitchFamily="18" charset="0"/>
+            </a:endParaRPr>
+          </a:p>
+        </p:txBody>
+      </p:sp>
+      <p:sp>
+        <p:nvSpPr>
+          <p:cNvPr id="2" name="標題 4"/>
+          <p:cNvSpPr>
+            <a:spLocks noGrp="1"/>
+          </p:cNvSpPr>
+          <p:nvPr>
+            <p:ph type="title"/>
+          </p:nvPr>
+        </p:nvSpPr>
+        <p:spPr>
+          <a:xfrm>
+            <a:off x="457200" y="87313"/>
+            <a:ext cx="8229600" cy="1205265"/>
+          </a:xfrm>
+        </p:spPr>
+        <p:txBody>
+          <a:bodyPr/>
+          <a:lstStyle/>
+          <a:p>
+            <a:pPr eaLnBrk="1" hangingPunct="1">
+              <a:defRPr/>
+            </a:pPr>
+            <a:r>
+              <a:rPr lang="en-US" altLang="zh-TW" sz="2800" kern="0" dirty="0" smtClean="0">
+                <a:solidFill>
+                  <a:srgbClr val="003366"/>
+                </a:solidFill>
+                <a:latin typeface="Times New Roman" panose="02020603050405020304" pitchFamily="18" charset="0"/>
+                <a:cs typeface="Times New Roman" panose="02020603050405020304" pitchFamily="18" charset="0"/>
+              </a:rPr>
+              <a:t>Continuous </a:t>
+            </a:r>
+            <a:r>
+              <a:rPr lang="en-US" altLang="zh-TW" sz="2800" kern="0" dirty="0">
+                <a:solidFill>
+                  <a:srgbClr val="003366"/>
+                </a:solidFill>
+                <a:latin typeface="Times New Roman" panose="02020603050405020304" pitchFamily="18" charset="0"/>
+                <a:cs typeface="Times New Roman" panose="02020603050405020304" pitchFamily="18" charset="0"/>
+              </a:rPr>
+              <a:t>I</a:t>
+            </a:r>
+            <a:r>
+              <a:rPr lang="en-US" altLang="zh-TW" sz="2800" kern="0" dirty="0" smtClean="0">
+                <a:solidFill>
+                  <a:srgbClr val="003366"/>
+                </a:solidFill>
+                <a:latin typeface="Times New Roman" panose="02020603050405020304" pitchFamily="18" charset="0"/>
+                <a:cs typeface="Times New Roman" panose="02020603050405020304" pitchFamily="18" charset="0"/>
+              </a:rPr>
+              <a:t>ntegration</a:t>
+            </a:r>
+            <a:r>
+              <a:rPr lang="en-US" altLang="zh-TW" sz="2800" kern="0" dirty="0" smtClean="0">
+                <a:solidFill>
+                  <a:srgbClr val="003366"/>
+                </a:solidFill>
+                <a:latin typeface="Times New Roman" panose="02020603050405020304" pitchFamily="18" charset="0"/>
+                <a:cs typeface="Times New Roman" panose="02020603050405020304" pitchFamily="18" charset="0"/>
+              </a:rPr>
+              <a:t/>
+            </a:r>
+            <a:br>
+              <a:rPr lang="en-US" altLang="zh-TW" sz="2800" kern="0" dirty="0" smtClean="0">
+                <a:solidFill>
+                  <a:srgbClr val="003366"/>
+                </a:solidFill>
+                <a:latin typeface="Times New Roman" panose="02020603050405020304" pitchFamily="18" charset="0"/>
+                <a:cs typeface="Times New Roman" panose="02020603050405020304" pitchFamily="18" charset="0"/>
+              </a:rPr>
+            </a:br>
+            <a:endParaRPr lang="zh-TW" altLang="en-US" sz="2800" kern="0" dirty="0">
+              <a:solidFill>
+                <a:srgbClr val="003366"/>
+              </a:solidFill>
+              <a:latin typeface="Times New Roman" panose="02020603050405020304" pitchFamily="18" charset="0"/>
+              <a:cs typeface="Times New Roman" panose="02020603050405020304" pitchFamily="18" charset="0"/>
+            </a:endParaRPr>
+          </a:p>
+        </p:txBody>
+      </p:sp>
+    </p:spTree>
+    <p:extLst>
+      <p:ext uri="{BB962C8B-B14F-4D97-AF65-F5344CB8AC3E}">
+        <p14:creationId xmlns:p14="http://schemas.microsoft.com/office/powerpoint/2010/main" val="932677482"/>
+      </p:ext>
+    </p:extLst>
+  </p:cSld>
+  <p:clrMapOvr>
+    <a:masterClrMapping/>
+  </p:clrMapOvr>
+  <mc:AlternateContent xmlns:mc="http://schemas.openxmlformats.org/markup-compatibility/2006" xmlns:p14="http://schemas.microsoft.com/office/powerpoint/2010/main">
+    <mc:Choice Requires="p14">
+      <p:transition spd="med" p14:dur="700" advClick="0">
+        <p:fade/>
+      </p:transition>
+    </mc:Choice>
+    <mc:Fallback xmlns="">
+      <p:transition spd="med" advClick="0">
+        <p:fade/>
+      </p:transition>
+    </mc:Fallback>
+  </mc:AlternateContent>
+  <p:timing>
+    <p:tnLst>
+      <p:par>
+        <p:cTn id="1" dur="indefinite" restart="never" nodeType="tmRoot">
+          <p:childTnLst>
+            <p:seq concurrent="1" nextAc="seek">
+              <p:cTn id="2" dur="indefinite" nodeType="mainSeq">
+                <p:childTnLst>
+                  <p:par>
+                    <p:cTn id="3" fill="hold">
+                      <p:stCondLst>
+                        <p:cond delay="indefinite"/>
+                        <p:cond evt="onBegin" delay="0">
+                          <p:tn val="2"/>
+                        </p:cond>
+                      </p:stCondLst>
+                      <p:childTnLst>
+                        <p:par>
+                          <p:cTn id="4" fill="hold">
+                            <p:stCondLst>
+                              <p:cond delay="0"/>
+                            </p:stCondLst>
+                            <p:childTnLst>
+                              <p:par>
+                                <p:cTn id="5" presetID="10" presetClass="entr" presetSubtype="0" fill="hold" grpId="0" nodeType="afterEffect">
+                                  <p:stCondLst>
+                                    <p:cond delay="0"/>
+                                  </p:stCondLst>
+                                  <p:childTnLst>
+                                    <p:set>
+                                      <p:cBhvr>
+                                        <p:cTn id="6" dur="1" fill="hold">
+                                          <p:stCondLst>
+                                            <p:cond delay="0"/>
+                                          </p:stCondLst>
+                                        </p:cTn>
+                                        <p:tgtEl>
+                                          <p:spTgt spid="2"/>
+                                        </p:tgtEl>
+                                        <p:attrNameLst>
+                                          <p:attrName>style.visibility</p:attrName>
+                                        </p:attrNameLst>
+                                      </p:cBhvr>
+                                      <p:to>
+                                        <p:strVal val="visible"/>
+                                      </p:to>
+                                    </p:set>
+                                    <p:animEffect transition="in" filter="fade">
+                                      <p:cBhvr>
+                                        <p:cTn id="7" dur="500"/>
+                                        <p:tgtEl>
+                                          <p:spTgt spid="2"/>
+                                        </p:tgtEl>
+                                      </p:cBhvr>
+                                    </p:animEffect>
+                                  </p:childTnLst>
+                                </p:cTn>
+                              </p:par>
+                            </p:childTnLst>
+                          </p:cTn>
+                        </p:par>
+                      </p:childTnLst>
+                    </p:cTn>
+                  </p:par>
+                </p:childTnLst>
+              </p:cTn>
+              <p:prevCondLst>
+                <p:cond evt="onPrev" delay="0">
+                  <p:tgtEl>
+                    <p:sldTgt/>
+                  </p:tgtEl>
+                </p:cond>
+              </p:prevCondLst>
+              <p:nextCondLst>
+                <p:cond evt="onNext" delay="0">
+                  <p:tgtEl>
+                    <p:sldTgt/>
+                  </p:tgtEl>
+                </p:cond>
+              </p:nextCondLst>
+            </p:seq>
+          </p:childTnLst>
+        </p:cTn>
+      </p:par>
+    </p:tnLst>
+    <p:bldLst>
+      <p:bldP spid="2" grpId="0"/>
+    </p:bldLst>
+  </p:timing>
+</p:sld>
+</file>
+
+<file path=ppt/slides/slide21.xml><?xml version="1.0" encoding="utf-8"?>
+<p:sld xmlns:a="http://schemas.openxmlformats.org/drawingml/2006/main" xmlns:r="http://schemas.openxmlformats.org/officeDocument/2006/relationships" xmlns:p="http://schemas.openxmlformats.org/presentationml/2006/main">
+  <p:cSld>
+    <p:spTree>
+      <p:nvGrpSpPr>
+        <p:cNvPr id="1" name=""/>
+        <p:cNvGrpSpPr/>
+        <p:nvPr/>
+      </p:nvGrpSpPr>
+      <p:grpSpPr>
+        <a:xfrm>
+          <a:off x="0" y="0"/>
+          <a:ext cx="0" cy="0"/>
+          <a:chOff x="0" y="0"/>
+          <a:chExt cx="0" cy="0"/>
+        </a:xfrm>
+      </p:grpSpPr>
+      <p:sp>
+        <p:nvSpPr>
+          <p:cNvPr id="15362" name="內容版面配置區 5"/>
+          <p:cNvSpPr>
+            <a:spLocks noGrp="1"/>
+          </p:cNvSpPr>
+          <p:nvPr>
+            <p:ph idx="1"/>
+          </p:nvPr>
+        </p:nvSpPr>
+        <p:spPr>
+          <a:xfrm>
+            <a:off x="457200" y="936625"/>
+            <a:ext cx="8229600" cy="3575050"/>
+          </a:xfrm>
+        </p:spPr>
+        <p:txBody>
+          <a:bodyPr/>
+          <a:lstStyle/>
+          <a:p>
             <a:pPr marL="0" indent="0" eaLnBrk="1" hangingPunct="1">
               <a:buNone/>
               <a:defRPr/>
@@ -10066,7 +10491,7 @@
 </p:sld>
 </file>
 
-<file path=ppt/slides/slide21.xml><?xml version="1.0" encoding="utf-8"?>
+<file path=ppt/slides/slide22.xml><?xml version="1.0" encoding="utf-8"?>
 <p:sld xmlns:a="http://schemas.openxmlformats.org/drawingml/2006/main" xmlns:r="http://schemas.openxmlformats.org/officeDocument/2006/relationships" xmlns:p="http://schemas.openxmlformats.org/presentationml/2006/main">
   <p:cSld>
     <p:spTree>
@@ -13752,8 +14177,19 @@
                 <a:latin typeface="Times New Roman" panose="02020603050405020304" pitchFamily="18" charset="0"/>
                 <a:cs typeface="Times New Roman" panose="02020603050405020304" pitchFamily="18" charset="0"/>
               </a:rPr>
-              <a:t>Roaming automatic tool</a:t>
-            </a:r>
+              <a:t>Roaming </a:t>
+            </a:r>
+            <a:r>
+              <a:rPr lang="en-US" altLang="zh-TW" sz="1800" dirty="0">
+                <a:latin typeface="Times New Roman" panose="02020603050405020304" pitchFamily="18" charset="0"/>
+                <a:cs typeface="Times New Roman" panose="02020603050405020304" pitchFamily="18" charset="0"/>
+              </a:rPr>
+              <a:t>automation</a:t>
+            </a:r>
+            <a:endParaRPr lang="en-US" altLang="zh-TW" sz="1800" dirty="0" smtClean="0">
+              <a:latin typeface="Times New Roman" panose="02020603050405020304" pitchFamily="18" charset="0"/>
+              <a:cs typeface="Times New Roman" panose="02020603050405020304" pitchFamily="18" charset="0"/>
+            </a:endParaRPr>
           </a:p>
           <a:p>
             <a:pPr eaLnBrk="1" hangingPunct="1">
@@ -13766,7 +14202,21 @@
                 <a:latin typeface="Times New Roman" panose="02020603050405020304" pitchFamily="18" charset="0"/>
                 <a:cs typeface="Times New Roman" panose="02020603050405020304" pitchFamily="18" charset="0"/>
               </a:rPr>
-              <a:t>Airplane on/off mode automatic tool</a:t>
+              <a:t>Airplane on/off </a:t>
+            </a:r>
+            <a:r>
+              <a:rPr lang="en-US" altLang="zh-TW" sz="1800" dirty="0">
+                <a:latin typeface="Times New Roman" panose="02020603050405020304" pitchFamily="18" charset="0"/>
+                <a:cs typeface="Times New Roman" panose="02020603050405020304" pitchFamily="18" charset="0"/>
+              </a:rPr>
+              <a:t>mode </a:t>
+            </a:r>
+            <a:r>
+              <a:rPr lang="en-US" altLang="zh-TW" sz="1800" dirty="0" smtClean="0">
+                <a:latin typeface="Times New Roman" panose="02020603050405020304" pitchFamily="18" charset="0"/>
+                <a:cs typeface="Times New Roman" panose="02020603050405020304" pitchFamily="18" charset="0"/>
+              </a:rPr>
+              <a:t>automation</a:t>
             </a:r>
           </a:p>
           <a:p>
@@ -13776,25 +14226,11 @@
               <a:defRPr/>
             </a:pPr>
             <a:r>
-              <a:rPr lang="en-US" altLang="zh-TW" sz="1400" dirty="0" smtClean="0">
-                <a:latin typeface="Times New Roman" panose="02020603050405020304" pitchFamily="18" charset="0"/>
-                <a:cs typeface="Times New Roman" panose="02020603050405020304" pitchFamily="18" charset="0"/>
-              </a:rPr>
-              <a:t>Android 6.0.1 (RJ-45), </a:t>
-            </a:r>
-            <a:r>
               <a:rPr lang="en-US" altLang="zh-TW" sz="1400" dirty="0">
                 <a:latin typeface="Times New Roman" panose="02020603050405020304" pitchFamily="18" charset="0"/>
                 <a:cs typeface="Times New Roman" panose="02020603050405020304" pitchFamily="18" charset="0"/>
               </a:rPr>
-              <a:t>Android 6.0.1</a:t>
-            </a:r>
-            <a:r>
-              <a:rPr lang="en-US" altLang="zh-TW" sz="1400" dirty="0" smtClean="0">
-                <a:latin typeface="Times New Roman" panose="02020603050405020304" pitchFamily="18" charset="0"/>
-                <a:cs typeface="Times New Roman" panose="02020603050405020304" pitchFamily="18" charset="0"/>
-              </a:rPr>
-              <a:t> (OTG)</a:t>
+              <a:t>Android 6.0.1 (RJ-45), Android 6.0.1 (OTG)</a:t>
             </a:r>
           </a:p>
           <a:p>
@@ -13808,7 +14244,14 @@
                 <a:latin typeface="Times New Roman" panose="02020603050405020304" pitchFamily="18" charset="0"/>
                 <a:cs typeface="Times New Roman" panose="02020603050405020304" pitchFamily="18" charset="0"/>
               </a:rPr>
-              <a:t>Android 8.1.0</a:t>
+              <a:t>Android </a:t>
+            </a:r>
+            <a:r>
+              <a:rPr lang="en-US" altLang="zh-TW" sz="1400" dirty="0" smtClean="0">
+                <a:latin typeface="Times New Roman" panose="02020603050405020304" pitchFamily="18" charset="0"/>
+                <a:cs typeface="Times New Roman" panose="02020603050405020304" pitchFamily="18" charset="0"/>
+              </a:rPr>
+              <a:t>8.1.0</a:t>
             </a:r>
             <a:r>
               <a:rPr lang="zh-TW" altLang="en-US" sz="1400" dirty="0" smtClean="0">
@@ -13857,7 +14300,28 @@
                 <a:latin typeface="Times New Roman" panose="02020603050405020304" pitchFamily="18" charset="0"/>
                 <a:cs typeface="Times New Roman" panose="02020603050405020304" pitchFamily="18" charset="0"/>
               </a:rPr>
-              <a:t>Wi-Fi frequency switch automatic tool (2.4G, 5G)</a:t>
+              <a:t>Wi-Fi frequency switch </a:t>
+            </a:r>
+            <a:r>
+              <a:rPr lang="en-US" altLang="zh-TW" sz="1800" dirty="0" smtClean="0">
+                <a:latin typeface="Times New Roman" panose="02020603050405020304" pitchFamily="18" charset="0"/>
+                <a:cs typeface="Times New Roman" panose="02020603050405020304" pitchFamily="18" charset="0"/>
+              </a:rPr>
+              <a:t>automation (</a:t>
+            </a:r>
+            <a:r>
+              <a:rPr lang="en-US" altLang="zh-TW" sz="1800" dirty="0">
+                <a:latin typeface="Times New Roman" panose="02020603050405020304" pitchFamily="18" charset="0"/>
+                <a:cs typeface="Times New Roman" panose="02020603050405020304" pitchFamily="18" charset="0"/>
+              </a:rPr>
+              <a:t>2.4G</a:t>
+            </a:r>
+            <a:r>
+              <a:rPr lang="en-US" altLang="zh-TW" sz="1800" dirty="0" smtClean="0">
+                <a:latin typeface="Times New Roman" panose="02020603050405020304" pitchFamily="18" charset="0"/>
+                <a:cs typeface="Times New Roman" panose="02020603050405020304" pitchFamily="18" charset="0"/>
+              </a:rPr>
+              <a:t>, 5G)</a:t>
             </a:r>
           </a:p>
           <a:p>
@@ -13899,7 +14363,14 @@
                 <a:latin typeface="Times New Roman" panose="02020603050405020304" pitchFamily="18" charset="0"/>
                 <a:cs typeface="Times New Roman" panose="02020603050405020304" pitchFamily="18" charset="0"/>
               </a:rPr>
-              <a:t>PXE automatic installation</a:t>
+              <a:t>PXE automatic </a:t>
+            </a:r>
+            <a:r>
+              <a:rPr lang="en-US" altLang="zh-TW" sz="1800" dirty="0" smtClean="0">
+                <a:latin typeface="Times New Roman" panose="02020603050405020304" pitchFamily="18" charset="0"/>
+                <a:cs typeface="Times New Roman" panose="02020603050405020304" pitchFamily="18" charset="0"/>
+              </a:rPr>
+              <a:t>installation</a:t>
             </a:r>
           </a:p>
           <a:p>
@@ -13909,11 +14380,43 @@
               <a:defRPr/>
             </a:pPr>
             <a:r>
+              <a:rPr lang="en-US" altLang="zh-TW" sz="1800" dirty="0" err="1" smtClean="0">
+                <a:latin typeface="Times New Roman" panose="02020603050405020304" pitchFamily="18" charset="0"/>
+                <a:cs typeface="Times New Roman" panose="02020603050405020304" pitchFamily="18" charset="0"/>
+              </a:rPr>
+              <a:t>BurnInTest</a:t>
+            </a:r>
+            <a:r>
+              <a:rPr lang="en-US" altLang="zh-TW" sz="1800" dirty="0" smtClean="0">
+                <a:latin typeface="Times New Roman" panose="02020603050405020304" pitchFamily="18" charset="0"/>
+                <a:cs typeface="Times New Roman" panose="02020603050405020304" pitchFamily="18" charset="0"/>
+              </a:rPr>
+              <a:t> automation</a:t>
+            </a:r>
+            <a:endParaRPr lang="en-US" altLang="zh-TW" sz="1800" dirty="0" smtClean="0">
+              <a:latin typeface="Times New Roman" panose="02020603050405020304" pitchFamily="18" charset="0"/>
+              <a:cs typeface="Times New Roman" panose="02020603050405020304" pitchFamily="18" charset="0"/>
+            </a:endParaRPr>
+          </a:p>
+          <a:p>
+            <a:pPr eaLnBrk="1" hangingPunct="1">
+              <a:buFont typeface="Arial" charset="0"/>
+              <a:buChar char="•"/>
+              <a:defRPr/>
+            </a:pPr>
+            <a:r>
               <a:rPr lang="en-US" sz="1800" dirty="0" smtClean="0">
                 <a:latin typeface="Times New Roman" panose="02020603050405020304" pitchFamily="18" charset="0"/>
                 <a:cs typeface="Times New Roman" panose="02020603050405020304" pitchFamily="18" charset="0"/>
               </a:rPr>
-              <a:t>Continuous integration</a:t>
+              <a:t>Continuous </a:t>
+            </a:r>
+            <a:r>
+              <a:rPr lang="en-US" sz="1800" dirty="0" smtClean="0">
+                <a:latin typeface="Times New Roman" panose="02020603050405020304" pitchFamily="18" charset="0"/>
+                <a:cs typeface="Times New Roman" panose="02020603050405020304" pitchFamily="18" charset="0"/>
+              </a:rPr>
+              <a:t>Integration</a:t>
             </a:r>
             <a:endParaRPr lang="en-US" altLang="zh-TW" sz="1800" dirty="0">
               <a:latin typeface="Times New Roman" panose="02020603050405020304" pitchFamily="18" charset="0"/>
@@ -14202,7 +14705,27 @@
                 <a:latin typeface="Times New Roman" panose="02020603050405020304" pitchFamily="18" charset="0"/>
                 <a:cs typeface="Times New Roman" panose="02020603050405020304" pitchFamily="18" charset="0"/>
               </a:rPr>
-              <a:t>Roaming automatic tool</a:t>
+              <a:t>Roaming </a:t>
+            </a:r>
+            <a:r>
+              <a:rPr lang="en-US" altLang="zh-TW" sz="2800" kern="0" dirty="0" smtClean="0">
+                <a:solidFill>
+                  <a:srgbClr val="003366"/>
+                </a:solidFill>
+                <a:latin typeface="Times New Roman" panose="02020603050405020304" pitchFamily="18" charset="0"/>
+                <a:cs typeface="Times New Roman" panose="02020603050405020304" pitchFamily="18" charset="0"/>
+              </a:rPr>
+              <a:t>automation</a:t>
+            </a:r>
+            <a:r>
+              <a:rPr lang="en-US" altLang="zh-TW" sz="2800" kern="0" dirty="0" smtClean="0">
+                <a:solidFill>
+                  <a:srgbClr val="003366"/>
+                </a:solidFill>
+                <a:latin typeface="Times New Roman" panose="02020603050405020304" pitchFamily="18" charset="0"/>
+                <a:cs typeface="Times New Roman" panose="02020603050405020304" pitchFamily="18" charset="0"/>
+              </a:rPr>
+              <a:t/>
             </a:r>
             <a:br>
               <a:rPr lang="en-US" altLang="zh-TW" sz="2800" kern="0" dirty="0" smtClean="0">

</xml_diff>

<commit_message>
Update the sop of wireless_switch
</commit_message>
<xml_diff>
--- a/kpi/Test Automation_Demo.pptx
+++ b/kpi/Test Automation_Demo.pptx
@@ -25,13 +25,13 @@
     <p:sldId id="562" r:id="rId13"/>
     <p:sldId id="574" r:id="rId14"/>
     <p:sldId id="560" r:id="rId15"/>
-    <p:sldId id="571" r:id="rId16"/>
-    <p:sldId id="553" r:id="rId17"/>
-    <p:sldId id="573" r:id="rId18"/>
-    <p:sldId id="564" r:id="rId19"/>
-    <p:sldId id="572" r:id="rId20"/>
-    <p:sldId id="555" r:id="rId21"/>
-    <p:sldId id="570" r:id="rId22"/>
+    <p:sldId id="577" r:id="rId16"/>
+    <p:sldId id="571" r:id="rId17"/>
+    <p:sldId id="553" r:id="rId18"/>
+    <p:sldId id="573" r:id="rId19"/>
+    <p:sldId id="564" r:id="rId20"/>
+    <p:sldId id="572" r:id="rId21"/>
+    <p:sldId id="555" r:id="rId22"/>
     <p:sldId id="556" r:id="rId23"/>
     <p:sldId id="575" r:id="rId24"/>
     <p:sldId id="569" r:id="rId25"/>
@@ -9604,8 +9604,26 @@
                 <a:latin typeface="Times New Roman" panose="02020603050405020304" pitchFamily="18" charset="0"/>
                 <a:cs typeface="Times New Roman" panose="02020603050405020304" pitchFamily="18" charset="0"/>
               </a:rPr>
-              <a:t>System Structure</a:t>
-            </a:r>
+              <a:t>System </a:t>
+            </a:r>
+            <a:r>
+              <a:rPr lang="en-US" altLang="zh-TW" sz="1800" dirty="0" smtClean="0">
+                <a:latin typeface="Times New Roman" panose="02020603050405020304" pitchFamily="18" charset="0"/>
+                <a:cs typeface="Times New Roman" panose="02020603050405020304" pitchFamily="18" charset="0"/>
+              </a:rPr>
+              <a:t>Structure</a:t>
+            </a:r>
+          </a:p>
+          <a:p>
+            <a:pPr marL="342900" lvl="1" indent="-342900" eaLnBrk="1" hangingPunct="1">
+              <a:buFont typeface="Arial" charset="0"/>
+              <a:buChar char="•"/>
+              <a:defRPr/>
+            </a:pPr>
+            <a:endParaRPr lang="en-US" altLang="zh-TW" sz="1800" dirty="0">
+              <a:latin typeface="Times New Roman" panose="02020603050405020304" pitchFamily="18" charset="0"/>
+              <a:cs typeface="Times New Roman" panose="02020603050405020304" pitchFamily="18" charset="0"/>
+            </a:endParaRPr>
           </a:p>
           <a:p>
             <a:pPr eaLnBrk="1" hangingPunct="1">
@@ -9683,6 +9701,111 @@
           </a:p>
         </p:txBody>
       </p:sp>
+      <p:pic>
+        <p:nvPicPr>
+          <p:cNvPr id="26" name="Picture 2"/>
+          <p:cNvPicPr>
+            <a:picLocks noChangeAspect="1" noChangeArrowheads="1"/>
+          </p:cNvPicPr>
+          <p:nvPr/>
+        </p:nvPicPr>
+        <p:blipFill>
+          <a:blip r:embed="rId3" cstate="print">
+            <a:extLst>
+              <a:ext uri="{28A0092B-C50C-407E-A947-70E740481C1C}">
+                <a14:useLocalDpi xmlns:a14="http://schemas.microsoft.com/office/drawing/2010/main" val="0"/>
+              </a:ext>
+            </a:extLst>
+          </a:blip>
+          <a:srcRect/>
+          <a:stretch>
+            <a:fillRect/>
+          </a:stretch>
+        </p:blipFill>
+        <p:spPr bwMode="auto">
+          <a:xfrm>
+            <a:off x="2626542" y="1897627"/>
+            <a:ext cx="3949523" cy="2895586"/>
+          </a:xfrm>
+          <a:prstGeom prst="rect">
+            <a:avLst/>
+          </a:prstGeom>
+          <a:noFill/>
+          <a:ln>
+            <a:noFill/>
+          </a:ln>
+          <a:effectLst/>
+          <a:extLst>
+            <a:ext uri="{909E8E84-426E-40DD-AFC4-6F175D3DCCD1}">
+              <a14:hiddenFill xmlns:a14="http://schemas.microsoft.com/office/drawing/2010/main">
+                <a:solidFill>
+                  <a:schemeClr val="accent1"/>
+                </a:solidFill>
+              </a14:hiddenFill>
+            </a:ext>
+            <a:ext uri="{91240B29-F687-4F45-9708-019B960494DF}">
+              <a14:hiddenLine xmlns:a14="http://schemas.microsoft.com/office/drawing/2010/main" w="9525">
+                <a:solidFill>
+                  <a:schemeClr val="tx1"/>
+                </a:solidFill>
+                <a:miter lim="800000"/>
+                <a:headEnd/>
+                <a:tailEnd/>
+              </a14:hiddenLine>
+            </a:ext>
+            <a:ext uri="{AF507438-7753-43E0-B8FC-AC1667EBCBE1}">
+              <a14:hiddenEffects xmlns:a14="http://schemas.microsoft.com/office/drawing/2010/main">
+                <a:effectLst>
+                  <a:outerShdw dist="35921" dir="2700000" algn="ctr" rotWithShape="0">
+                    <a:schemeClr val="bg2"/>
+                  </a:outerShdw>
+                </a:effectLst>
+              </a14:hiddenEffects>
+            </a:ext>
+          </a:extLst>
+        </p:spPr>
+      </p:pic>
+      <p:pic>
+        <p:nvPicPr>
+          <p:cNvPr id="27" name="Picture 3" descr="D:\Users\ZL.chen\Desktop\P_setting_fff_1_nd_500.jpg"/>
+          <p:cNvPicPr>
+            <a:picLocks noChangeAspect="1" noChangeArrowheads="1"/>
+          </p:cNvPicPr>
+          <p:nvPr/>
+        </p:nvPicPr>
+        <p:blipFill>
+          <a:blip r:embed="rId4" cstate="print">
+            <a:extLst>
+              <a:ext uri="{28A0092B-C50C-407E-A947-70E740481C1C}">
+                <a14:useLocalDpi xmlns:a14="http://schemas.microsoft.com/office/drawing/2010/main" val="0"/>
+              </a:ext>
+            </a:extLst>
+          </a:blip>
+          <a:srcRect/>
+          <a:stretch>
+            <a:fillRect/>
+          </a:stretch>
+        </p:blipFill>
+        <p:spPr bwMode="auto">
+          <a:xfrm>
+            <a:off x="4266281" y="1237024"/>
+            <a:ext cx="670047" cy="670047"/>
+          </a:xfrm>
+          <a:prstGeom prst="rect">
+            <a:avLst/>
+          </a:prstGeom>
+          <a:noFill/>
+          <a:extLst>
+            <a:ext uri="{909E8E84-426E-40DD-AFC4-6F175D3DCCD1}">
+              <a14:hiddenFill xmlns:a14="http://schemas.microsoft.com/office/drawing/2010/main">
+                <a:solidFill>
+                  <a:srgbClr val="FFFFFF"/>
+                </a:solidFill>
+              </a14:hiddenFill>
+            </a:ext>
+          </a:extLst>
+        </p:spPr>
+      </p:pic>
     </p:spTree>
     <p:extLst>
       <p:ext uri="{BB962C8B-B14F-4D97-AF65-F5344CB8AC3E}">
@@ -9809,6 +9932,76 @@
                                               <p:pRg st="0" end="0"/>
                                             </p:txEl>
                                           </p:spTgt>
+                                        </p:tgtEl>
+                                      </p:cBhvr>
+                                    </p:animEffect>
+                                  </p:childTnLst>
+                                </p:cTn>
+                              </p:par>
+                              <p:par>
+                                <p:cTn id="12" presetID="10" presetClass="entr" presetSubtype="0" fill="hold" nodeType="withEffect">
+                                  <p:stCondLst>
+                                    <p:cond delay="0"/>
+                                  </p:stCondLst>
+                                  <p:childTnLst>
+                                    <p:set>
+                                      <p:cBhvr>
+                                        <p:cTn id="13" dur="1" fill="hold">
+                                          <p:stCondLst>
+                                            <p:cond delay="0"/>
+                                          </p:stCondLst>
+                                        </p:cTn>
+                                        <p:tgtEl>
+                                          <p:spTgt spid="27"/>
+                                        </p:tgtEl>
+                                        <p:attrNameLst>
+                                          <p:attrName>style.visibility</p:attrName>
+                                        </p:attrNameLst>
+                                      </p:cBhvr>
+                                      <p:to>
+                                        <p:strVal val="visible"/>
+                                      </p:to>
+                                    </p:set>
+                                    <p:animEffect transition="in" filter="fade">
+                                      <p:cBhvr>
+                                        <p:cTn id="14" dur="500"/>
+                                        <p:tgtEl>
+                                          <p:spTgt spid="27"/>
+                                        </p:tgtEl>
+                                      </p:cBhvr>
+                                    </p:animEffect>
+                                  </p:childTnLst>
+                                </p:cTn>
+                              </p:par>
+                              <p:par>
+                                <p:cTn id="15" presetID="10" presetClass="entr" presetSubtype="0" fill="hold" nodeType="withEffect">
+                                  <p:stCondLst>
+                                    <p:cond delay="0"/>
+                                  </p:stCondLst>
+                                  <p:childTnLst>
+                                    <p:set>
+                                      <p:cBhvr>
+                                        <p:cTn id="16" dur="1" fill="hold">
+                                          <p:stCondLst>
+                                            <p:cond delay="0"/>
+                                          </p:stCondLst>
+                                        </p:cTn>
+                                        <p:tgtEl>
+                                          <p:spTgt spid="26"/>
+                                        </p:tgtEl>
+                                        <p:attrNameLst>
+                                          <p:attrName>style.visibility</p:attrName>
+                                        </p:attrNameLst>
+                                      </p:cBhvr>
+                                      <p:to>
+                                        <p:strVal val="visible"/>
+                                      </p:to>
+                                    </p:set>
+                                    <p:animEffect transition="in" filter="fade">
+                                      <p:cBhvr>
+                                        <p:cTn id="17" dur="250"/>
+                                        <p:tgtEl>
+                                          <p:spTgt spid="26"/>
                                         </p:tgtEl>
                                       </p:cBhvr>
                                     </p:animEffect>
@@ -9886,18 +10079,1060 @@
           <a:bodyPr/>
           <a:lstStyle/>
           <a:p>
+            <a:pPr eaLnBrk="1" hangingPunct="1">
+              <a:buFont typeface="Arial" charset="0"/>
+              <a:buChar char="•"/>
+              <a:defRPr/>
+            </a:pPr>
+            <a:r>
+              <a:rPr lang="en-US" altLang="zh-TW" sz="1800" dirty="0" smtClean="0">
+                <a:latin typeface="Times New Roman" panose="02020603050405020304" pitchFamily="18" charset="0"/>
+                <a:cs typeface="Times New Roman" panose="02020603050405020304" pitchFamily="18" charset="0"/>
+              </a:rPr>
+              <a:t>The Wi-Fi switch’s screenshot and log as below:</a:t>
+            </a:r>
+          </a:p>
+          <a:p>
+            <a:pPr eaLnBrk="1" hangingPunct="1">
+              <a:buFont typeface="Arial" charset="0"/>
+              <a:buChar char="•"/>
+              <a:defRPr/>
+            </a:pPr>
+            <a:endParaRPr lang="en-US" altLang="zh-TW" sz="1800" dirty="0">
+              <a:latin typeface="Times New Roman" panose="02020603050405020304" pitchFamily="18" charset="0"/>
+              <a:cs typeface="Times New Roman" panose="02020603050405020304" pitchFamily="18" charset="0"/>
+            </a:endParaRPr>
+          </a:p>
+          <a:p>
+            <a:pPr eaLnBrk="1" hangingPunct="1">
+              <a:buFont typeface="Arial" charset="0"/>
+              <a:buChar char="•"/>
+              <a:defRPr/>
+            </a:pPr>
+            <a:endParaRPr lang="en-US" altLang="zh-TW" sz="1800" dirty="0" smtClean="0">
+              <a:latin typeface="Times New Roman" panose="02020603050405020304" pitchFamily="18" charset="0"/>
+              <a:cs typeface="Times New Roman" panose="02020603050405020304" pitchFamily="18" charset="0"/>
+            </a:endParaRPr>
+          </a:p>
+          <a:p>
+            <a:pPr eaLnBrk="1" hangingPunct="1">
+              <a:buFont typeface="Arial" charset="0"/>
+              <a:buChar char="•"/>
+              <a:defRPr/>
+            </a:pPr>
+            <a:endParaRPr lang="en-US" altLang="zh-TW" sz="1800" dirty="0" smtClean="0">
+              <a:latin typeface="Times New Roman" panose="02020603050405020304" pitchFamily="18" charset="0"/>
+              <a:cs typeface="Times New Roman" panose="02020603050405020304" pitchFamily="18" charset="0"/>
+            </a:endParaRPr>
+          </a:p>
+          <a:p>
+            <a:pPr lvl="1" eaLnBrk="1" hangingPunct="1">
+              <a:buFont typeface="Arial" charset="0"/>
+              <a:buChar char="•"/>
+              <a:defRPr/>
+            </a:pPr>
+            <a:endParaRPr lang="en-US" altLang="zh-TW" sz="1400" dirty="0" smtClean="0">
+              <a:latin typeface="Times New Roman" panose="02020603050405020304" pitchFamily="18" charset="0"/>
+              <a:cs typeface="Times New Roman" panose="02020603050405020304" pitchFamily="18" charset="0"/>
+            </a:endParaRPr>
+          </a:p>
+          <a:p>
+            <a:pPr eaLnBrk="1" hangingPunct="1">
+              <a:buFont typeface="Arial" charset="0"/>
+              <a:buChar char="•"/>
+              <a:defRPr/>
+            </a:pPr>
+            <a:endParaRPr lang="en-US" altLang="zh-TW" sz="1800" dirty="0">
+              <a:latin typeface="Times New Roman" panose="02020603050405020304" pitchFamily="18" charset="0"/>
+              <a:cs typeface="Times New Roman" panose="02020603050405020304" pitchFamily="18" charset="0"/>
+            </a:endParaRPr>
+          </a:p>
+        </p:txBody>
+      </p:sp>
+      <p:sp>
+        <p:nvSpPr>
+          <p:cNvPr id="2" name="標題 4"/>
+          <p:cNvSpPr>
+            <a:spLocks noGrp="1"/>
+          </p:cNvSpPr>
+          <p:nvPr>
+            <p:ph type="title"/>
+          </p:nvPr>
+        </p:nvSpPr>
+        <p:spPr>
+          <a:xfrm>
+            <a:off x="457200" y="87313"/>
+            <a:ext cx="8229600" cy="756000"/>
+          </a:xfrm>
+        </p:spPr>
+        <p:txBody>
+          <a:bodyPr/>
+          <a:lstStyle/>
+          <a:p>
+            <a:pPr eaLnBrk="1" hangingPunct="1">
+              <a:defRPr/>
+            </a:pPr>
+            <a:r>
+              <a:rPr lang="en-US" altLang="zh-TW" sz="2800" kern="0" dirty="0" smtClean="0">
+                <a:solidFill>
+                  <a:srgbClr val="003366"/>
+                </a:solidFill>
+                <a:latin typeface="Times New Roman" panose="02020603050405020304" pitchFamily="18" charset="0"/>
+                <a:cs typeface="Times New Roman" panose="02020603050405020304" pitchFamily="18" charset="0"/>
+              </a:rPr>
+              <a:t>Wi-Fi </a:t>
+            </a:r>
+            <a:r>
+              <a:rPr lang="en-US" altLang="zh-TW" sz="2800" kern="0" dirty="0">
+                <a:solidFill>
+                  <a:srgbClr val="003366"/>
+                </a:solidFill>
+                <a:latin typeface="Times New Roman" panose="02020603050405020304" pitchFamily="18" charset="0"/>
+                <a:cs typeface="Times New Roman" panose="02020603050405020304" pitchFamily="18" charset="0"/>
+              </a:rPr>
+              <a:t>frequency switch automation (2.4G, 5G</a:t>
+            </a:r>
+            <a:r>
+              <a:rPr lang="en-US" altLang="zh-TW" sz="2800" kern="0" dirty="0" smtClean="0">
+                <a:solidFill>
+                  <a:srgbClr val="003366"/>
+                </a:solidFill>
+                <a:latin typeface="Times New Roman" panose="02020603050405020304" pitchFamily="18" charset="0"/>
+                <a:cs typeface="Times New Roman" panose="02020603050405020304" pitchFamily="18" charset="0"/>
+              </a:rPr>
+              <a:t>)</a:t>
+            </a:r>
+            <a:endParaRPr lang="zh-TW" altLang="en-US" sz="2800" kern="0" dirty="0">
+              <a:solidFill>
+                <a:srgbClr val="003366"/>
+              </a:solidFill>
+              <a:latin typeface="Times New Roman" panose="02020603050405020304" pitchFamily="18" charset="0"/>
+              <a:cs typeface="Times New Roman" panose="02020603050405020304" pitchFamily="18" charset="0"/>
+            </a:endParaRPr>
+          </a:p>
+        </p:txBody>
+      </p:sp>
+      <p:graphicFrame>
+        <p:nvGraphicFramePr>
+          <p:cNvPr id="3" name="物件 2"/>
+          <p:cNvGraphicFramePr>
+            <a:graphicFrameLocks noChangeAspect="1"/>
+          </p:cNvGraphicFramePr>
+          <p:nvPr>
+            <p:extLst>
+              <p:ext uri="{D42A27DB-BD31-4B8C-83A1-F6EECF244321}">
+                <p14:modId xmlns:p14="http://schemas.microsoft.com/office/powerpoint/2010/main" val="2695960036"/>
+              </p:ext>
+            </p:extLst>
+          </p:nvPr>
+        </p:nvGraphicFramePr>
+        <p:xfrm>
+          <a:off x="4055082" y="4333480"/>
+          <a:ext cx="744538" cy="395287"/>
+        </p:xfrm>
+        <a:graphic>
+          <a:graphicData uri="http://schemas.openxmlformats.org/presentationml/2006/ole">
+            <mc:AlternateContent xmlns:mc="http://schemas.openxmlformats.org/markup-compatibility/2006">
+              <mc:Choice xmlns:v="urn:schemas-microsoft-com:vml" Requires="v">
+                <p:oleObj spid="_x0000_s5140" name="封裝程式殼層物件" showAsIcon="1" r:id="rId4" imgW="744480" imgH="394920" progId="Package">
+                  <p:embed/>
+                </p:oleObj>
+              </mc:Choice>
+              <mc:Fallback>
+                <p:oleObj name="封裝程式殼層物件" showAsIcon="1" r:id="rId4" imgW="744480" imgH="394920" progId="Package">
+                  <p:embed/>
+                  <p:pic>
+                    <p:nvPicPr>
+                      <p:cNvPr id="0" name=""/>
+                      <p:cNvPicPr/>
+                      <p:nvPr/>
+                    </p:nvPicPr>
+                    <p:blipFill>
+                      <a:blip r:embed="rId5"/>
+                      <a:stretch>
+                        <a:fillRect/>
+                      </a:stretch>
+                    </p:blipFill>
+                    <p:spPr>
+                      <a:xfrm>
+                        <a:off x="4055082" y="4333480"/>
+                        <a:ext cx="744538" cy="395287"/>
+                      </a:xfrm>
+                      <a:prstGeom prst="rect">
+                        <a:avLst/>
+                      </a:prstGeom>
+                    </p:spPr>
+                  </p:pic>
+                </p:oleObj>
+              </mc:Fallback>
+            </mc:AlternateContent>
+          </a:graphicData>
+        </a:graphic>
+      </p:graphicFrame>
+      <p:pic>
+        <p:nvPicPr>
+          <p:cNvPr id="5129" name="Picture 9" descr="D:\Users\ZL.chen\Desktop\1580886355952.jpg"/>
+          <p:cNvPicPr>
+            <a:picLocks noChangeAspect="1" noChangeArrowheads="1"/>
+          </p:cNvPicPr>
+          <p:nvPr/>
+        </p:nvPicPr>
+        <p:blipFill>
+          <a:blip r:embed="rId6" cstate="print">
+            <a:extLst>
+              <a:ext uri="{28A0092B-C50C-407E-A947-70E740481C1C}">
+                <a14:useLocalDpi xmlns:a14="http://schemas.microsoft.com/office/drawing/2010/main" val="0"/>
+              </a:ext>
+            </a:extLst>
+          </a:blip>
+          <a:srcRect/>
+          <a:stretch>
+            <a:fillRect/>
+          </a:stretch>
+        </p:blipFill>
+        <p:spPr bwMode="auto">
+          <a:xfrm>
+            <a:off x="872198" y="1392699"/>
+            <a:ext cx="3214050" cy="3323905"/>
+          </a:xfrm>
+          <a:prstGeom prst="rect">
+            <a:avLst/>
+          </a:prstGeom>
+          <a:noFill/>
+          <a:extLst>
+            <a:ext uri="{909E8E84-426E-40DD-AFC4-6F175D3DCCD1}">
+              <a14:hiddenFill xmlns:a14="http://schemas.microsoft.com/office/drawing/2010/main">
+                <a:solidFill>
+                  <a:srgbClr val="FFFFFF"/>
+                </a:solidFill>
+              </a14:hiddenFill>
+            </a:ext>
+          </a:extLst>
+        </p:spPr>
+      </p:pic>
+      <p:sp>
+        <p:nvSpPr>
+          <p:cNvPr id="6" name="左-右雙向箭號 5"/>
+          <p:cNvSpPr/>
+          <p:nvPr/>
+        </p:nvSpPr>
+        <p:spPr>
+          <a:xfrm>
+            <a:off x="4107350" y="2904977"/>
+            <a:ext cx="659723" cy="218049"/>
+          </a:xfrm>
+          <a:prstGeom prst="leftRightArrow">
+            <a:avLst/>
+          </a:prstGeom>
+          <a:noFill/>
+          <a:ln>
+            <a:solidFill>
+              <a:srgbClr val="FF0000"/>
+            </a:solidFill>
+          </a:ln>
+        </p:spPr>
+        <p:style>
+          <a:lnRef idx="2">
+            <a:schemeClr val="accent1">
+              <a:shade val="50000"/>
+            </a:schemeClr>
+          </a:lnRef>
+          <a:fillRef idx="1">
+            <a:schemeClr val="accent1"/>
+          </a:fillRef>
+          <a:effectRef idx="0">
+            <a:schemeClr val="accent1"/>
+          </a:effectRef>
+          <a:fontRef idx="minor">
+            <a:schemeClr val="lt1"/>
+          </a:fontRef>
+        </p:style>
+        <p:txBody>
+          <a:bodyPr rtlCol="0" anchor="ctr"/>
+          <a:lstStyle/>
+          <a:p>
+            <a:pPr algn="ctr"/>
+            <a:endParaRPr lang="zh-TW" altLang="en-US"/>
+          </a:p>
+        </p:txBody>
+      </p:sp>
+      <p:pic>
+        <p:nvPicPr>
+          <p:cNvPr id="5131" name="Picture 11" descr="D:\Users\ZL.chen\Desktop\1580886655970.jpg"/>
+          <p:cNvPicPr>
+            <a:picLocks noChangeAspect="1" noChangeArrowheads="1"/>
+          </p:cNvPicPr>
+          <p:nvPr/>
+        </p:nvPicPr>
+        <p:blipFill>
+          <a:blip r:embed="rId7" cstate="print">
+            <a:extLst>
+              <a:ext uri="{28A0092B-C50C-407E-A947-70E740481C1C}">
+                <a14:useLocalDpi xmlns:a14="http://schemas.microsoft.com/office/drawing/2010/main" val="0"/>
+              </a:ext>
+            </a:extLst>
+          </a:blip>
+          <a:srcRect/>
+          <a:stretch>
+            <a:fillRect/>
+          </a:stretch>
+        </p:blipFill>
+        <p:spPr bwMode="auto">
+          <a:xfrm>
+            <a:off x="4799620" y="1392699"/>
+            <a:ext cx="3242300" cy="3330611"/>
+          </a:xfrm>
+          <a:prstGeom prst="rect">
+            <a:avLst/>
+          </a:prstGeom>
+          <a:noFill/>
+          <a:extLst>
+            <a:ext uri="{909E8E84-426E-40DD-AFC4-6F175D3DCCD1}">
+              <a14:hiddenFill xmlns:a14="http://schemas.microsoft.com/office/drawing/2010/main">
+                <a:solidFill>
+                  <a:srgbClr val="FFFFFF"/>
+                </a:solidFill>
+              </a14:hiddenFill>
+            </a:ext>
+          </a:extLst>
+        </p:spPr>
+      </p:pic>
+      <p:sp>
+        <p:nvSpPr>
+          <p:cNvPr id="7" name="矩形 6"/>
+          <p:cNvSpPr/>
+          <p:nvPr/>
+        </p:nvSpPr>
+        <p:spPr>
+          <a:xfrm>
+            <a:off x="2479222" y="2539218"/>
+            <a:ext cx="256943" cy="130126"/>
+          </a:xfrm>
+          <a:prstGeom prst="rect">
+            <a:avLst/>
+          </a:prstGeom>
+          <a:noFill/>
+          <a:ln>
+            <a:solidFill>
+              <a:srgbClr val="FF0000"/>
+            </a:solidFill>
+          </a:ln>
+        </p:spPr>
+        <p:style>
+          <a:lnRef idx="2">
+            <a:schemeClr val="accent1">
+              <a:shade val="50000"/>
+            </a:schemeClr>
+          </a:lnRef>
+          <a:fillRef idx="1">
+            <a:schemeClr val="accent1"/>
+          </a:fillRef>
+          <a:effectRef idx="0">
+            <a:schemeClr val="accent1"/>
+          </a:effectRef>
+          <a:fontRef idx="minor">
+            <a:schemeClr val="lt1"/>
+          </a:fontRef>
+        </p:style>
+        <p:txBody>
+          <a:bodyPr rtlCol="0" anchor="ctr"/>
+          <a:lstStyle/>
+          <a:p>
+            <a:pPr algn="ctr"/>
+            <a:endParaRPr lang="zh-TW" altLang="en-US"/>
+          </a:p>
+        </p:txBody>
+      </p:sp>
+      <p:sp>
+        <p:nvSpPr>
+          <p:cNvPr id="16" name="矩形 15"/>
+          <p:cNvSpPr/>
+          <p:nvPr/>
+        </p:nvSpPr>
+        <p:spPr>
+          <a:xfrm>
+            <a:off x="6399668" y="2538045"/>
+            <a:ext cx="256943" cy="130126"/>
+          </a:xfrm>
+          <a:prstGeom prst="rect">
+            <a:avLst/>
+          </a:prstGeom>
+          <a:noFill/>
+          <a:ln>
+            <a:solidFill>
+              <a:srgbClr val="FF0000"/>
+            </a:solidFill>
+          </a:ln>
+        </p:spPr>
+        <p:style>
+          <a:lnRef idx="2">
+            <a:schemeClr val="accent1">
+              <a:shade val="50000"/>
+            </a:schemeClr>
+          </a:lnRef>
+          <a:fillRef idx="1">
+            <a:schemeClr val="accent1"/>
+          </a:fillRef>
+          <a:effectRef idx="0">
+            <a:schemeClr val="accent1"/>
+          </a:effectRef>
+          <a:fontRef idx="minor">
+            <a:schemeClr val="lt1"/>
+          </a:fontRef>
+        </p:style>
+        <p:txBody>
+          <a:bodyPr rtlCol="0" anchor="ctr"/>
+          <a:lstStyle/>
+          <a:p>
+            <a:pPr algn="ctr"/>
+            <a:endParaRPr lang="zh-TW" altLang="en-US"/>
+          </a:p>
+        </p:txBody>
+      </p:sp>
+    </p:spTree>
+    <p:extLst>
+      <p:ext uri="{BB962C8B-B14F-4D97-AF65-F5344CB8AC3E}">
+        <p14:creationId xmlns:p14="http://schemas.microsoft.com/office/powerpoint/2010/main" val="1816013237"/>
+      </p:ext>
+    </p:extLst>
+  </p:cSld>
+  <p:clrMapOvr>
+    <a:masterClrMapping/>
+  </p:clrMapOvr>
+  <mc:AlternateContent xmlns:mc="http://schemas.openxmlformats.org/markup-compatibility/2006" xmlns:p14="http://schemas.microsoft.com/office/powerpoint/2010/main">
+    <mc:Choice Requires="p14">
+      <p:transition spd="med" p14:dur="700" advClick="0">
+        <p:fade/>
+      </p:transition>
+    </mc:Choice>
+    <mc:Fallback xmlns="">
+      <p:transition spd="med" advClick="0">
+        <p:fade/>
+      </p:transition>
+    </mc:Fallback>
+  </mc:AlternateContent>
+  <p:timing>
+    <p:tnLst>
+      <p:par>
+        <p:cTn id="1" dur="indefinite" restart="never" nodeType="tmRoot">
+          <p:childTnLst>
+            <p:seq concurrent="1" nextAc="seek">
+              <p:cTn id="2" dur="indefinite" nodeType="mainSeq">
+                <p:childTnLst>
+                  <p:par>
+                    <p:cTn id="3" fill="hold">
+                      <p:stCondLst>
+                        <p:cond delay="indefinite"/>
+                        <p:cond evt="onBegin" delay="0">
+                          <p:tn val="2"/>
+                        </p:cond>
+                      </p:stCondLst>
+                      <p:childTnLst>
+                        <p:par>
+                          <p:cTn id="4" fill="hold">
+                            <p:stCondLst>
+                              <p:cond delay="0"/>
+                            </p:stCondLst>
+                            <p:childTnLst>
+                              <p:par>
+                                <p:cTn id="5" presetID="10" presetClass="entr" presetSubtype="0" fill="hold" grpId="0" nodeType="afterEffect">
+                                  <p:stCondLst>
+                                    <p:cond delay="0"/>
+                                  </p:stCondLst>
+                                  <p:childTnLst>
+                                    <p:set>
+                                      <p:cBhvr>
+                                        <p:cTn id="6" dur="1" fill="hold">
+                                          <p:stCondLst>
+                                            <p:cond delay="0"/>
+                                          </p:stCondLst>
+                                        </p:cTn>
+                                        <p:tgtEl>
+                                          <p:spTgt spid="2"/>
+                                        </p:tgtEl>
+                                        <p:attrNameLst>
+                                          <p:attrName>style.visibility</p:attrName>
+                                        </p:attrNameLst>
+                                      </p:cBhvr>
+                                      <p:to>
+                                        <p:strVal val="visible"/>
+                                      </p:to>
+                                    </p:set>
+                                    <p:animEffect transition="in" filter="fade">
+                                      <p:cBhvr>
+                                        <p:cTn id="7" dur="250"/>
+                                        <p:tgtEl>
+                                          <p:spTgt spid="2"/>
+                                        </p:tgtEl>
+                                      </p:cBhvr>
+                                    </p:animEffect>
+                                  </p:childTnLst>
+                                </p:cTn>
+                              </p:par>
+                            </p:childTnLst>
+                          </p:cTn>
+                        </p:par>
+                        <p:par>
+                          <p:cTn id="8" fill="hold">
+                            <p:stCondLst>
+                              <p:cond delay="250"/>
+                            </p:stCondLst>
+                            <p:childTnLst>
+                              <p:par>
+                                <p:cTn id="9" presetID="10" presetClass="entr" presetSubtype="0" fill="hold" nodeType="afterEffect">
+                                  <p:stCondLst>
+                                    <p:cond delay="0"/>
+                                  </p:stCondLst>
+                                  <p:childTnLst>
+                                    <p:set>
+                                      <p:cBhvr>
+                                        <p:cTn id="10" dur="1" fill="hold">
+                                          <p:stCondLst>
+                                            <p:cond delay="0"/>
+                                          </p:stCondLst>
+                                        </p:cTn>
+                                        <p:tgtEl>
+                                          <p:spTgt spid="15362">
+                                            <p:txEl>
+                                              <p:pRg st="0" end="0"/>
+                                            </p:txEl>
+                                          </p:spTgt>
+                                        </p:tgtEl>
+                                        <p:attrNameLst>
+                                          <p:attrName>style.visibility</p:attrName>
+                                        </p:attrNameLst>
+                                      </p:cBhvr>
+                                      <p:to>
+                                        <p:strVal val="visible"/>
+                                      </p:to>
+                                    </p:set>
+                                    <p:animEffect transition="in" filter="fade">
+                                      <p:cBhvr>
+                                        <p:cTn id="11" dur="250"/>
+                                        <p:tgtEl>
+                                          <p:spTgt spid="15362">
+                                            <p:txEl>
+                                              <p:pRg st="0" end="0"/>
+                                            </p:txEl>
+                                          </p:spTgt>
+                                        </p:tgtEl>
+                                      </p:cBhvr>
+                                    </p:animEffect>
+                                  </p:childTnLst>
+                                </p:cTn>
+                              </p:par>
+                              <p:par>
+                                <p:cTn id="12" presetID="10" presetClass="entr" presetSubtype="0" fill="hold" grpId="0" nodeType="withEffect">
+                                  <p:stCondLst>
+                                    <p:cond delay="0"/>
+                                  </p:stCondLst>
+                                  <p:childTnLst>
+                                    <p:set>
+                                      <p:cBhvr>
+                                        <p:cTn id="13" dur="1" fill="hold">
+                                          <p:stCondLst>
+                                            <p:cond delay="0"/>
+                                          </p:stCondLst>
+                                        </p:cTn>
+                                        <p:tgtEl>
+                                          <p:spTgt spid="7"/>
+                                        </p:tgtEl>
+                                        <p:attrNameLst>
+                                          <p:attrName>style.visibility</p:attrName>
+                                        </p:attrNameLst>
+                                      </p:cBhvr>
+                                      <p:to>
+                                        <p:strVal val="visible"/>
+                                      </p:to>
+                                    </p:set>
+                                    <p:animEffect transition="in" filter="fade">
+                                      <p:cBhvr>
+                                        <p:cTn id="14" dur="250"/>
+                                        <p:tgtEl>
+                                          <p:spTgt spid="7"/>
+                                        </p:tgtEl>
+                                      </p:cBhvr>
+                                    </p:animEffect>
+                                  </p:childTnLst>
+                                </p:cTn>
+                              </p:par>
+                              <p:par>
+                                <p:cTn id="15" presetID="10" presetClass="entr" presetSubtype="0" fill="hold" grpId="0" nodeType="withEffect">
+                                  <p:stCondLst>
+                                    <p:cond delay="0"/>
+                                  </p:stCondLst>
+                                  <p:childTnLst>
+                                    <p:set>
+                                      <p:cBhvr>
+                                        <p:cTn id="16" dur="1" fill="hold">
+                                          <p:stCondLst>
+                                            <p:cond delay="0"/>
+                                          </p:stCondLst>
+                                        </p:cTn>
+                                        <p:tgtEl>
+                                          <p:spTgt spid="16"/>
+                                        </p:tgtEl>
+                                        <p:attrNameLst>
+                                          <p:attrName>style.visibility</p:attrName>
+                                        </p:attrNameLst>
+                                      </p:cBhvr>
+                                      <p:to>
+                                        <p:strVal val="visible"/>
+                                      </p:to>
+                                    </p:set>
+                                    <p:animEffect transition="in" filter="fade">
+                                      <p:cBhvr>
+                                        <p:cTn id="17" dur="250"/>
+                                        <p:tgtEl>
+                                          <p:spTgt spid="16"/>
+                                        </p:tgtEl>
+                                      </p:cBhvr>
+                                    </p:animEffect>
+                                  </p:childTnLst>
+                                </p:cTn>
+                              </p:par>
+                              <p:par>
+                                <p:cTn id="18" presetID="10" presetClass="entr" presetSubtype="0" fill="hold" nodeType="withEffect">
+                                  <p:stCondLst>
+                                    <p:cond delay="0"/>
+                                  </p:stCondLst>
+                                  <p:childTnLst>
+                                    <p:set>
+                                      <p:cBhvr>
+                                        <p:cTn id="19" dur="1" fill="hold">
+                                          <p:stCondLst>
+                                            <p:cond delay="0"/>
+                                          </p:stCondLst>
+                                        </p:cTn>
+                                        <p:tgtEl>
+                                          <p:spTgt spid="5131"/>
+                                        </p:tgtEl>
+                                        <p:attrNameLst>
+                                          <p:attrName>style.visibility</p:attrName>
+                                        </p:attrNameLst>
+                                      </p:cBhvr>
+                                      <p:to>
+                                        <p:strVal val="visible"/>
+                                      </p:to>
+                                    </p:set>
+                                    <p:animEffect transition="in" filter="fade">
+                                      <p:cBhvr>
+                                        <p:cTn id="20" dur="250"/>
+                                        <p:tgtEl>
+                                          <p:spTgt spid="5131"/>
+                                        </p:tgtEl>
+                                      </p:cBhvr>
+                                    </p:animEffect>
+                                  </p:childTnLst>
+                                </p:cTn>
+                              </p:par>
+                              <p:par>
+                                <p:cTn id="21" presetID="10" presetClass="entr" presetSubtype="0" fill="hold" nodeType="withEffect">
+                                  <p:stCondLst>
+                                    <p:cond delay="0"/>
+                                  </p:stCondLst>
+                                  <p:childTnLst>
+                                    <p:set>
+                                      <p:cBhvr>
+                                        <p:cTn id="22" dur="1" fill="hold">
+                                          <p:stCondLst>
+                                            <p:cond delay="0"/>
+                                          </p:stCondLst>
+                                        </p:cTn>
+                                        <p:tgtEl>
+                                          <p:spTgt spid="5129"/>
+                                        </p:tgtEl>
+                                        <p:attrNameLst>
+                                          <p:attrName>style.visibility</p:attrName>
+                                        </p:attrNameLst>
+                                      </p:cBhvr>
+                                      <p:to>
+                                        <p:strVal val="visible"/>
+                                      </p:to>
+                                    </p:set>
+                                    <p:animEffect transition="in" filter="fade">
+                                      <p:cBhvr>
+                                        <p:cTn id="23" dur="250"/>
+                                        <p:tgtEl>
+                                          <p:spTgt spid="5129"/>
+                                        </p:tgtEl>
+                                      </p:cBhvr>
+                                    </p:animEffect>
+                                  </p:childTnLst>
+                                </p:cTn>
+                              </p:par>
+                              <p:par>
+                                <p:cTn id="24" presetID="10" presetClass="entr" presetSubtype="0" fill="hold" grpId="0" nodeType="withEffect">
+                                  <p:stCondLst>
+                                    <p:cond delay="0"/>
+                                  </p:stCondLst>
+                                  <p:childTnLst>
+                                    <p:set>
+                                      <p:cBhvr>
+                                        <p:cTn id="25" dur="1" fill="hold">
+                                          <p:stCondLst>
+                                            <p:cond delay="0"/>
+                                          </p:stCondLst>
+                                        </p:cTn>
+                                        <p:tgtEl>
+                                          <p:spTgt spid="6"/>
+                                        </p:tgtEl>
+                                        <p:attrNameLst>
+                                          <p:attrName>style.visibility</p:attrName>
+                                        </p:attrNameLst>
+                                      </p:cBhvr>
+                                      <p:to>
+                                        <p:strVal val="visible"/>
+                                      </p:to>
+                                    </p:set>
+                                    <p:animEffect transition="in" filter="fade">
+                                      <p:cBhvr>
+                                        <p:cTn id="26" dur="250"/>
+                                        <p:tgtEl>
+                                          <p:spTgt spid="6"/>
+                                        </p:tgtEl>
+                                      </p:cBhvr>
+                                    </p:animEffect>
+                                  </p:childTnLst>
+                                </p:cTn>
+                              </p:par>
+                              <p:par>
+                                <p:cTn id="27" presetID="10" presetClass="entr" presetSubtype="0" fill="hold" nodeType="withEffect">
+                                  <p:stCondLst>
+                                    <p:cond delay="0"/>
+                                  </p:stCondLst>
+                                  <p:childTnLst>
+                                    <p:set>
+                                      <p:cBhvr>
+                                        <p:cTn id="28" dur="1" fill="hold">
+                                          <p:stCondLst>
+                                            <p:cond delay="0"/>
+                                          </p:stCondLst>
+                                        </p:cTn>
+                                        <p:tgtEl>
+                                          <p:spTgt spid="3"/>
+                                        </p:tgtEl>
+                                        <p:attrNameLst>
+                                          <p:attrName>style.visibility</p:attrName>
+                                        </p:attrNameLst>
+                                      </p:cBhvr>
+                                      <p:to>
+                                        <p:strVal val="visible"/>
+                                      </p:to>
+                                    </p:set>
+                                    <p:animEffect transition="in" filter="fade">
+                                      <p:cBhvr>
+                                        <p:cTn id="29" dur="250"/>
+                                        <p:tgtEl>
+                                          <p:spTgt spid="3"/>
+                                        </p:tgtEl>
+                                      </p:cBhvr>
+                                    </p:animEffect>
+                                  </p:childTnLst>
+                                </p:cTn>
+                              </p:par>
+                            </p:childTnLst>
+                          </p:cTn>
+                        </p:par>
+                      </p:childTnLst>
+                    </p:cTn>
+                  </p:par>
+                </p:childTnLst>
+              </p:cTn>
+              <p:prevCondLst>
+                <p:cond evt="onPrev" delay="0">
+                  <p:tgtEl>
+                    <p:sldTgt/>
+                  </p:tgtEl>
+                </p:cond>
+              </p:prevCondLst>
+              <p:nextCondLst>
+                <p:cond evt="onNext" delay="0">
+                  <p:tgtEl>
+                    <p:sldTgt/>
+                  </p:tgtEl>
+                </p:cond>
+              </p:nextCondLst>
+            </p:seq>
+          </p:childTnLst>
+        </p:cTn>
+      </p:par>
+    </p:tnLst>
+    <p:bldLst>
+      <p:bldP spid="2" grpId="0"/>
+      <p:bldP spid="6" grpId="0" animBg="1"/>
+      <p:bldP spid="7" grpId="0" animBg="1"/>
+      <p:bldP spid="16" grpId="0" animBg="1"/>
+    </p:bldLst>
+  </p:timing>
+</p:sld>
+</file>
+
+<file path=ppt/slides/slide16.xml><?xml version="1.0" encoding="utf-8"?>
+<p:sld xmlns:a="http://schemas.openxmlformats.org/drawingml/2006/main" xmlns:r="http://schemas.openxmlformats.org/officeDocument/2006/relationships" xmlns:p="http://schemas.openxmlformats.org/presentationml/2006/main">
+  <p:cSld>
+    <p:spTree>
+      <p:nvGrpSpPr>
+        <p:cNvPr id="1" name=""/>
+        <p:cNvGrpSpPr/>
+        <p:nvPr/>
+      </p:nvGrpSpPr>
+      <p:grpSpPr>
+        <a:xfrm>
+          <a:off x="0" y="0"/>
+          <a:ext cx="0" cy="0"/>
+          <a:chOff x="0" y="0"/>
+          <a:chExt cx="0" cy="0"/>
+        </a:xfrm>
+      </p:grpSpPr>
+      <p:sp>
+        <p:nvSpPr>
+          <p:cNvPr id="15362" name="內容版面配置區 5"/>
+          <p:cNvSpPr>
+            <a:spLocks noGrp="1"/>
+          </p:cNvSpPr>
+          <p:nvPr>
+            <p:ph idx="1"/>
+          </p:nvPr>
+        </p:nvSpPr>
+        <p:spPr>
+          <a:xfrm>
+            <a:off x="457200" y="936625"/>
+            <a:ext cx="8229600" cy="3575050"/>
+          </a:xfrm>
+        </p:spPr>
+        <p:txBody>
+          <a:bodyPr/>
+          <a:lstStyle/>
+          <a:p>
+            <a:pPr eaLnBrk="1" hangingPunct="1">
+              <a:buFont typeface="Arial" charset="0"/>
+              <a:buChar char="•"/>
+              <a:defRPr/>
+            </a:pPr>
+            <a:r>
+              <a:rPr lang="zh-TW" altLang="en-US" sz="1800" dirty="0">
+                <a:latin typeface="Times New Roman" panose="02020603050405020304" pitchFamily="18" charset="0"/>
+                <a:cs typeface="Times New Roman" panose="02020603050405020304" pitchFamily="18" charset="0"/>
+              </a:rPr>
+              <a:t>結論</a:t>
+            </a:r>
+            <a:endParaRPr lang="en-US" altLang="zh-TW" sz="1800" dirty="0">
+              <a:latin typeface="Times New Roman" panose="02020603050405020304" pitchFamily="18" charset="0"/>
+              <a:cs typeface="Times New Roman" panose="02020603050405020304" pitchFamily="18" charset="0"/>
+            </a:endParaRPr>
+          </a:p>
+          <a:p>
+            <a:pPr lvl="1" eaLnBrk="1" hangingPunct="1">
+              <a:buFont typeface="Arial" charset="0"/>
+              <a:buChar char="•"/>
+              <a:defRPr/>
+            </a:pPr>
+            <a:r>
+              <a:rPr lang="zh-TW" altLang="en-US" sz="1400" dirty="0">
+                <a:latin typeface="Times New Roman" panose="02020603050405020304" pitchFamily="18" charset="0"/>
+                <a:cs typeface="Times New Roman" panose="02020603050405020304" pitchFamily="18" charset="0"/>
+              </a:rPr>
+              <a:t>針對 </a:t>
+            </a:r>
+            <a:r>
+              <a:rPr lang="en-US" altLang="zh-TW" sz="1400" dirty="0">
+                <a:latin typeface="Times New Roman" panose="02020603050405020304" pitchFamily="18" charset="0"/>
+                <a:cs typeface="Times New Roman" panose="02020603050405020304" pitchFamily="18" charset="0"/>
+              </a:rPr>
+              <a:t>Wi-Fi Mode </a:t>
+            </a:r>
+            <a:r>
+              <a:rPr lang="zh-TW" altLang="en-US" sz="1400" dirty="0">
+                <a:latin typeface="Times New Roman" panose="02020603050405020304" pitchFamily="18" charset="0"/>
+                <a:cs typeface="Times New Roman" panose="02020603050405020304" pitchFamily="18" charset="0"/>
+              </a:rPr>
+              <a:t>中的 </a:t>
+            </a:r>
+            <a:r>
+              <a:rPr lang="en-US" altLang="zh-TW" sz="1400" dirty="0" smtClean="0">
+                <a:latin typeface="Times New Roman" panose="02020603050405020304" pitchFamily="18" charset="0"/>
+                <a:cs typeface="Times New Roman" panose="02020603050405020304" pitchFamily="18" charset="0"/>
+              </a:rPr>
+              <a:t>2.4</a:t>
+            </a:r>
+            <a:r>
+              <a:rPr lang="zh-TW" altLang="en-US" sz="1400" dirty="0" smtClean="0">
+                <a:latin typeface="Times New Roman" panose="02020603050405020304" pitchFamily="18" charset="0"/>
+                <a:cs typeface="Times New Roman" panose="02020603050405020304" pitchFamily="18" charset="0"/>
+              </a:rPr>
+              <a:t> </a:t>
+            </a:r>
+            <a:r>
+              <a:rPr lang="en-US" altLang="zh-TW" sz="1400" dirty="0">
+                <a:latin typeface="Times New Roman" panose="02020603050405020304" pitchFamily="18" charset="0"/>
+                <a:cs typeface="Times New Roman" panose="02020603050405020304" pitchFamily="18" charset="0"/>
+              </a:rPr>
+              <a:t>G </a:t>
+            </a:r>
+            <a:r>
+              <a:rPr lang="zh-TW" altLang="en-US" sz="1400" dirty="0" smtClean="0">
+                <a:latin typeface="Times New Roman" panose="02020603050405020304" pitchFamily="18" charset="0"/>
+                <a:cs typeface="Times New Roman" panose="02020603050405020304" pitchFamily="18" charset="0"/>
+              </a:rPr>
+              <a:t>中的 </a:t>
+            </a:r>
+            <a:r>
+              <a:rPr lang="en-US" altLang="zh-TW" sz="1400" dirty="0" smtClean="0">
+                <a:latin typeface="Times New Roman" panose="02020603050405020304" pitchFamily="18" charset="0"/>
+                <a:cs typeface="Times New Roman" panose="02020603050405020304" pitchFamily="18" charset="0"/>
+              </a:rPr>
+              <a:t>N Only, Legacy </a:t>
+            </a:r>
+            <a:r>
+              <a:rPr lang="zh-TW" altLang="en-US" sz="1400" dirty="0" smtClean="0">
+                <a:latin typeface="Times New Roman" panose="02020603050405020304" pitchFamily="18" charset="0"/>
+                <a:cs typeface="Times New Roman" panose="02020603050405020304" pitchFamily="18" charset="0"/>
+              </a:rPr>
+              <a:t>相互切換</a:t>
+            </a:r>
+            <a:endParaRPr lang="en-US" altLang="zh-TW" sz="1400" dirty="0" smtClean="0">
+              <a:latin typeface="Times New Roman" panose="02020603050405020304" pitchFamily="18" charset="0"/>
+              <a:cs typeface="Times New Roman" panose="02020603050405020304" pitchFamily="18" charset="0"/>
+            </a:endParaRPr>
+          </a:p>
+          <a:p>
+            <a:pPr lvl="1" eaLnBrk="1" hangingPunct="1">
+              <a:buFont typeface="Arial" charset="0"/>
+              <a:buChar char="•"/>
+              <a:defRPr/>
+            </a:pPr>
+            <a:r>
+              <a:rPr lang="zh-TW" altLang="en-US" sz="1400" dirty="0">
+                <a:latin typeface="Times New Roman" panose="02020603050405020304" pitchFamily="18" charset="0"/>
+                <a:cs typeface="Times New Roman" panose="02020603050405020304" pitchFamily="18" charset="0"/>
+              </a:rPr>
+              <a:t>針對 </a:t>
+            </a:r>
+            <a:r>
+              <a:rPr lang="en-US" altLang="zh-TW" sz="1400" dirty="0">
+                <a:latin typeface="Times New Roman" panose="02020603050405020304" pitchFamily="18" charset="0"/>
+                <a:cs typeface="Times New Roman" panose="02020603050405020304" pitchFamily="18" charset="0"/>
+              </a:rPr>
+              <a:t>Wi-Fi Mode </a:t>
+            </a:r>
+            <a:r>
+              <a:rPr lang="zh-TW" altLang="en-US" sz="1400" dirty="0">
+                <a:latin typeface="Times New Roman" panose="02020603050405020304" pitchFamily="18" charset="0"/>
+                <a:cs typeface="Times New Roman" panose="02020603050405020304" pitchFamily="18" charset="0"/>
+              </a:rPr>
+              <a:t>中的 </a:t>
+            </a:r>
+            <a:r>
+              <a:rPr lang="en-US" altLang="zh-TW" sz="1400" dirty="0" smtClean="0">
+                <a:latin typeface="Times New Roman" panose="02020603050405020304" pitchFamily="18" charset="0"/>
+                <a:cs typeface="Times New Roman" panose="02020603050405020304" pitchFamily="18" charset="0"/>
+              </a:rPr>
+              <a:t>5 G </a:t>
+            </a:r>
+            <a:r>
+              <a:rPr lang="zh-TW" altLang="en-US" sz="1400" dirty="0">
+                <a:latin typeface="Times New Roman" panose="02020603050405020304" pitchFamily="18" charset="0"/>
+                <a:cs typeface="Times New Roman" panose="02020603050405020304" pitchFamily="18" charset="0"/>
+              </a:rPr>
+              <a:t>中的 </a:t>
+            </a:r>
+            <a:r>
+              <a:rPr lang="en-US" altLang="zh-TW" sz="1400" dirty="0">
+                <a:latin typeface="Times New Roman" panose="02020603050405020304" pitchFamily="18" charset="0"/>
+                <a:cs typeface="Times New Roman" panose="02020603050405020304" pitchFamily="18" charset="0"/>
+              </a:rPr>
+              <a:t>N/AC mixed, Legacy </a:t>
+            </a:r>
+            <a:r>
+              <a:rPr lang="zh-TW" altLang="en-US" sz="1400" dirty="0">
+                <a:latin typeface="Times New Roman" panose="02020603050405020304" pitchFamily="18" charset="0"/>
+                <a:cs typeface="Times New Roman" panose="02020603050405020304" pitchFamily="18" charset="0"/>
+              </a:rPr>
+              <a:t>相互</a:t>
+            </a:r>
+            <a:r>
+              <a:rPr lang="zh-TW" altLang="en-US" sz="1400" dirty="0" smtClean="0">
+                <a:latin typeface="Times New Roman" panose="02020603050405020304" pitchFamily="18" charset="0"/>
+                <a:cs typeface="Times New Roman" panose="02020603050405020304" pitchFamily="18" charset="0"/>
+              </a:rPr>
+              <a:t>切換</a:t>
+            </a:r>
+            <a:endParaRPr lang="en-US" altLang="zh-TW" sz="1400" dirty="0">
+              <a:latin typeface="Times New Roman" panose="02020603050405020304" pitchFamily="18" charset="0"/>
+              <a:cs typeface="Times New Roman" panose="02020603050405020304" pitchFamily="18" charset="0"/>
+            </a:endParaRPr>
+          </a:p>
+          <a:p>
+            <a:pPr lvl="1" eaLnBrk="1" hangingPunct="1">
+              <a:buFont typeface="Arial" charset="0"/>
+              <a:buChar char="•"/>
+              <a:defRPr/>
+            </a:pPr>
+            <a:r>
+              <a:rPr lang="zh-TW" altLang="en-US" sz="1400" dirty="0">
+                <a:latin typeface="Times New Roman" panose="02020603050405020304" pitchFamily="18" charset="0"/>
+                <a:cs typeface="Times New Roman" panose="02020603050405020304" pitchFamily="18" charset="0"/>
+              </a:rPr>
+              <a:t>長時間做 </a:t>
+            </a:r>
+            <a:r>
+              <a:rPr lang="en-US" altLang="zh-TW" sz="1400" dirty="0">
+                <a:latin typeface="Times New Roman" panose="02020603050405020304" pitchFamily="18" charset="0"/>
+                <a:cs typeface="Times New Roman" panose="02020603050405020304" pitchFamily="18" charset="0"/>
+              </a:rPr>
+              <a:t>2.4 G </a:t>
+            </a:r>
+            <a:r>
+              <a:rPr lang="zh-TW" altLang="en-US" sz="1400" dirty="0">
+                <a:latin typeface="Times New Roman" panose="02020603050405020304" pitchFamily="18" charset="0"/>
+                <a:cs typeface="Times New Roman" panose="02020603050405020304" pitchFamily="18" charset="0"/>
+              </a:rPr>
+              <a:t>及 </a:t>
+            </a:r>
+            <a:r>
+              <a:rPr lang="en-US" altLang="zh-TW" sz="1400" dirty="0">
+                <a:latin typeface="Times New Roman" panose="02020603050405020304" pitchFamily="18" charset="0"/>
+                <a:cs typeface="Times New Roman" panose="02020603050405020304" pitchFamily="18" charset="0"/>
+              </a:rPr>
+              <a:t>5</a:t>
+            </a:r>
+            <a:r>
+              <a:rPr lang="zh-TW" altLang="en-US" sz="1400" dirty="0">
+                <a:latin typeface="Times New Roman" panose="02020603050405020304" pitchFamily="18" charset="0"/>
+                <a:cs typeface="Times New Roman" panose="02020603050405020304" pitchFamily="18" charset="0"/>
+              </a:rPr>
+              <a:t> </a:t>
+            </a:r>
+            <a:r>
+              <a:rPr lang="en-US" altLang="zh-TW" sz="1400" dirty="0">
+                <a:latin typeface="Times New Roman" panose="02020603050405020304" pitchFamily="18" charset="0"/>
+                <a:cs typeface="Times New Roman" panose="02020603050405020304" pitchFamily="18" charset="0"/>
+              </a:rPr>
+              <a:t>G </a:t>
+            </a:r>
+            <a:r>
+              <a:rPr lang="zh-TW" altLang="en-US" sz="1400" dirty="0">
+                <a:latin typeface="Times New Roman" panose="02020603050405020304" pitchFamily="18" charset="0"/>
+                <a:cs typeface="Times New Roman" panose="02020603050405020304" pitchFamily="18" charset="0"/>
+              </a:rPr>
+              <a:t>之壓力測試</a:t>
+            </a:r>
+            <a:endParaRPr lang="en-US" altLang="zh-TW" sz="1400" dirty="0">
+              <a:latin typeface="Times New Roman" panose="02020603050405020304" pitchFamily="18" charset="0"/>
+              <a:cs typeface="Times New Roman" panose="02020603050405020304" pitchFamily="18" charset="0"/>
+            </a:endParaRPr>
+          </a:p>
+          <a:p>
             <a:pPr marL="342900" lvl="1" indent="-342900" eaLnBrk="1" hangingPunct="1">
               <a:buFont typeface="Arial" charset="0"/>
               <a:buChar char="•"/>
               <a:defRPr/>
             </a:pPr>
-            <a:r>
-              <a:rPr lang="en-US" altLang="zh-TW" sz="1800" dirty="0">
-                <a:latin typeface="Times New Roman" panose="02020603050405020304" pitchFamily="18" charset="0"/>
-                <a:cs typeface="Times New Roman" panose="02020603050405020304" pitchFamily="18" charset="0"/>
-              </a:rPr>
-              <a:t>Conclusion</a:t>
-            </a:r>
+            <a:endParaRPr lang="en-US" altLang="zh-TW" sz="1800" dirty="0">
+              <a:latin typeface="Times New Roman" panose="02020603050405020304" pitchFamily="18" charset="0"/>
+              <a:cs typeface="Times New Roman" panose="02020603050405020304" pitchFamily="18" charset="0"/>
+            </a:endParaRPr>
           </a:p>
           <a:p>
             <a:pPr eaLnBrk="1" hangingPunct="1">
@@ -10110,316 +11345,6 @@
                             </p:childTnLst>
                           </p:cTn>
                         </p:par>
-                      </p:childTnLst>
-                    </p:cTn>
-                  </p:par>
-                </p:childTnLst>
-              </p:cTn>
-              <p:prevCondLst>
-                <p:cond evt="onPrev" delay="0">
-                  <p:tgtEl>
-                    <p:sldTgt/>
-                  </p:tgtEl>
-                </p:cond>
-              </p:prevCondLst>
-              <p:nextCondLst>
-                <p:cond evt="onNext" delay="0">
-                  <p:tgtEl>
-                    <p:sldTgt/>
-                  </p:tgtEl>
-                </p:cond>
-              </p:nextCondLst>
-            </p:seq>
-          </p:childTnLst>
-        </p:cTn>
-      </p:par>
-    </p:tnLst>
-    <p:bldLst>
-      <p:bldP spid="2" grpId="0"/>
-    </p:bldLst>
-  </p:timing>
-</p:sld>
-</file>
-
-<file path=ppt/slides/slide16.xml><?xml version="1.0" encoding="utf-8"?>
-<p:sld xmlns:a="http://schemas.openxmlformats.org/drawingml/2006/main" xmlns:r="http://schemas.openxmlformats.org/officeDocument/2006/relationships" xmlns:p="http://schemas.openxmlformats.org/presentationml/2006/main">
-  <p:cSld>
-    <p:spTree>
-      <p:nvGrpSpPr>
-        <p:cNvPr id="1" name=""/>
-        <p:cNvGrpSpPr/>
-        <p:nvPr/>
-      </p:nvGrpSpPr>
-      <p:grpSpPr>
-        <a:xfrm>
-          <a:off x="0" y="0"/>
-          <a:ext cx="0" cy="0"/>
-          <a:chOff x="0" y="0"/>
-          <a:chExt cx="0" cy="0"/>
-        </a:xfrm>
-      </p:grpSpPr>
-      <p:sp>
-        <p:nvSpPr>
-          <p:cNvPr id="15362" name="內容版面配置區 5"/>
-          <p:cNvSpPr>
-            <a:spLocks noGrp="1"/>
-          </p:cNvSpPr>
-          <p:nvPr>
-            <p:ph idx="1"/>
-          </p:nvPr>
-        </p:nvSpPr>
-        <p:spPr>
-          <a:xfrm>
-            <a:off x="457200" y="936625"/>
-            <a:ext cx="8229600" cy="3575050"/>
-          </a:xfrm>
-        </p:spPr>
-        <p:txBody>
-          <a:bodyPr/>
-          <a:lstStyle/>
-          <a:p>
-            <a:pPr marL="342900" lvl="1" indent="-342900" eaLnBrk="1" hangingPunct="1">
-              <a:buFont typeface="Arial" charset="0"/>
-              <a:buChar char="•"/>
-              <a:defRPr/>
-            </a:pPr>
-            <a:r>
-              <a:rPr lang="en-US" altLang="zh-TW" sz="1800" dirty="0">
-                <a:latin typeface="Times New Roman" panose="02020603050405020304" pitchFamily="18" charset="0"/>
-                <a:cs typeface="Times New Roman" panose="02020603050405020304" pitchFamily="18" charset="0"/>
-              </a:rPr>
-              <a:t>Android 6.0.1 (RJ-45), Android 6.0.1 (OTG</a:t>
-            </a:r>
-            <a:r>
-              <a:rPr lang="en-US" altLang="zh-TW" sz="1800" dirty="0" smtClean="0">
-                <a:latin typeface="Times New Roman" panose="02020603050405020304" pitchFamily="18" charset="0"/>
-                <a:cs typeface="Times New Roman" panose="02020603050405020304" pitchFamily="18" charset="0"/>
-              </a:rPr>
-              <a:t>)</a:t>
-            </a:r>
-            <a:endParaRPr lang="en-US" altLang="zh-TW" sz="1800" dirty="0">
-              <a:latin typeface="Times New Roman" panose="02020603050405020304" pitchFamily="18" charset="0"/>
-              <a:cs typeface="Times New Roman" panose="02020603050405020304" pitchFamily="18" charset="0"/>
-            </a:endParaRPr>
-          </a:p>
-          <a:p>
-            <a:pPr marL="342900" lvl="1" indent="-342900" eaLnBrk="1" hangingPunct="1">
-              <a:buFont typeface="Arial" charset="0"/>
-              <a:buChar char="•"/>
-              <a:defRPr/>
-            </a:pPr>
-            <a:r>
-              <a:rPr lang="en-US" altLang="zh-TW" sz="1800" dirty="0" smtClean="0">
-                <a:latin typeface="Times New Roman" panose="02020603050405020304" pitchFamily="18" charset="0"/>
-                <a:cs typeface="Times New Roman" panose="02020603050405020304" pitchFamily="18" charset="0"/>
-              </a:rPr>
-              <a:t>System Structure</a:t>
-            </a:r>
-            <a:endParaRPr lang="en-US" altLang="zh-TW" sz="1800" dirty="0">
-              <a:latin typeface="Times New Roman" panose="02020603050405020304" pitchFamily="18" charset="0"/>
-              <a:cs typeface="Times New Roman" panose="02020603050405020304" pitchFamily="18" charset="0"/>
-            </a:endParaRPr>
-          </a:p>
-        </p:txBody>
-      </p:sp>
-      <p:sp>
-        <p:nvSpPr>
-          <p:cNvPr id="2" name="標題 4"/>
-          <p:cNvSpPr>
-            <a:spLocks noGrp="1"/>
-          </p:cNvSpPr>
-          <p:nvPr>
-            <p:ph type="title"/>
-          </p:nvPr>
-        </p:nvSpPr>
-        <p:spPr>
-          <a:xfrm>
-            <a:off x="457200" y="87313"/>
-            <a:ext cx="8229600" cy="756000"/>
-          </a:xfrm>
-        </p:spPr>
-        <p:txBody>
-          <a:bodyPr/>
-          <a:lstStyle/>
-          <a:p>
-            <a:pPr eaLnBrk="1" hangingPunct="1">
-              <a:defRPr/>
-            </a:pPr>
-            <a:r>
-              <a:rPr lang="en-US" altLang="zh-TW" sz="2800" kern="0" dirty="0" smtClean="0">
-                <a:solidFill>
-                  <a:srgbClr val="003366"/>
-                </a:solidFill>
-                <a:latin typeface="Times New Roman" panose="02020603050405020304" pitchFamily="18" charset="0"/>
-                <a:cs typeface="Times New Roman" panose="02020603050405020304" pitchFamily="18" charset="0"/>
-              </a:rPr>
-              <a:t>Airplane </a:t>
-            </a:r>
-            <a:r>
-              <a:rPr lang="en-US" altLang="zh-TW" sz="2800" kern="0" dirty="0">
-                <a:solidFill>
-                  <a:srgbClr val="003366"/>
-                </a:solidFill>
-                <a:latin typeface="Times New Roman" panose="02020603050405020304" pitchFamily="18" charset="0"/>
-                <a:cs typeface="Times New Roman" panose="02020603050405020304" pitchFamily="18" charset="0"/>
-              </a:rPr>
-              <a:t>on/off mode </a:t>
-            </a:r>
-            <a:r>
-              <a:rPr lang="en-US" altLang="zh-TW" sz="2800" kern="0" dirty="0" smtClean="0">
-                <a:solidFill>
-                  <a:srgbClr val="003366"/>
-                </a:solidFill>
-                <a:latin typeface="Times New Roman" panose="02020603050405020304" pitchFamily="18" charset="0"/>
-                <a:cs typeface="Times New Roman" panose="02020603050405020304" pitchFamily="18" charset="0"/>
-              </a:rPr>
-              <a:t>automation</a:t>
-            </a:r>
-            <a:endParaRPr lang="zh-TW" altLang="en-US" sz="2800" kern="0" dirty="0">
-              <a:solidFill>
-                <a:srgbClr val="003366"/>
-              </a:solidFill>
-              <a:latin typeface="Times New Roman" panose="02020603050405020304" pitchFamily="18" charset="0"/>
-              <a:cs typeface="Times New Roman" panose="02020603050405020304" pitchFamily="18" charset="0"/>
-            </a:endParaRPr>
-          </a:p>
-        </p:txBody>
-      </p:sp>
-    </p:spTree>
-    <p:extLst>
-      <p:ext uri="{BB962C8B-B14F-4D97-AF65-F5344CB8AC3E}">
-        <p14:creationId xmlns:p14="http://schemas.microsoft.com/office/powerpoint/2010/main" val="3412901425"/>
-      </p:ext>
-    </p:extLst>
-  </p:cSld>
-  <p:clrMapOvr>
-    <a:masterClrMapping/>
-  </p:clrMapOvr>
-  <mc:AlternateContent xmlns:mc="http://schemas.openxmlformats.org/markup-compatibility/2006" xmlns:p14="http://schemas.microsoft.com/office/powerpoint/2010/main">
-    <mc:Choice Requires="p14">
-      <p:transition spd="med" p14:dur="700" advClick="0">
-        <p:fade/>
-      </p:transition>
-    </mc:Choice>
-    <mc:Fallback xmlns="">
-      <p:transition spd="med" advClick="0">
-        <p:fade/>
-      </p:transition>
-    </mc:Fallback>
-  </mc:AlternateContent>
-  <p:timing>
-    <p:tnLst>
-      <p:par>
-        <p:cTn id="1" dur="indefinite" restart="never" nodeType="tmRoot">
-          <p:childTnLst>
-            <p:seq concurrent="1" nextAc="seek">
-              <p:cTn id="2" dur="indefinite" nodeType="mainSeq">
-                <p:childTnLst>
-                  <p:par>
-                    <p:cTn id="3" fill="hold">
-                      <p:stCondLst>
-                        <p:cond delay="indefinite"/>
-                        <p:cond evt="onBegin" delay="0">
-                          <p:tn val="2"/>
-                        </p:cond>
-                      </p:stCondLst>
-                      <p:childTnLst>
-                        <p:par>
-                          <p:cTn id="4" fill="hold">
-                            <p:stCondLst>
-                              <p:cond delay="0"/>
-                            </p:stCondLst>
-                            <p:childTnLst>
-                              <p:par>
-                                <p:cTn id="5" presetID="10" presetClass="entr" presetSubtype="0" fill="hold" grpId="0" nodeType="afterEffect">
-                                  <p:stCondLst>
-                                    <p:cond delay="0"/>
-                                  </p:stCondLst>
-                                  <p:childTnLst>
-                                    <p:set>
-                                      <p:cBhvr>
-                                        <p:cTn id="6" dur="1" fill="hold">
-                                          <p:stCondLst>
-                                            <p:cond delay="0"/>
-                                          </p:stCondLst>
-                                        </p:cTn>
-                                        <p:tgtEl>
-                                          <p:spTgt spid="2"/>
-                                        </p:tgtEl>
-                                        <p:attrNameLst>
-                                          <p:attrName>style.visibility</p:attrName>
-                                        </p:attrNameLst>
-                                      </p:cBhvr>
-                                      <p:to>
-                                        <p:strVal val="visible"/>
-                                      </p:to>
-                                    </p:set>
-                                    <p:animEffect transition="in" filter="fade">
-                                      <p:cBhvr>
-                                        <p:cTn id="7" dur="250"/>
-                                        <p:tgtEl>
-                                          <p:spTgt spid="2"/>
-                                        </p:tgtEl>
-                                      </p:cBhvr>
-                                    </p:animEffect>
-                                  </p:childTnLst>
-                                </p:cTn>
-                              </p:par>
-                            </p:childTnLst>
-                          </p:cTn>
-                        </p:par>
-                        <p:par>
-                          <p:cTn id="8" fill="hold">
-                            <p:stCondLst>
-                              <p:cond delay="250"/>
-                            </p:stCondLst>
-                            <p:childTnLst>
-                              <p:par>
-                                <p:cTn id="9" presetID="10" presetClass="entr" presetSubtype="0" fill="hold" nodeType="afterEffect">
-                                  <p:stCondLst>
-                                    <p:cond delay="0"/>
-                                  </p:stCondLst>
-                                  <p:childTnLst>
-                                    <p:set>
-                                      <p:cBhvr>
-                                        <p:cTn id="10" dur="1" fill="hold">
-                                          <p:stCondLst>
-                                            <p:cond delay="0"/>
-                                          </p:stCondLst>
-                                        </p:cTn>
-                                        <p:tgtEl>
-                                          <p:spTgt spid="15362">
-                                            <p:txEl>
-                                              <p:pRg st="0" end="0"/>
-                                            </p:txEl>
-                                          </p:spTgt>
-                                        </p:tgtEl>
-                                        <p:attrNameLst>
-                                          <p:attrName>style.visibility</p:attrName>
-                                        </p:attrNameLst>
-                                      </p:cBhvr>
-                                      <p:to>
-                                        <p:strVal val="visible"/>
-                                      </p:to>
-                                    </p:set>
-                                    <p:animEffect transition="in" filter="fade">
-                                      <p:cBhvr>
-                                        <p:cTn id="11" dur="250"/>
-                                        <p:tgtEl>
-                                          <p:spTgt spid="15362">
-                                            <p:txEl>
-                                              <p:pRg st="0" end="0"/>
-                                            </p:txEl>
-                                          </p:spTgt>
-                                        </p:tgtEl>
-                                      </p:cBhvr>
-                                    </p:animEffect>
-                                  </p:childTnLst>
-                                </p:cTn>
-                              </p:par>
-                            </p:childTnLst>
-                          </p:cTn>
-                        </p:par>
                         <p:par>
                           <p:cTn id="12" fill="hold">
                             <p:stCondLst>
@@ -10461,6 +11386,110 @@
                                           <p:spTgt spid="15362">
                                             <p:txEl>
                                               <p:pRg st="1" end="1"/>
+                                            </p:txEl>
+                                          </p:spTgt>
+                                        </p:tgtEl>
+                                      </p:cBhvr>
+                                    </p:animEffect>
+                                  </p:childTnLst>
+                                </p:cTn>
+                              </p:par>
+                            </p:childTnLst>
+                          </p:cTn>
+                        </p:par>
+                        <p:par>
+                          <p:cTn id="16" fill="hold">
+                            <p:stCondLst>
+                              <p:cond delay="750"/>
+                            </p:stCondLst>
+                            <p:childTnLst>
+                              <p:par>
+                                <p:cTn id="17" presetID="10" presetClass="entr" presetSubtype="0" fill="hold" nodeType="afterEffect">
+                                  <p:stCondLst>
+                                    <p:cond delay="0"/>
+                                  </p:stCondLst>
+                                  <p:childTnLst>
+                                    <p:set>
+                                      <p:cBhvr>
+                                        <p:cTn id="18" dur="1" fill="hold">
+                                          <p:stCondLst>
+                                            <p:cond delay="0"/>
+                                          </p:stCondLst>
+                                        </p:cTn>
+                                        <p:tgtEl>
+                                          <p:spTgt spid="15362">
+                                            <p:txEl>
+                                              <p:pRg st="2" end="2"/>
+                                            </p:txEl>
+                                          </p:spTgt>
+                                        </p:tgtEl>
+                                        <p:attrNameLst>
+                                          <p:attrName>style.visibility</p:attrName>
+                                        </p:attrNameLst>
+                                      </p:cBhvr>
+                                      <p:to>
+                                        <p:strVal val="visible"/>
+                                      </p:to>
+                                    </p:set>
+                                    <p:animEffect transition="in" filter="fade">
+                                      <p:cBhvr>
+                                        <p:cTn id="19" dur="250"/>
+                                        <p:tgtEl>
+                                          <p:spTgt spid="15362">
+                                            <p:txEl>
+                                              <p:pRg st="2" end="2"/>
+                                            </p:txEl>
+                                          </p:spTgt>
+                                        </p:tgtEl>
+                                      </p:cBhvr>
+                                    </p:animEffect>
+                                  </p:childTnLst>
+                                </p:cTn>
+                              </p:par>
+                            </p:childTnLst>
+                          </p:cTn>
+                        </p:par>
+                        <p:par>
+                          <p:cTn id="20" fill="hold">
+                            <p:stCondLst>
+                              <p:cond delay="1000"/>
+                            </p:stCondLst>
+                            <p:childTnLst>
+                              <p:par>
+                                <p:cTn id="21" presetID="10" presetClass="entr" presetSubtype="0" fill="hold" nodeType="afterEffect">
+                                  <p:stCondLst>
+                                    <p:cond delay="0"/>
+                                  </p:stCondLst>
+                                  <p:childTnLst>
+                                    <p:set>
+                                      <p:cBhvr>
+                                        <p:cTn id="22" dur="1" fill="hold">
+                                          <p:stCondLst>
+                                            <p:cond delay="0"/>
+                                          </p:stCondLst>
+                                        </p:cTn>
+                                        <p:tgtEl>
+                                          <p:spTgt spid="15362">
+                                            <p:txEl>
+                                              <p:pRg st="3" end="3"/>
+                                            </p:txEl>
+                                          </p:spTgt>
+                                        </p:tgtEl>
+                                        <p:attrNameLst>
+                                          <p:attrName>style.visibility</p:attrName>
+                                        </p:attrNameLst>
+                                      </p:cBhvr>
+                                      <p:to>
+                                        <p:strVal val="visible"/>
+                                      </p:to>
+                                    </p:set>
+                                    <p:animEffect transition="in" filter="fade">
+                                      <p:cBhvr>
+                                        <p:cTn id="23" dur="250"/>
+                                        <p:tgtEl>
+                                          <p:spTgt spid="15362">
+                                            <p:txEl>
+                                              <p:pRg st="3" end="3"/>
                                             </p:txEl>
                                           </p:spTgt>
                                         </p:tgtEl>
@@ -10550,22 +11579,19 @@
                 <a:latin typeface="Times New Roman" panose="02020603050405020304" pitchFamily="18" charset="0"/>
                 <a:cs typeface="Times New Roman" panose="02020603050405020304" pitchFamily="18" charset="0"/>
               </a:rPr>
-              <a:t>Android 8.1.0</a:t>
-            </a:r>
-            <a:r>
-              <a:rPr lang="zh-TW" altLang="en-US" sz="1800" dirty="0">
+              <a:t>Android 6.0.1 (RJ-45), Android 6.0.1 (OTG</a:t>
+            </a:r>
+            <a:r>
+              <a:rPr lang="en-US" altLang="zh-TW" sz="1800" dirty="0" smtClean="0">
                 <a:latin typeface="Times New Roman" panose="02020603050405020304" pitchFamily="18" charset="0"/>
                 <a:cs typeface="Times New Roman" panose="02020603050405020304" pitchFamily="18" charset="0"/>
               </a:rPr>
-              <a:t> </a:t>
-            </a:r>
-            <a:r>
-              <a:rPr lang="en-US" altLang="zh-TW" sz="1800" dirty="0">
-                <a:latin typeface="Times New Roman" panose="02020603050405020304" pitchFamily="18" charset="0"/>
-                <a:cs typeface="Times New Roman" panose="02020603050405020304" pitchFamily="18" charset="0"/>
-              </a:rPr>
-              <a:t>(RJ-45), Android 8.1.0 (OTG)</a:t>
-            </a:r>
+              <a:t>)</a:t>
+            </a:r>
+            <a:endParaRPr lang="en-US" altLang="zh-TW" sz="1800" dirty="0">
+              <a:latin typeface="Times New Roman" panose="02020603050405020304" pitchFamily="18" charset="0"/>
+              <a:cs typeface="Times New Roman" panose="02020603050405020304" pitchFamily="18" charset="0"/>
+            </a:endParaRPr>
           </a:p>
           <a:p>
             <a:pPr marL="342900" lvl="1" indent="-342900" eaLnBrk="1" hangingPunct="1">
@@ -10578,22 +11604,8 @@
                 <a:latin typeface="Times New Roman" panose="02020603050405020304" pitchFamily="18" charset="0"/>
                 <a:cs typeface="Times New Roman" panose="02020603050405020304" pitchFamily="18" charset="0"/>
               </a:rPr>
-              <a:t>System </a:t>
-            </a:r>
-            <a:r>
-              <a:rPr lang="en-US" altLang="zh-TW" sz="1800" dirty="0">
-                <a:latin typeface="Times New Roman" panose="02020603050405020304" pitchFamily="18" charset="0"/>
-                <a:cs typeface="Times New Roman" panose="02020603050405020304" pitchFamily="18" charset="0"/>
-              </a:rPr>
-              <a:t>Structure</a:t>
-            </a:r>
-          </a:p>
-          <a:p>
-            <a:pPr eaLnBrk="1" hangingPunct="1">
-              <a:buFont typeface="Arial" charset="0"/>
-              <a:buChar char="•"/>
-              <a:defRPr/>
-            </a:pPr>
+              <a:t>System Structure</a:t>
+            </a:r>
             <a:endParaRPr lang="en-US" altLang="zh-TW" sz="1800" dirty="0">
               <a:latin typeface="Times New Roman" panose="02020603050405020304" pitchFamily="18" charset="0"/>
               <a:cs typeface="Times New Roman" panose="02020603050405020304" pitchFamily="18" charset="0"/>
@@ -10667,7 +11679,7 @@
     </p:spTree>
     <p:extLst>
       <p:ext uri="{BB962C8B-B14F-4D97-AF65-F5344CB8AC3E}">
-        <p14:creationId xmlns:p14="http://schemas.microsoft.com/office/powerpoint/2010/main" val="1280512324"/>
+        <p14:creationId xmlns:p14="http://schemas.microsoft.com/office/powerpoint/2010/main" val="3412901425"/>
       </p:ext>
     </p:extLst>
   </p:cSld>
@@ -10925,16 +11937,26 @@
               <a:defRPr/>
             </a:pPr>
             <a:r>
-              <a:rPr lang="en-US" altLang="zh-TW" sz="1800" dirty="0" smtClean="0">
+              <a:rPr lang="en-US" altLang="zh-TW" sz="1800" dirty="0">
                 <a:latin typeface="Times New Roman" panose="02020603050405020304" pitchFamily="18" charset="0"/>
                 <a:cs typeface="Times New Roman" panose="02020603050405020304" pitchFamily="18" charset="0"/>
               </a:rPr>
-              <a:t>Windows</a:t>
-            </a:r>
-            <a:endParaRPr lang="en-US" altLang="zh-TW" sz="1800" dirty="0">
-              <a:latin typeface="Times New Roman" panose="02020603050405020304" pitchFamily="18" charset="0"/>
-              <a:cs typeface="Times New Roman" panose="02020603050405020304" pitchFamily="18" charset="0"/>
-            </a:endParaRPr>
+              <a:t>Android 8.1.0</a:t>
+            </a:r>
+            <a:r>
+              <a:rPr lang="zh-TW" altLang="en-US" sz="1800" dirty="0">
+                <a:latin typeface="Times New Roman" panose="02020603050405020304" pitchFamily="18" charset="0"/>
+                <a:cs typeface="Times New Roman" panose="02020603050405020304" pitchFamily="18" charset="0"/>
+              </a:rPr>
+              <a:t> </a:t>
+            </a:r>
+            <a:r>
+              <a:rPr lang="en-US" altLang="zh-TW" sz="1800" dirty="0">
+                <a:latin typeface="Times New Roman" panose="02020603050405020304" pitchFamily="18" charset="0"/>
+                <a:cs typeface="Times New Roman" panose="02020603050405020304" pitchFamily="18" charset="0"/>
+              </a:rPr>
+              <a:t>(RJ-45), Android 8.1.0 (OTG)</a:t>
+            </a:r>
           </a:p>
           <a:p>
             <a:pPr marL="342900" lvl="1" indent="-342900" eaLnBrk="1" hangingPunct="1">
@@ -10943,11 +11965,18 @@
               <a:defRPr/>
             </a:pPr>
             <a:r>
+              <a:rPr lang="en-US" altLang="zh-TW" sz="1800" dirty="0" smtClean="0">
+                <a:latin typeface="Times New Roman" panose="02020603050405020304" pitchFamily="18" charset="0"/>
+                <a:cs typeface="Times New Roman" panose="02020603050405020304" pitchFamily="18" charset="0"/>
+              </a:rPr>
+              <a:t>System </a:t>
+            </a:r>
+            <a:r>
               <a:rPr lang="en-US" altLang="zh-TW" sz="1800" dirty="0">
                 <a:latin typeface="Times New Roman" panose="02020603050405020304" pitchFamily="18" charset="0"/>
                 <a:cs typeface="Times New Roman" panose="02020603050405020304" pitchFamily="18" charset="0"/>
               </a:rPr>
-              <a:t>System Structure</a:t>
+              <a:t>Structure</a:t>
             </a:r>
           </a:p>
           <a:p>
@@ -11029,7 +12058,7 @@
     </p:spTree>
     <p:extLst>
       <p:ext uri="{BB962C8B-B14F-4D97-AF65-F5344CB8AC3E}">
-        <p14:creationId xmlns:p14="http://schemas.microsoft.com/office/powerpoint/2010/main" val="3614060286"/>
+        <p14:creationId xmlns:p14="http://schemas.microsoft.com/office/powerpoint/2010/main" val="1280512324"/>
       </p:ext>
     </p:extLst>
   </p:cSld>
@@ -11291,8 +12320,33 @@
                 <a:latin typeface="Times New Roman" panose="02020603050405020304" pitchFamily="18" charset="0"/>
                 <a:cs typeface="Times New Roman" panose="02020603050405020304" pitchFamily="18" charset="0"/>
               </a:rPr>
-              <a:t>Conclusion</a:t>
-            </a:r>
+              <a:t>Windows</a:t>
+            </a:r>
+            <a:endParaRPr lang="en-US" altLang="zh-TW" sz="1800" dirty="0">
+              <a:latin typeface="Times New Roman" panose="02020603050405020304" pitchFamily="18" charset="0"/>
+              <a:cs typeface="Times New Roman" panose="02020603050405020304" pitchFamily="18" charset="0"/>
+            </a:endParaRPr>
+          </a:p>
+          <a:p>
+            <a:pPr marL="342900" lvl="1" indent="-342900" eaLnBrk="1" hangingPunct="1">
+              <a:buFont typeface="Arial" charset="0"/>
+              <a:buChar char="•"/>
+              <a:defRPr/>
+            </a:pPr>
+            <a:r>
+              <a:rPr lang="en-US" altLang="zh-TW" sz="1800" dirty="0">
+                <a:latin typeface="Times New Roman" panose="02020603050405020304" pitchFamily="18" charset="0"/>
+                <a:cs typeface="Times New Roman" panose="02020603050405020304" pitchFamily="18" charset="0"/>
+              </a:rPr>
+              <a:t>System Structure</a:t>
+            </a:r>
+          </a:p>
+          <a:p>
+            <a:pPr eaLnBrk="1" hangingPunct="1">
+              <a:buFont typeface="Arial" charset="0"/>
+              <a:buChar char="•"/>
+              <a:defRPr/>
+            </a:pPr>
             <a:endParaRPr lang="en-US" altLang="zh-TW" sz="1800" dirty="0">
               <a:latin typeface="Times New Roman" panose="02020603050405020304" pitchFamily="18" charset="0"/>
               <a:cs typeface="Times New Roman" panose="02020603050405020304" pitchFamily="18" charset="0"/>
@@ -11366,7 +12420,7 @@
     </p:spTree>
     <p:extLst>
       <p:ext uri="{BB962C8B-B14F-4D97-AF65-F5344CB8AC3E}">
-        <p14:creationId xmlns:p14="http://schemas.microsoft.com/office/powerpoint/2010/main" val="944696784"/>
+        <p14:creationId xmlns:p14="http://schemas.microsoft.com/office/powerpoint/2010/main" val="3614060286"/>
       </p:ext>
     </p:extLst>
   </p:cSld>
@@ -11487,6 +12541,58 @@
                                           <p:spTgt spid="15362">
                                             <p:txEl>
                                               <p:pRg st="0" end="0"/>
+                                            </p:txEl>
+                                          </p:spTgt>
+                                        </p:tgtEl>
+                                      </p:cBhvr>
+                                    </p:animEffect>
+                                  </p:childTnLst>
+                                </p:cTn>
+                              </p:par>
+                            </p:childTnLst>
+                          </p:cTn>
+                        </p:par>
+                        <p:par>
+                          <p:cTn id="12" fill="hold">
+                            <p:stCondLst>
+                              <p:cond delay="500"/>
+                            </p:stCondLst>
+                            <p:childTnLst>
+                              <p:par>
+                                <p:cTn id="13" presetID="10" presetClass="entr" presetSubtype="0" fill="hold" nodeType="afterEffect">
+                                  <p:stCondLst>
+                                    <p:cond delay="0"/>
+                                  </p:stCondLst>
+                                  <p:childTnLst>
+                                    <p:set>
+                                      <p:cBhvr>
+                                        <p:cTn id="14" dur="1" fill="hold">
+                                          <p:stCondLst>
+                                            <p:cond delay="0"/>
+                                          </p:stCondLst>
+                                        </p:cTn>
+                                        <p:tgtEl>
+                                          <p:spTgt spid="15362">
+                                            <p:txEl>
+                                              <p:pRg st="1" end="1"/>
+                                            </p:txEl>
+                                          </p:spTgt>
+                                        </p:tgtEl>
+                                        <p:attrNameLst>
+                                          <p:attrName>style.visibility</p:attrName>
+                                        </p:attrNameLst>
+                                      </p:cBhvr>
+                                      <p:to>
+                                        <p:strVal val="visible"/>
+                                      </p:to>
+                                    </p:set>
+                                    <p:animEffect transition="in" filter="fade">
+                                      <p:cBhvr>
+                                        <p:cTn id="15" dur="250"/>
+                                        <p:tgtEl>
+                                          <p:spTgt spid="15362">
+                                            <p:txEl>
+                                              <p:pRg st="1" end="1"/>
                                             </p:txEl>
                                           </p:spTgt>
                                         </p:tgtEl>
@@ -12076,70 +13182,13 @@
               <a:defRPr/>
             </a:pPr>
             <a:r>
-              <a:rPr lang="en-US" altLang="zh-TW" sz="1800" dirty="0">
-                <a:latin typeface="Times New Roman" panose="02020603050405020304" pitchFamily="18" charset="0"/>
-                <a:cs typeface="Times New Roman" panose="02020603050405020304" pitchFamily="18" charset="0"/>
-              </a:rPr>
-              <a:t>The Tool base on the </a:t>
-            </a:r>
-            <a:r>
               <a:rPr lang="en-US" altLang="zh-TW" sz="1800" dirty="0" smtClean="0">
                 <a:latin typeface="Times New Roman" panose="02020603050405020304" pitchFamily="18" charset="0"/>
                 <a:cs typeface="Times New Roman" panose="02020603050405020304" pitchFamily="18" charset="0"/>
               </a:rPr>
-              <a:t>GPU resolution</a:t>
+              <a:t>Conclusion</a:t>
             </a:r>
             <a:endParaRPr lang="en-US" altLang="zh-TW" sz="1800" dirty="0">
-              <a:latin typeface="Times New Roman" panose="02020603050405020304" pitchFamily="18" charset="0"/>
-              <a:cs typeface="Times New Roman" panose="02020603050405020304" pitchFamily="18" charset="0"/>
-            </a:endParaRPr>
-          </a:p>
-          <a:p>
-            <a:pPr lvl="1" eaLnBrk="1" hangingPunct="1">
-              <a:buFont typeface="Arial" charset="0"/>
-              <a:buChar char="•"/>
-              <a:defRPr/>
-            </a:pPr>
-            <a:r>
-              <a:rPr lang="en-US" altLang="zh-TW" sz="1400" dirty="0" smtClean="0">
-                <a:latin typeface="Times New Roman" panose="02020603050405020304" pitchFamily="18" charset="0"/>
-                <a:cs typeface="Times New Roman" panose="02020603050405020304" pitchFamily="18" charset="0"/>
-              </a:rPr>
-              <a:t>Auto catch the resolution by batch code</a:t>
-            </a:r>
-          </a:p>
-          <a:p>
-            <a:pPr lvl="1" eaLnBrk="1" hangingPunct="1">
-              <a:buFont typeface="Arial" charset="0"/>
-              <a:buChar char="•"/>
-              <a:defRPr/>
-            </a:pPr>
-            <a:r>
-              <a:rPr lang="en-US" altLang="zh-TW" sz="1400" dirty="0">
-                <a:latin typeface="Times New Roman" panose="02020603050405020304" pitchFamily="18" charset="0"/>
-                <a:cs typeface="Times New Roman" panose="02020603050405020304" pitchFamily="18" charset="0"/>
-              </a:rPr>
-              <a:t>Auto catch the resolution by batch </a:t>
-            </a:r>
-            <a:r>
-              <a:rPr lang="en-US" altLang="zh-TW" sz="1400" dirty="0" smtClean="0">
-                <a:latin typeface="Times New Roman" panose="02020603050405020304" pitchFamily="18" charset="0"/>
-                <a:cs typeface="Times New Roman" panose="02020603050405020304" pitchFamily="18" charset="0"/>
-              </a:rPr>
-              <a:t>code. (Reboot)</a:t>
-            </a:r>
-            <a:endParaRPr lang="en-US" altLang="zh-TW" sz="1400" dirty="0">
-              <a:latin typeface="Times New Roman" panose="02020603050405020304" pitchFamily="18" charset="0"/>
-              <a:cs typeface="Times New Roman" panose="02020603050405020304" pitchFamily="18" charset="0"/>
-            </a:endParaRPr>
-          </a:p>
-          <a:p>
-            <a:pPr lvl="1" eaLnBrk="1" hangingPunct="1">
-              <a:buFont typeface="Arial" charset="0"/>
-              <a:buChar char="•"/>
-              <a:defRPr/>
-            </a:pPr>
-            <a:endParaRPr lang="en-US" altLang="zh-TW" sz="1400" dirty="0">
               <a:latin typeface="Times New Roman" panose="02020603050405020304" pitchFamily="18" charset="0"/>
               <a:cs typeface="Times New Roman" panose="02020603050405020304" pitchFamily="18" charset="0"/>
             </a:endParaRPr>
@@ -12177,6 +13226,443 @@
                 <a:latin typeface="Times New Roman" panose="02020603050405020304" pitchFamily="18" charset="0"/>
                 <a:cs typeface="Times New Roman" panose="02020603050405020304" pitchFamily="18" charset="0"/>
               </a:rPr>
+              <a:t>Airplane </a:t>
+            </a:r>
+            <a:r>
+              <a:rPr lang="en-US" altLang="zh-TW" sz="2800" kern="0" dirty="0">
+                <a:solidFill>
+                  <a:srgbClr val="003366"/>
+                </a:solidFill>
+                <a:latin typeface="Times New Roman" panose="02020603050405020304" pitchFamily="18" charset="0"/>
+                <a:cs typeface="Times New Roman" panose="02020603050405020304" pitchFamily="18" charset="0"/>
+              </a:rPr>
+              <a:t>on/off mode </a:t>
+            </a:r>
+            <a:r>
+              <a:rPr lang="en-US" altLang="zh-TW" sz="2800" kern="0" dirty="0" smtClean="0">
+                <a:solidFill>
+                  <a:srgbClr val="003366"/>
+                </a:solidFill>
+                <a:latin typeface="Times New Roman" panose="02020603050405020304" pitchFamily="18" charset="0"/>
+                <a:cs typeface="Times New Roman" panose="02020603050405020304" pitchFamily="18" charset="0"/>
+              </a:rPr>
+              <a:t>automation</a:t>
+            </a:r>
+            <a:endParaRPr lang="zh-TW" altLang="en-US" sz="2800" kern="0" dirty="0">
+              <a:solidFill>
+                <a:srgbClr val="003366"/>
+              </a:solidFill>
+              <a:latin typeface="Times New Roman" panose="02020603050405020304" pitchFamily="18" charset="0"/>
+              <a:cs typeface="Times New Roman" panose="02020603050405020304" pitchFamily="18" charset="0"/>
+            </a:endParaRPr>
+          </a:p>
+        </p:txBody>
+      </p:sp>
+    </p:spTree>
+    <p:extLst>
+      <p:ext uri="{BB962C8B-B14F-4D97-AF65-F5344CB8AC3E}">
+        <p14:creationId xmlns:p14="http://schemas.microsoft.com/office/powerpoint/2010/main" val="944696784"/>
+      </p:ext>
+    </p:extLst>
+  </p:cSld>
+  <p:clrMapOvr>
+    <a:masterClrMapping/>
+  </p:clrMapOvr>
+  <mc:AlternateContent xmlns:mc="http://schemas.openxmlformats.org/markup-compatibility/2006" xmlns:p14="http://schemas.microsoft.com/office/powerpoint/2010/main">
+    <mc:Choice Requires="p14">
+      <p:transition spd="med" p14:dur="700" advClick="0">
+        <p:fade/>
+      </p:transition>
+    </mc:Choice>
+    <mc:Fallback xmlns="">
+      <p:transition spd="med" advClick="0">
+        <p:fade/>
+      </p:transition>
+    </mc:Fallback>
+  </mc:AlternateContent>
+  <p:timing>
+    <p:tnLst>
+      <p:par>
+        <p:cTn id="1" dur="indefinite" restart="never" nodeType="tmRoot">
+          <p:childTnLst>
+            <p:seq concurrent="1" nextAc="seek">
+              <p:cTn id="2" dur="indefinite" nodeType="mainSeq">
+                <p:childTnLst>
+                  <p:par>
+                    <p:cTn id="3" fill="hold">
+                      <p:stCondLst>
+                        <p:cond delay="indefinite"/>
+                        <p:cond evt="onBegin" delay="0">
+                          <p:tn val="2"/>
+                        </p:cond>
+                      </p:stCondLst>
+                      <p:childTnLst>
+                        <p:par>
+                          <p:cTn id="4" fill="hold">
+                            <p:stCondLst>
+                              <p:cond delay="0"/>
+                            </p:stCondLst>
+                            <p:childTnLst>
+                              <p:par>
+                                <p:cTn id="5" presetID="10" presetClass="entr" presetSubtype="0" fill="hold" grpId="0" nodeType="afterEffect">
+                                  <p:stCondLst>
+                                    <p:cond delay="0"/>
+                                  </p:stCondLst>
+                                  <p:childTnLst>
+                                    <p:set>
+                                      <p:cBhvr>
+                                        <p:cTn id="6" dur="1" fill="hold">
+                                          <p:stCondLst>
+                                            <p:cond delay="0"/>
+                                          </p:stCondLst>
+                                        </p:cTn>
+                                        <p:tgtEl>
+                                          <p:spTgt spid="2"/>
+                                        </p:tgtEl>
+                                        <p:attrNameLst>
+                                          <p:attrName>style.visibility</p:attrName>
+                                        </p:attrNameLst>
+                                      </p:cBhvr>
+                                      <p:to>
+                                        <p:strVal val="visible"/>
+                                      </p:to>
+                                    </p:set>
+                                    <p:animEffect transition="in" filter="fade">
+                                      <p:cBhvr>
+                                        <p:cTn id="7" dur="250"/>
+                                        <p:tgtEl>
+                                          <p:spTgt spid="2"/>
+                                        </p:tgtEl>
+                                      </p:cBhvr>
+                                    </p:animEffect>
+                                  </p:childTnLst>
+                                </p:cTn>
+                              </p:par>
+                            </p:childTnLst>
+                          </p:cTn>
+                        </p:par>
+                        <p:par>
+                          <p:cTn id="8" fill="hold">
+                            <p:stCondLst>
+                              <p:cond delay="250"/>
+                            </p:stCondLst>
+                            <p:childTnLst>
+                              <p:par>
+                                <p:cTn id="9" presetID="10" presetClass="entr" presetSubtype="0" fill="hold" nodeType="afterEffect">
+                                  <p:stCondLst>
+                                    <p:cond delay="0"/>
+                                  </p:stCondLst>
+                                  <p:childTnLst>
+                                    <p:set>
+                                      <p:cBhvr>
+                                        <p:cTn id="10" dur="1" fill="hold">
+                                          <p:stCondLst>
+                                            <p:cond delay="0"/>
+                                          </p:stCondLst>
+                                        </p:cTn>
+                                        <p:tgtEl>
+                                          <p:spTgt spid="15362">
+                                            <p:txEl>
+                                              <p:pRg st="0" end="0"/>
+                                            </p:txEl>
+                                          </p:spTgt>
+                                        </p:tgtEl>
+                                        <p:attrNameLst>
+                                          <p:attrName>style.visibility</p:attrName>
+                                        </p:attrNameLst>
+                                      </p:cBhvr>
+                                      <p:to>
+                                        <p:strVal val="visible"/>
+                                      </p:to>
+                                    </p:set>
+                                    <p:animEffect transition="in" filter="fade">
+                                      <p:cBhvr>
+                                        <p:cTn id="11" dur="250"/>
+                                        <p:tgtEl>
+                                          <p:spTgt spid="15362">
+                                            <p:txEl>
+                                              <p:pRg st="0" end="0"/>
+                                            </p:txEl>
+                                          </p:spTgt>
+                                        </p:tgtEl>
+                                      </p:cBhvr>
+                                    </p:animEffect>
+                                  </p:childTnLst>
+                                </p:cTn>
+                              </p:par>
+                            </p:childTnLst>
+                          </p:cTn>
+                        </p:par>
+                      </p:childTnLst>
+                    </p:cTn>
+                  </p:par>
+                </p:childTnLst>
+              </p:cTn>
+              <p:prevCondLst>
+                <p:cond evt="onPrev" delay="0">
+                  <p:tgtEl>
+                    <p:sldTgt/>
+                  </p:tgtEl>
+                </p:cond>
+              </p:prevCondLst>
+              <p:nextCondLst>
+                <p:cond evt="onNext" delay="0">
+                  <p:tgtEl>
+                    <p:sldTgt/>
+                  </p:tgtEl>
+                </p:cond>
+              </p:nextCondLst>
+            </p:seq>
+          </p:childTnLst>
+        </p:cTn>
+      </p:par>
+    </p:tnLst>
+    <p:bldLst>
+      <p:bldP spid="2" grpId="0"/>
+    </p:bldLst>
+  </p:timing>
+</p:sld>
+</file>
+
+<file path=ppt/slides/slide21.xml><?xml version="1.0" encoding="utf-8"?>
+<p:sld xmlns:a="http://schemas.openxmlformats.org/drawingml/2006/main" xmlns:r="http://schemas.openxmlformats.org/officeDocument/2006/relationships" xmlns:p="http://schemas.openxmlformats.org/presentationml/2006/main">
+  <p:cSld>
+    <p:spTree>
+      <p:nvGrpSpPr>
+        <p:cNvPr id="1" name=""/>
+        <p:cNvGrpSpPr/>
+        <p:nvPr/>
+      </p:nvGrpSpPr>
+      <p:grpSpPr>
+        <a:xfrm>
+          <a:off x="0" y="0"/>
+          <a:ext cx="0" cy="0"/>
+          <a:chOff x="0" y="0"/>
+          <a:chExt cx="0" cy="0"/>
+        </a:xfrm>
+      </p:grpSpPr>
+      <p:sp>
+        <p:nvSpPr>
+          <p:cNvPr id="15362" name="內容版面配置區 5"/>
+          <p:cNvSpPr>
+            <a:spLocks noGrp="1"/>
+          </p:cNvSpPr>
+          <p:nvPr>
+            <p:ph idx="1"/>
+          </p:nvPr>
+        </p:nvSpPr>
+        <p:spPr>
+          <a:xfrm>
+            <a:off x="457200" y="936625"/>
+            <a:ext cx="8229600" cy="3575050"/>
+          </a:xfrm>
+        </p:spPr>
+        <p:txBody>
+          <a:bodyPr/>
+          <a:lstStyle/>
+          <a:p>
+            <a:pPr marL="342900" lvl="1" indent="-342900" eaLnBrk="1" hangingPunct="1">
+              <a:buFont typeface="Arial" charset="0"/>
+              <a:buChar char="•"/>
+              <a:defRPr/>
+            </a:pPr>
+            <a:r>
+              <a:rPr lang="en-US" altLang="zh-TW" sz="1800" dirty="0">
+                <a:latin typeface="Times New Roman" panose="02020603050405020304" pitchFamily="18" charset="0"/>
+                <a:cs typeface="Times New Roman" panose="02020603050405020304" pitchFamily="18" charset="0"/>
+              </a:rPr>
+              <a:t>The Tool base on the </a:t>
+            </a:r>
+            <a:r>
+              <a:rPr lang="en-US" altLang="zh-TW" sz="1800" dirty="0" smtClean="0">
+                <a:latin typeface="Times New Roman" panose="02020603050405020304" pitchFamily="18" charset="0"/>
+                <a:cs typeface="Times New Roman" panose="02020603050405020304" pitchFamily="18" charset="0"/>
+              </a:rPr>
+              <a:t>GPU resolution</a:t>
+            </a:r>
+            <a:endParaRPr lang="en-US" altLang="zh-TW" sz="1800" dirty="0">
+              <a:latin typeface="Times New Roman" panose="02020603050405020304" pitchFamily="18" charset="0"/>
+              <a:cs typeface="Times New Roman" panose="02020603050405020304" pitchFamily="18" charset="0"/>
+            </a:endParaRPr>
+          </a:p>
+          <a:p>
+            <a:pPr lvl="1" eaLnBrk="1" hangingPunct="1">
+              <a:buFont typeface="Arial" charset="0"/>
+              <a:buChar char="•"/>
+              <a:defRPr/>
+            </a:pPr>
+            <a:r>
+              <a:rPr lang="en-US" altLang="zh-TW" sz="1400" dirty="0" smtClean="0">
+                <a:latin typeface="Times New Roman" panose="02020603050405020304" pitchFamily="18" charset="0"/>
+                <a:cs typeface="Times New Roman" panose="02020603050405020304" pitchFamily="18" charset="0"/>
+              </a:rPr>
+              <a:t>Auto catch the resolution by batch code</a:t>
+            </a:r>
+          </a:p>
+          <a:p>
+            <a:pPr lvl="1" eaLnBrk="1" hangingPunct="1">
+              <a:buFont typeface="Arial" charset="0"/>
+              <a:buChar char="•"/>
+              <a:defRPr/>
+            </a:pPr>
+            <a:r>
+              <a:rPr lang="en-US" altLang="zh-TW" sz="1400" dirty="0">
+                <a:latin typeface="Times New Roman" panose="02020603050405020304" pitchFamily="18" charset="0"/>
+                <a:cs typeface="Times New Roman" panose="02020603050405020304" pitchFamily="18" charset="0"/>
+              </a:rPr>
+              <a:t>Auto catch the resolution by batch </a:t>
+            </a:r>
+            <a:r>
+              <a:rPr lang="en-US" altLang="zh-TW" sz="1400" dirty="0" smtClean="0">
+                <a:latin typeface="Times New Roman" panose="02020603050405020304" pitchFamily="18" charset="0"/>
+                <a:cs typeface="Times New Roman" panose="02020603050405020304" pitchFamily="18" charset="0"/>
+              </a:rPr>
+              <a:t>code. (Reboot)</a:t>
+            </a:r>
+            <a:endParaRPr lang="en-US" altLang="zh-TW" sz="1400" dirty="0">
+              <a:latin typeface="Times New Roman" panose="02020603050405020304" pitchFamily="18" charset="0"/>
+              <a:cs typeface="Times New Roman" panose="02020603050405020304" pitchFamily="18" charset="0"/>
+            </a:endParaRPr>
+          </a:p>
+          <a:p>
+            <a:pPr lvl="1" eaLnBrk="1" hangingPunct="1">
+              <a:buFont typeface="Arial" charset="0"/>
+              <a:buChar char="•"/>
+              <a:defRPr/>
+            </a:pPr>
+            <a:endParaRPr lang="en-US" altLang="zh-TW" sz="1400" dirty="0" smtClean="0">
+              <a:latin typeface="Times New Roman" panose="02020603050405020304" pitchFamily="18" charset="0"/>
+              <a:cs typeface="Times New Roman" panose="02020603050405020304" pitchFamily="18" charset="0"/>
+            </a:endParaRPr>
+          </a:p>
+          <a:p>
+            <a:pPr marL="457200" lvl="1" indent="0" eaLnBrk="1" hangingPunct="1">
+              <a:buNone/>
+              <a:defRPr/>
+            </a:pPr>
+            <a:endParaRPr lang="en-US" altLang="zh-TW" sz="1400" dirty="0" smtClean="0">
+              <a:latin typeface="Times New Roman" panose="02020603050405020304" pitchFamily="18" charset="0"/>
+              <a:cs typeface="Times New Roman" panose="02020603050405020304" pitchFamily="18" charset="0"/>
+            </a:endParaRPr>
+          </a:p>
+          <a:p>
+            <a:pPr marL="457200" lvl="1" indent="0" eaLnBrk="1" hangingPunct="1">
+              <a:buNone/>
+              <a:defRPr/>
+            </a:pPr>
+            <a:endParaRPr lang="en-US" altLang="zh-TW" sz="1400" dirty="0" smtClean="0">
+              <a:latin typeface="Times New Roman" panose="02020603050405020304" pitchFamily="18" charset="0"/>
+              <a:cs typeface="Times New Roman" panose="02020603050405020304" pitchFamily="18" charset="0"/>
+            </a:endParaRPr>
+          </a:p>
+          <a:p>
+            <a:pPr marL="342900" lvl="1" indent="-342900" eaLnBrk="1" hangingPunct="1">
+              <a:buFont typeface="Arial" charset="0"/>
+              <a:buChar char="•"/>
+              <a:defRPr/>
+            </a:pPr>
+            <a:r>
+              <a:rPr lang="zh-TW" altLang="en-US" sz="1800" dirty="0">
+                <a:latin typeface="Times New Roman" panose="02020603050405020304" pitchFamily="18" charset="0"/>
+                <a:cs typeface="Times New Roman" panose="02020603050405020304" pitchFamily="18" charset="0"/>
+              </a:rPr>
+              <a:t>結論</a:t>
+            </a:r>
+            <a:endParaRPr lang="en-US" altLang="zh-TW" sz="1800" dirty="0">
+              <a:latin typeface="Times New Roman" panose="02020603050405020304" pitchFamily="18" charset="0"/>
+              <a:cs typeface="Times New Roman" panose="02020603050405020304" pitchFamily="18" charset="0"/>
+            </a:endParaRPr>
+          </a:p>
+          <a:p>
+            <a:pPr marL="742950" lvl="2" indent="-342900" eaLnBrk="1" hangingPunct="1">
+              <a:buFont typeface="Arial" charset="0"/>
+              <a:buChar char="•"/>
+              <a:defRPr/>
+            </a:pPr>
+            <a:r>
+              <a:rPr lang="zh-TW" altLang="en-US" sz="1400" dirty="0">
+                <a:latin typeface="Times New Roman" panose="02020603050405020304" pitchFamily="18" charset="0"/>
+                <a:cs typeface="Times New Roman" panose="02020603050405020304" pitchFamily="18" charset="0"/>
+              </a:rPr>
+              <a:t>透過程式自動擷取主機 </a:t>
+            </a:r>
+            <a:r>
+              <a:rPr lang="en-US" altLang="zh-TW" sz="1400" dirty="0">
+                <a:latin typeface="Times New Roman" panose="02020603050405020304" pitchFamily="18" charset="0"/>
+                <a:cs typeface="Times New Roman" panose="02020603050405020304" pitchFamily="18" charset="0"/>
+              </a:rPr>
+              <a:t>GPU </a:t>
+            </a:r>
+            <a:r>
+              <a:rPr lang="zh-TW" altLang="en-US" sz="1400" dirty="0">
+                <a:latin typeface="Times New Roman" panose="02020603050405020304" pitchFamily="18" charset="0"/>
+                <a:cs typeface="Times New Roman" panose="02020603050405020304" pitchFamily="18" charset="0"/>
+              </a:rPr>
+              <a:t>解析度</a:t>
+            </a:r>
+            <a:endParaRPr lang="en-US" altLang="zh-TW" sz="1400" dirty="0">
+              <a:latin typeface="Times New Roman" panose="02020603050405020304" pitchFamily="18" charset="0"/>
+              <a:cs typeface="Times New Roman" panose="02020603050405020304" pitchFamily="18" charset="0"/>
+            </a:endParaRPr>
+          </a:p>
+          <a:p>
+            <a:pPr marL="742950" lvl="2" indent="-342900" eaLnBrk="1" hangingPunct="1">
+              <a:buFont typeface="Arial" charset="0"/>
+              <a:buChar char="•"/>
+              <a:defRPr/>
+            </a:pPr>
+            <a:r>
+              <a:rPr lang="zh-TW" altLang="en-US" sz="1400" dirty="0">
+                <a:latin typeface="Times New Roman" panose="02020603050405020304" pitchFamily="18" charset="0"/>
+                <a:cs typeface="Times New Roman" panose="02020603050405020304" pitchFamily="18" charset="0"/>
+              </a:rPr>
+              <a:t>長時間重開機解析度</a:t>
+            </a:r>
+            <a:r>
+              <a:rPr lang="zh-TW" altLang="en-US" sz="1400" dirty="0" smtClean="0">
+                <a:latin typeface="Times New Roman" panose="02020603050405020304" pitchFamily="18" charset="0"/>
+                <a:cs typeface="Times New Roman" panose="02020603050405020304" pitchFamily="18" charset="0"/>
+              </a:rPr>
+              <a:t>擷取</a:t>
+            </a:r>
+            <a:endParaRPr lang="en-US" altLang="zh-TW" sz="1400" dirty="0">
+              <a:latin typeface="Times New Roman" panose="02020603050405020304" pitchFamily="18" charset="0"/>
+              <a:cs typeface="Times New Roman" panose="02020603050405020304" pitchFamily="18" charset="0"/>
+            </a:endParaRPr>
+          </a:p>
+        </p:txBody>
+      </p:sp>
+      <p:sp>
+        <p:nvSpPr>
+          <p:cNvPr id="2" name="標題 4"/>
+          <p:cNvSpPr>
+            <a:spLocks noGrp="1"/>
+          </p:cNvSpPr>
+          <p:nvPr>
+            <p:ph type="title"/>
+          </p:nvPr>
+        </p:nvSpPr>
+        <p:spPr>
+          <a:xfrm>
+            <a:off x="457200" y="87313"/>
+            <a:ext cx="8229600" cy="756000"/>
+          </a:xfrm>
+        </p:spPr>
+        <p:txBody>
+          <a:bodyPr/>
+          <a:lstStyle/>
+          <a:p>
+            <a:pPr eaLnBrk="1" hangingPunct="1">
+              <a:defRPr/>
+            </a:pPr>
+            <a:r>
+              <a:rPr lang="en-US" altLang="zh-TW" sz="2800" kern="0" dirty="0" smtClean="0">
+                <a:solidFill>
+                  <a:srgbClr val="003366"/>
+                </a:solidFill>
+                <a:latin typeface="Times New Roman" panose="02020603050405020304" pitchFamily="18" charset="0"/>
+                <a:cs typeface="Times New Roman" panose="02020603050405020304" pitchFamily="18" charset="0"/>
+              </a:rPr>
               <a:t>Resolution automation</a:t>
             </a:r>
             <a:endParaRPr lang="zh-TW" altLang="en-US" sz="2800" kern="0" dirty="0">
@@ -12198,7 +13684,7 @@
           <p:nvPr>
             <p:extLst>
               <p:ext uri="{D42A27DB-BD31-4B8C-83A1-F6EECF244321}">
-                <p14:modId xmlns:p14="http://schemas.microsoft.com/office/powerpoint/2010/main" val="386067684"/>
+                <p14:modId xmlns:p14="http://schemas.microsoft.com/office/powerpoint/2010/main" val="2733027467"/>
               </p:ext>
             </p:extLst>
           </p:nvPr>
@@ -12211,7 +13697,7 @@
           <a:graphicData uri="http://schemas.openxmlformats.org/presentationml/2006/ole">
             <mc:AlternateContent xmlns:mc="http://schemas.openxmlformats.org/markup-compatibility/2006">
               <mc:Choice xmlns:v="urn:schemas-microsoft-com:vml" Requires="v">
-                <p:oleObj spid="_x0000_s3153" name="封裝程式殼層物件" showAsIcon="1" r:id="rId4" imgW="671760" imgH="394920" progId="Package">
+                <p:oleObj spid="_x0000_s3171" name="封裝程式殼層物件" showAsIcon="1" r:id="rId4" imgW="671760" imgH="394920" progId="Package">
                   <p:embed/>
                 </p:oleObj>
               </mc:Choice>
@@ -12482,30 +13968,25 @@
                                   </p:childTnLst>
                                 </p:cTn>
                               </p:par>
-                            </p:childTnLst>
-                          </p:cTn>
-                        </p:par>
-                        <p:par>
-                          <p:cTn id="20" fill="hold">
-                            <p:stCondLst>
-                              <p:cond delay="1000"/>
-                            </p:stCondLst>
-                            <p:childTnLst>
                               <p:par>
-                                <p:cTn id="21" presetID="10" presetClass="entr" presetSubtype="0" fill="hold" nodeType="afterEffect">
+                                <p:cTn id="20" presetID="10" presetClass="entr" presetSubtype="0" fill="hold" grpId="0" nodeType="withEffect">
                                   <p:stCondLst>
                                     <p:cond delay="0"/>
                                   </p:stCondLst>
                                   <p:childTnLst>
                                     <p:set>
                                       <p:cBhvr>
-                                        <p:cTn id="22" dur="1" fill="hold">
+                                        <p:cTn id="21" dur="1" fill="hold">
                                           <p:stCondLst>
                                             <p:cond delay="0"/>
                                           </p:stCondLst>
                                         </p:cTn>
                                         <p:tgtEl>
-                                          <p:spTgt spid="3"/>
+                                          <p:spTgt spid="15362">
+                                            <p:txEl>
+                                              <p:pRg st="6" end="6"/>
+                                            </p:txEl>
+                                          </p:spTgt>
                                         </p:tgtEl>
                                         <p:attrNameLst>
                                           <p:attrName>style.visibility</p:attrName>
@@ -12517,270 +13998,38 @@
                                     </p:set>
                                     <p:animEffect transition="in" filter="fade">
                                       <p:cBhvr>
-                                        <p:cTn id="23" dur="500"/>
-                                        <p:tgtEl>
-                                          <p:spTgt spid="3"/>
+                                        <p:cTn id="22" dur="250"/>
+                                        <p:tgtEl>
+                                          <p:spTgt spid="15362">
+                                            <p:txEl>
+                                              <p:pRg st="6" end="6"/>
+                                            </p:txEl>
+                                          </p:spTgt>
                                         </p:tgtEl>
                                       </p:cBhvr>
                                     </p:animEffect>
                                   </p:childTnLst>
                                 </p:cTn>
                               </p:par>
-                            </p:childTnLst>
-                          </p:cTn>
-                        </p:par>
-                      </p:childTnLst>
-                    </p:cTn>
-                  </p:par>
-                </p:childTnLst>
-              </p:cTn>
-              <p:prevCondLst>
-                <p:cond evt="onPrev" delay="0">
-                  <p:tgtEl>
-                    <p:sldTgt/>
-                  </p:tgtEl>
-                </p:cond>
-              </p:prevCondLst>
-              <p:nextCondLst>
-                <p:cond evt="onNext" delay="0">
-                  <p:tgtEl>
-                    <p:sldTgt/>
-                  </p:tgtEl>
-                </p:cond>
-              </p:nextCondLst>
-            </p:seq>
-          </p:childTnLst>
-        </p:cTn>
-      </p:par>
-    </p:tnLst>
-    <p:bldLst>
-      <p:bldP spid="15362" grpId="0" build="p"/>
-      <p:bldP spid="2" grpId="0"/>
-    </p:bldLst>
-  </p:timing>
-</p:sld>
-</file>
-
-<file path=ppt/slides/slide21.xml><?xml version="1.0" encoding="utf-8"?>
-<p:sld xmlns:a="http://schemas.openxmlformats.org/drawingml/2006/main" xmlns:r="http://schemas.openxmlformats.org/officeDocument/2006/relationships" xmlns:p="http://schemas.openxmlformats.org/presentationml/2006/main">
-  <p:cSld>
-    <p:spTree>
-      <p:nvGrpSpPr>
-        <p:cNvPr id="1" name=""/>
-        <p:cNvGrpSpPr/>
-        <p:nvPr/>
-      </p:nvGrpSpPr>
-      <p:grpSpPr>
-        <a:xfrm>
-          <a:off x="0" y="0"/>
-          <a:ext cx="0" cy="0"/>
-          <a:chOff x="0" y="0"/>
-          <a:chExt cx="0" cy="0"/>
-        </a:xfrm>
-      </p:grpSpPr>
-      <p:sp>
-        <p:nvSpPr>
-          <p:cNvPr id="15362" name="內容版面配置區 5"/>
-          <p:cNvSpPr>
-            <a:spLocks noGrp="1"/>
-          </p:cNvSpPr>
-          <p:nvPr>
-            <p:ph idx="1"/>
-          </p:nvPr>
-        </p:nvSpPr>
-        <p:spPr>
-          <a:xfrm>
-            <a:off x="457200" y="936625"/>
-            <a:ext cx="8229600" cy="3575050"/>
-          </a:xfrm>
-        </p:spPr>
-        <p:txBody>
-          <a:bodyPr/>
-          <a:lstStyle/>
-          <a:p>
-            <a:pPr marL="342900" lvl="1" indent="-342900" eaLnBrk="1" hangingPunct="1">
-              <a:buFont typeface="Arial" charset="0"/>
-              <a:buChar char="•"/>
-              <a:defRPr/>
-            </a:pPr>
-            <a:r>
-              <a:rPr lang="zh-TW" altLang="en-US" sz="1800" dirty="0" smtClean="0">
-                <a:latin typeface="Times New Roman" panose="02020603050405020304" pitchFamily="18" charset="0"/>
-                <a:cs typeface="Times New Roman" panose="02020603050405020304" pitchFamily="18" charset="0"/>
-              </a:rPr>
-              <a:t>結論</a:t>
-            </a:r>
-            <a:endParaRPr lang="en-US" altLang="zh-TW" sz="1800" dirty="0" smtClean="0">
-              <a:latin typeface="Times New Roman" panose="02020603050405020304" pitchFamily="18" charset="0"/>
-              <a:cs typeface="Times New Roman" panose="02020603050405020304" pitchFamily="18" charset="0"/>
-            </a:endParaRPr>
-          </a:p>
-          <a:p>
-            <a:pPr marL="742950" lvl="2" indent="-342900" eaLnBrk="1" hangingPunct="1">
-              <a:buFont typeface="Arial" charset="0"/>
-              <a:buChar char="•"/>
-              <a:defRPr/>
-            </a:pPr>
-            <a:r>
-              <a:rPr lang="zh-TW" altLang="en-US" sz="1400" dirty="0" smtClean="0">
-                <a:latin typeface="Times New Roman" panose="02020603050405020304" pitchFamily="18" charset="0"/>
-                <a:cs typeface="Times New Roman" panose="02020603050405020304" pitchFamily="18" charset="0"/>
-              </a:rPr>
-              <a:t>透過程式自動擷取主機 </a:t>
-            </a:r>
-            <a:r>
-              <a:rPr lang="en-US" altLang="zh-TW" sz="1400" dirty="0" smtClean="0">
-                <a:latin typeface="Times New Roman" panose="02020603050405020304" pitchFamily="18" charset="0"/>
-                <a:cs typeface="Times New Roman" panose="02020603050405020304" pitchFamily="18" charset="0"/>
-              </a:rPr>
-              <a:t>GPU </a:t>
-            </a:r>
-            <a:r>
-              <a:rPr lang="zh-TW" altLang="en-US" sz="1400" dirty="0" smtClean="0">
-                <a:latin typeface="Times New Roman" panose="02020603050405020304" pitchFamily="18" charset="0"/>
-                <a:cs typeface="Times New Roman" panose="02020603050405020304" pitchFamily="18" charset="0"/>
-              </a:rPr>
-              <a:t>解析度</a:t>
-            </a:r>
-            <a:endParaRPr lang="en-US" altLang="zh-TW" sz="1400" dirty="0" smtClean="0">
-              <a:latin typeface="Times New Roman" panose="02020603050405020304" pitchFamily="18" charset="0"/>
-              <a:cs typeface="Times New Roman" panose="02020603050405020304" pitchFamily="18" charset="0"/>
-            </a:endParaRPr>
-          </a:p>
-          <a:p>
-            <a:pPr marL="742950" lvl="2" indent="-342900" eaLnBrk="1" hangingPunct="1">
-              <a:buFont typeface="Arial" charset="0"/>
-              <a:buChar char="•"/>
-              <a:defRPr/>
-            </a:pPr>
-            <a:r>
-              <a:rPr lang="zh-TW" altLang="en-US" sz="1400" dirty="0" smtClean="0">
-                <a:latin typeface="Times New Roman" panose="02020603050405020304" pitchFamily="18" charset="0"/>
-                <a:cs typeface="Times New Roman" panose="02020603050405020304" pitchFamily="18" charset="0"/>
-              </a:rPr>
-              <a:t>長時間重開機解析度擷取</a:t>
-            </a:r>
-            <a:endParaRPr lang="en-US" altLang="zh-TW" sz="1400" dirty="0">
-              <a:latin typeface="Times New Roman" panose="02020603050405020304" pitchFamily="18" charset="0"/>
-              <a:cs typeface="Times New Roman" panose="02020603050405020304" pitchFamily="18" charset="0"/>
-            </a:endParaRPr>
-          </a:p>
-          <a:p>
-            <a:pPr eaLnBrk="1" hangingPunct="1">
-              <a:buFont typeface="Arial" charset="0"/>
-              <a:buChar char="•"/>
-              <a:defRPr/>
-            </a:pPr>
-            <a:endParaRPr lang="en-US" altLang="zh-TW" sz="1800" dirty="0">
-              <a:latin typeface="Times New Roman" panose="02020603050405020304" pitchFamily="18" charset="0"/>
-              <a:cs typeface="Times New Roman" panose="02020603050405020304" pitchFamily="18" charset="0"/>
-            </a:endParaRPr>
-          </a:p>
-        </p:txBody>
-      </p:sp>
-      <p:sp>
-        <p:nvSpPr>
-          <p:cNvPr id="2" name="標題 4"/>
-          <p:cNvSpPr>
-            <a:spLocks noGrp="1"/>
-          </p:cNvSpPr>
-          <p:nvPr>
-            <p:ph type="title"/>
-          </p:nvPr>
-        </p:nvSpPr>
-        <p:spPr>
-          <a:xfrm>
-            <a:off x="457200" y="87313"/>
-            <a:ext cx="8229600" cy="756000"/>
-          </a:xfrm>
-        </p:spPr>
-        <p:txBody>
-          <a:bodyPr/>
-          <a:lstStyle/>
-          <a:p>
-            <a:pPr eaLnBrk="1" hangingPunct="1">
-              <a:defRPr/>
-            </a:pPr>
-            <a:r>
-              <a:rPr lang="en-US" altLang="zh-TW" sz="2800" kern="0" dirty="0" smtClean="0">
-                <a:solidFill>
-                  <a:srgbClr val="003366"/>
-                </a:solidFill>
-                <a:latin typeface="Times New Roman" panose="02020603050405020304" pitchFamily="18" charset="0"/>
-                <a:cs typeface="Times New Roman" panose="02020603050405020304" pitchFamily="18" charset="0"/>
-              </a:rPr>
-              <a:t>Resolution automation</a:t>
-            </a:r>
-            <a:endParaRPr lang="zh-TW" altLang="en-US" sz="2800" kern="0" dirty="0">
-              <a:solidFill>
-                <a:srgbClr val="003366"/>
-              </a:solidFill>
-              <a:latin typeface="Times New Roman" panose="02020603050405020304" pitchFamily="18" charset="0"/>
-              <a:cs typeface="Times New Roman" panose="02020603050405020304" pitchFamily="18" charset="0"/>
-            </a:endParaRPr>
-          </a:p>
-        </p:txBody>
-      </p:sp>
-    </p:spTree>
-    <p:extLst>
-      <p:ext uri="{BB962C8B-B14F-4D97-AF65-F5344CB8AC3E}">
-        <p14:creationId xmlns:p14="http://schemas.microsoft.com/office/powerpoint/2010/main" val="2397016849"/>
-      </p:ext>
-    </p:extLst>
-  </p:cSld>
-  <p:clrMapOvr>
-    <a:masterClrMapping/>
-  </p:clrMapOvr>
-  <mc:AlternateContent xmlns:mc="http://schemas.openxmlformats.org/markup-compatibility/2006" xmlns:p14="http://schemas.microsoft.com/office/powerpoint/2010/main">
-    <mc:Choice Requires="p14">
-      <p:transition spd="med" p14:dur="700" advClick="0">
-        <p:fade/>
-      </p:transition>
-    </mc:Choice>
-    <mc:Fallback xmlns="">
-      <p:transition spd="med" advClick="0">
-        <p:fade/>
-      </p:transition>
-    </mc:Fallback>
-  </mc:AlternateContent>
-  <p:timing>
-    <p:tnLst>
-      <p:par>
-        <p:cTn id="1" dur="indefinite" restart="never" nodeType="tmRoot">
-          <p:childTnLst>
-            <p:seq concurrent="1" nextAc="seek">
-              <p:cTn id="2" dur="indefinite" nodeType="mainSeq">
-                <p:childTnLst>
-                  <p:par>
-                    <p:cTn id="3" fill="hold">
-                      <p:stCondLst>
-                        <p:cond delay="indefinite"/>
-                        <p:cond evt="onBegin" delay="0">
-                          <p:tn val="2"/>
-                        </p:cond>
-                      </p:stCondLst>
-                      <p:childTnLst>
-                        <p:par>
-                          <p:cTn id="4" fill="hold">
-                            <p:stCondLst>
-                              <p:cond delay="0"/>
-                            </p:stCondLst>
-                            <p:childTnLst>
                               <p:par>
-                                <p:cTn id="5" presetID="10" presetClass="entr" presetSubtype="0" fill="hold" grpId="0" nodeType="afterEffect">
+                                <p:cTn id="23" presetID="10" presetClass="entr" presetSubtype="0" fill="hold" grpId="0" nodeType="withEffect">
                                   <p:stCondLst>
                                     <p:cond delay="0"/>
                                   </p:stCondLst>
                                   <p:childTnLst>
                                     <p:set>
                                       <p:cBhvr>
-                                        <p:cTn id="6" dur="1" fill="hold">
+                                        <p:cTn id="24" dur="1" fill="hold">
                                           <p:stCondLst>
                                             <p:cond delay="0"/>
                                           </p:stCondLst>
                                         </p:cTn>
                                         <p:tgtEl>
-                                          <p:spTgt spid="2"/>
+                                          <p:spTgt spid="15362">
+                                            <p:txEl>
+                                              <p:pRg st="7" end="7"/>
+                                            </p:txEl>
+                                          </p:spTgt>
                                         </p:tgtEl>
                                         <p:attrNameLst>
                                           <p:attrName>style.visibility</p:attrName>
@@ -12792,9 +14041,56 @@
                                     </p:set>
                                     <p:animEffect transition="in" filter="fade">
                                       <p:cBhvr>
-                                        <p:cTn id="7" dur="250"/>
-                                        <p:tgtEl>
-                                          <p:spTgt spid="2"/>
+                                        <p:cTn id="25" dur="250"/>
+                                        <p:tgtEl>
+                                          <p:spTgt spid="15362">
+                                            <p:txEl>
+                                              <p:pRg st="7" end="7"/>
+                                            </p:txEl>
+                                          </p:spTgt>
+                                        </p:tgtEl>
+                                      </p:cBhvr>
+                                    </p:animEffect>
+                                  </p:childTnLst>
+                                </p:cTn>
+                              </p:par>
+                              <p:par>
+                                <p:cTn id="26" presetID="10" presetClass="entr" presetSubtype="0" fill="hold" grpId="0" nodeType="withEffect">
+                                  <p:stCondLst>
+                                    <p:cond delay="0"/>
+                                  </p:stCondLst>
+                                  <p:childTnLst>
+                                    <p:set>
+                                      <p:cBhvr>
+                                        <p:cTn id="27" dur="1" fill="hold">
+                                          <p:stCondLst>
+                                            <p:cond delay="0"/>
+                                          </p:stCondLst>
+                                        </p:cTn>
+                                        <p:tgtEl>
+                                          <p:spTgt spid="15362">
+                                            <p:txEl>
+                                              <p:pRg st="8" end="8"/>
+                                            </p:txEl>
+                                          </p:spTgt>
+                                        </p:tgtEl>
+                                        <p:attrNameLst>
+                                          <p:attrName>style.visibility</p:attrName>
+                                        </p:attrNameLst>
+                                      </p:cBhvr>
+                                      <p:to>
+                                        <p:strVal val="visible"/>
+                                      </p:to>
+                                    </p:set>
+                                    <p:animEffect transition="in" filter="fade">
+                                      <p:cBhvr>
+                                        <p:cTn id="28" dur="250"/>
+                                        <p:tgtEl>
+                                          <p:spTgt spid="15362">
+                                            <p:txEl>
+                                              <p:pRg st="8" end="8"/>
+                                            </p:txEl>
+                                          </p:spTgt>
                                         </p:tgtEl>
                                       </p:cBhvr>
                                     </p:animEffect>
@@ -12805,30 +14101,26 @@
                           </p:cTn>
                         </p:par>
                         <p:par>
-                          <p:cTn id="8" fill="hold">
+                          <p:cTn id="29" fill="hold">
                             <p:stCondLst>
-                              <p:cond delay="250"/>
+                              <p:cond delay="1000"/>
                             </p:stCondLst>
                             <p:childTnLst>
                               <p:par>
-                                <p:cTn id="9" presetID="10" presetClass="entr" presetSubtype="0" fill="hold" grpId="0" nodeType="afterEffect">
+                                <p:cTn id="30" presetID="10" presetClass="entr" presetSubtype="0" fill="hold" nodeType="afterEffect">
                                   <p:stCondLst>
                                     <p:cond delay="0"/>
                                   </p:stCondLst>
                                   <p:childTnLst>
                                     <p:set>
                                       <p:cBhvr>
-                                        <p:cTn id="10" dur="1" fill="hold">
+                                        <p:cTn id="31" dur="1" fill="hold">
                                           <p:stCondLst>
                                             <p:cond delay="0"/>
                                           </p:stCondLst>
                                         </p:cTn>
                                         <p:tgtEl>
-                                          <p:spTgt spid="15362">
-                                            <p:txEl>
-                                              <p:pRg st="0" end="0"/>
-                                            </p:txEl>
-                                          </p:spTgt>
+                                          <p:spTgt spid="3"/>
                                         </p:tgtEl>
                                         <p:attrNameLst>
                                           <p:attrName>style.visibility</p:attrName>
@@ -12840,99 +14132,9 @@
                                     </p:set>
                                     <p:animEffect transition="in" filter="fade">
                                       <p:cBhvr>
-                                        <p:cTn id="11" dur="250"/>
-                                        <p:tgtEl>
-                                          <p:spTgt spid="15362">
-                                            <p:txEl>
-                                              <p:pRg st="0" end="0"/>
-                                            </p:txEl>
-                                          </p:spTgt>
-                                        </p:tgtEl>
-                                      </p:cBhvr>
-                                    </p:animEffect>
-                                  </p:childTnLst>
-                                </p:cTn>
-                              </p:par>
-                              <p:par>
-                                <p:cTn id="12" presetID="10" presetClass="entr" presetSubtype="0" fill="hold" grpId="0" nodeType="withEffect">
-                                  <p:stCondLst>
-                                    <p:cond delay="0"/>
-                                  </p:stCondLst>
-                                  <p:childTnLst>
-                                    <p:set>
-                                      <p:cBhvr>
-                                        <p:cTn id="13" dur="1" fill="hold">
-                                          <p:stCondLst>
-                                            <p:cond delay="0"/>
-                                          </p:stCondLst>
-                                        </p:cTn>
-                                        <p:tgtEl>
-                                          <p:spTgt spid="15362">
-                                            <p:txEl>
-                                              <p:pRg st="1" end="1"/>
-                                            </p:txEl>
-                                          </p:spTgt>
-                                        </p:tgtEl>
-                                        <p:attrNameLst>
-                                          <p:attrName>style.visibility</p:attrName>
-                                        </p:attrNameLst>
-                                      </p:cBhvr>
-                                      <p:to>
-                                        <p:strVal val="visible"/>
-                                      </p:to>
-                                    </p:set>
-                                    <p:animEffect transition="in" filter="fade">
-                                      <p:cBhvr>
-                                        <p:cTn id="14" dur="250"/>
-                                        <p:tgtEl>
-                                          <p:spTgt spid="15362">
-                                            <p:txEl>
-                                              <p:pRg st="1" end="1"/>
-                                            </p:txEl>
-                                          </p:spTgt>
-                                        </p:tgtEl>
-                                      </p:cBhvr>
-                                    </p:animEffect>
-                                  </p:childTnLst>
-                                </p:cTn>
-                              </p:par>
-                              <p:par>
-                                <p:cTn id="15" presetID="10" presetClass="entr" presetSubtype="0" fill="hold" grpId="0" nodeType="withEffect">
-                                  <p:stCondLst>
-                                    <p:cond delay="0"/>
-                                  </p:stCondLst>
-                                  <p:childTnLst>
-                                    <p:set>
-                                      <p:cBhvr>
-                                        <p:cTn id="16" dur="1" fill="hold">
-                                          <p:stCondLst>
-                                            <p:cond delay="0"/>
-                                          </p:stCondLst>
-                                        </p:cTn>
-                                        <p:tgtEl>
-                                          <p:spTgt spid="15362">
-                                            <p:txEl>
-                                              <p:pRg st="2" end="2"/>
-                                            </p:txEl>
-                                          </p:spTgt>
-                                        </p:tgtEl>
-                                        <p:attrNameLst>
-                                          <p:attrName>style.visibility</p:attrName>
-                                        </p:attrNameLst>
-                                      </p:cBhvr>
-                                      <p:to>
-                                        <p:strVal val="visible"/>
-                                      </p:to>
-                                    </p:set>
-                                    <p:animEffect transition="in" filter="fade">
-                                      <p:cBhvr>
-                                        <p:cTn id="17" dur="250"/>
-                                        <p:tgtEl>
-                                          <p:spTgt spid="15362">
-                                            <p:txEl>
-                                              <p:pRg st="2" end="2"/>
-                                            </p:txEl>
-                                          </p:spTgt>
+                                        <p:cTn id="32" dur="250"/>
+                                        <p:tgtEl>
+                                          <p:spTgt spid="3"/>
                                         </p:tgtEl>
                                       </p:cBhvr>
                                     </p:animEffect>
@@ -15893,16 +17095,65 @@
                 <a:latin typeface="Times New Roman" panose="02020603050405020304" pitchFamily="18" charset="0"/>
                 <a:cs typeface="Times New Roman" panose="02020603050405020304" pitchFamily="18" charset="0"/>
               </a:rPr>
-              <a:t>System Structure</a:t>
-            </a:r>
-          </a:p>
-          <a:p>
-            <a:pPr eaLnBrk="1" hangingPunct="1">
+              <a:t>The tool of pre-conditions base on </a:t>
+            </a:r>
+            <a:r>
+              <a:rPr lang="en-US" altLang="zh-TW" sz="1800" dirty="0" smtClean="0">
+                <a:latin typeface="Times New Roman" panose="02020603050405020304" pitchFamily="18" charset="0"/>
+                <a:cs typeface="Times New Roman" panose="02020603050405020304" pitchFamily="18" charset="0"/>
+              </a:rPr>
+              <a:t>the</a:t>
+            </a:r>
+            <a:r>
+              <a:rPr lang="zh-TW" altLang="en-US" sz="1800" dirty="0" smtClean="0">
+                <a:latin typeface="Times New Roman" panose="02020603050405020304" pitchFamily="18" charset="0"/>
+                <a:cs typeface="Times New Roman" panose="02020603050405020304" pitchFamily="18" charset="0"/>
+              </a:rPr>
+              <a:t> </a:t>
+            </a:r>
+            <a:r>
+              <a:rPr lang="en-US" altLang="zh-TW" sz="1800" dirty="0" smtClean="0">
+                <a:latin typeface="Times New Roman" panose="02020603050405020304" pitchFamily="18" charset="0"/>
+                <a:cs typeface="Times New Roman" panose="02020603050405020304" pitchFamily="18" charset="0"/>
+              </a:rPr>
+              <a:t>exe script.</a:t>
+            </a:r>
+          </a:p>
+          <a:p>
+            <a:pPr marL="742950" lvl="2" indent="-342900" eaLnBrk="1" hangingPunct="1">
               <a:buFont typeface="Arial" charset="0"/>
               <a:buChar char="•"/>
               <a:defRPr/>
             </a:pPr>
-            <a:endParaRPr lang="en-US" altLang="zh-TW" sz="1800" dirty="0">
+            <a:r>
+              <a:rPr lang="en-US" altLang="zh-TW" sz="1400" dirty="0" smtClean="0">
+                <a:latin typeface="Times New Roman" panose="02020603050405020304" pitchFamily="18" charset="0"/>
+                <a:cs typeface="Times New Roman" panose="02020603050405020304" pitchFamily="18" charset="0"/>
+              </a:rPr>
+              <a:t>bit.exe -c </a:t>
+            </a:r>
+            <a:r>
+              <a:rPr lang="en-US" altLang="zh-TW" sz="1400" dirty="0" err="1" smtClean="0">
+                <a:latin typeface="Times New Roman" panose="02020603050405020304" pitchFamily="18" charset="0"/>
+                <a:cs typeface="Times New Roman" panose="02020603050405020304" pitchFamily="18" charset="0"/>
+              </a:rPr>
+              <a:t>dqa.bitcfg</a:t>
+            </a:r>
+            <a:r>
+              <a:rPr lang="en-US" altLang="zh-TW" sz="1400" dirty="0" smtClean="0">
+                <a:latin typeface="Times New Roman" panose="02020603050405020304" pitchFamily="18" charset="0"/>
+                <a:cs typeface="Times New Roman" panose="02020603050405020304" pitchFamily="18" charset="0"/>
+              </a:rPr>
+              <a:t> -r -p -D “minutes”</a:t>
+            </a:r>
+          </a:p>
+          <a:p>
+            <a:pPr marL="742950" lvl="2" indent="-342900" eaLnBrk="1" hangingPunct="1">
+              <a:buFont typeface="Arial" charset="0"/>
+              <a:buChar char="•"/>
+              <a:defRPr/>
+            </a:pPr>
+            <a:endParaRPr lang="en-US" altLang="zh-TW" sz="1400" dirty="0" smtClean="0">
               <a:latin typeface="Times New Roman" panose="02020603050405020304" pitchFamily="18" charset="0"/>
               <a:cs typeface="Times New Roman" panose="02020603050405020304" pitchFamily="18" charset="0"/>
             </a:endParaRPr>
@@ -15962,6 +17213,150 @@
           </a:p>
         </p:txBody>
       </p:sp>
+      <p:pic>
+        <p:nvPicPr>
+          <p:cNvPr id="3" name="圖片 2"/>
+          <p:cNvPicPr>
+            <a:picLocks noChangeAspect="1"/>
+          </p:cNvPicPr>
+          <p:nvPr/>
+        </p:nvPicPr>
+        <p:blipFill>
+          <a:blip r:embed="rId4">
+            <a:extLst>
+              <a:ext uri="{28A0092B-C50C-407E-A947-70E740481C1C}">
+                <a14:useLocalDpi xmlns:a14="http://schemas.microsoft.com/office/drawing/2010/main" val="0"/>
+              </a:ext>
+            </a:extLst>
+          </a:blip>
+          <a:stretch>
+            <a:fillRect/>
+          </a:stretch>
+        </p:blipFill>
+        <p:spPr>
+          <a:xfrm>
+            <a:off x="889347" y="1637044"/>
+            <a:ext cx="5468421" cy="2997679"/>
+          </a:xfrm>
+          <a:prstGeom prst="rect">
+            <a:avLst/>
+          </a:prstGeom>
+        </p:spPr>
+      </p:pic>
+      <p:graphicFrame>
+        <p:nvGraphicFramePr>
+          <p:cNvPr id="4" name="物件 3"/>
+          <p:cNvGraphicFramePr>
+            <a:graphicFrameLocks noChangeAspect="1"/>
+          </p:cNvGraphicFramePr>
+          <p:nvPr>
+            <p:extLst>
+              <p:ext uri="{D42A27DB-BD31-4B8C-83A1-F6EECF244321}">
+                <p14:modId xmlns:p14="http://schemas.microsoft.com/office/powerpoint/2010/main" val="2379958713"/>
+              </p:ext>
+            </p:extLst>
+          </p:nvPr>
+        </p:nvGraphicFramePr>
+        <p:xfrm>
+          <a:off x="6712782" y="3541148"/>
+          <a:ext cx="1789407" cy="482211"/>
+        </p:xfrm>
+        <a:graphic>
+          <a:graphicData uri="http://schemas.openxmlformats.org/presentationml/2006/ole">
+            <mc:AlternateContent xmlns:mc="http://schemas.openxmlformats.org/markup-compatibility/2006">
+              <mc:Choice xmlns:v="urn:schemas-microsoft-com:vml" Requires="v">
+                <p:oleObj spid="_x0000_s4128" name="封裝程式殼層物件" showAsIcon="1" r:id="rId5" imgW="1467360" imgH="394920" progId="Package">
+                  <p:embed/>
+                </p:oleObj>
+              </mc:Choice>
+              <mc:Fallback>
+                <p:oleObj name="封裝程式殼層物件" showAsIcon="1" r:id="rId5" imgW="1467360" imgH="394920" progId="Package">
+                  <p:embed/>
+                  <p:pic>
+                    <p:nvPicPr>
+                      <p:cNvPr id="0" name=""/>
+                      <p:cNvPicPr/>
+                      <p:nvPr/>
+                    </p:nvPicPr>
+                    <p:blipFill>
+                      <a:blip r:embed="rId6"/>
+                      <a:stretch>
+                        <a:fillRect/>
+                      </a:stretch>
+                    </p:blipFill>
+                    <p:spPr>
+                      <a:xfrm>
+                        <a:off x="6712782" y="3541148"/>
+                        <a:ext cx="1789407" cy="482211"/>
+                      </a:xfrm>
+                      <a:prstGeom prst="rect">
+                        <a:avLst/>
+                      </a:prstGeom>
+                    </p:spPr>
+                  </p:pic>
+                </p:oleObj>
+              </mc:Fallback>
+            </mc:AlternateContent>
+          </a:graphicData>
+        </a:graphic>
+      </p:graphicFrame>
+      <p:graphicFrame>
+        <p:nvGraphicFramePr>
+          <p:cNvPr id="5" name="物件 4"/>
+          <p:cNvGraphicFramePr>
+            <a:graphicFrameLocks noChangeAspect="1"/>
+          </p:cNvGraphicFramePr>
+          <p:nvPr>
+            <p:extLst>
+              <p:ext uri="{D42A27DB-BD31-4B8C-83A1-F6EECF244321}">
+                <p14:modId xmlns:p14="http://schemas.microsoft.com/office/powerpoint/2010/main" val="3929643888"/>
+              </p:ext>
+            </p:extLst>
+          </p:nvPr>
+        </p:nvGraphicFramePr>
+        <p:xfrm>
+          <a:off x="6712782" y="4139753"/>
+          <a:ext cx="1800973" cy="494970"/>
+        </p:xfrm>
+        <a:graphic>
+          <a:graphicData uri="http://schemas.openxmlformats.org/presentationml/2006/ole">
+            <mc:AlternateContent xmlns:mc="http://schemas.openxmlformats.org/markup-compatibility/2006">
+              <mc:Choice xmlns:v="urn:schemas-microsoft-com:vml" Requires="v">
+                <p:oleObj spid="_x0000_s4129" name="封裝程式殼層物件" showAsIcon="1" r:id="rId7" imgW="1438200" imgH="394920" progId="Package">
+                  <p:embed/>
+                </p:oleObj>
+              </mc:Choice>
+              <mc:Fallback>
+                <p:oleObj name="封裝程式殼層物件" showAsIcon="1" r:id="rId7" imgW="1438200" imgH="394920" progId="Package">
+                  <p:embed/>
+                  <p:pic>
+                    <p:nvPicPr>
+                      <p:cNvPr id="0" name=""/>
+                      <p:cNvPicPr/>
+                      <p:nvPr/>
+                    </p:nvPicPr>
+                    <p:blipFill>
+                      <a:blip r:embed="rId8"/>
+                      <a:stretch>
+                        <a:fillRect/>
+                      </a:stretch>
+                    </p:blipFill>
+                    <p:spPr>
+                      <a:xfrm>
+                        <a:off x="6712782" y="4139753"/>
+                        <a:ext cx="1800973" cy="494970"/>
+                      </a:xfrm>
+                      <a:prstGeom prst="rect">
+                        <a:avLst/>
+                      </a:prstGeom>
+                    </p:spPr>
+                  </p:pic>
+                </p:oleObj>
+              </mc:Fallback>
+            </mc:AlternateContent>
+          </a:graphicData>
+        </a:graphic>
+      </p:graphicFrame>
     </p:spTree>
     <p:extLst>
       <p:ext uri="{BB962C8B-B14F-4D97-AF65-F5344CB8AC3E}">
@@ -16088,6 +17483,154 @@
                                               <p:pRg st="0" end="0"/>
                                             </p:txEl>
                                           </p:spTgt>
+                                        </p:tgtEl>
+                                      </p:cBhvr>
+                                    </p:animEffect>
+                                  </p:childTnLst>
+                                </p:cTn>
+                              </p:par>
+                              <p:par>
+                                <p:cTn id="12" presetID="10" presetClass="entr" presetSubtype="0" fill="hold" grpId="0" nodeType="withEffect">
+                                  <p:stCondLst>
+                                    <p:cond delay="0"/>
+                                  </p:stCondLst>
+                                  <p:childTnLst>
+                                    <p:set>
+                                      <p:cBhvr>
+                                        <p:cTn id="13" dur="1" fill="hold">
+                                          <p:stCondLst>
+                                            <p:cond delay="0"/>
+                                          </p:stCondLst>
+                                        </p:cTn>
+                                        <p:tgtEl>
+                                          <p:spTgt spid="15362">
+                                            <p:txEl>
+                                              <p:pRg st="1" end="1"/>
+                                            </p:txEl>
+                                          </p:spTgt>
+                                        </p:tgtEl>
+                                        <p:attrNameLst>
+                                          <p:attrName>style.visibility</p:attrName>
+                                        </p:attrNameLst>
+                                      </p:cBhvr>
+                                      <p:to>
+                                        <p:strVal val="visible"/>
+                                      </p:to>
+                                    </p:set>
+                                    <p:animEffect transition="in" filter="fade">
+                                      <p:cBhvr>
+                                        <p:cTn id="14" dur="250"/>
+                                        <p:tgtEl>
+                                          <p:spTgt spid="15362">
+                                            <p:txEl>
+                                              <p:pRg st="1" end="1"/>
+                                            </p:txEl>
+                                          </p:spTgt>
+                                        </p:tgtEl>
+                                      </p:cBhvr>
+                                    </p:animEffect>
+                                  </p:childTnLst>
+                                </p:cTn>
+                              </p:par>
+                              <p:par>
+                                <p:cTn id="15" presetID="10" presetClass="entr" presetSubtype="0" fill="hold" nodeType="withEffect">
+                                  <p:stCondLst>
+                                    <p:cond delay="0"/>
+                                  </p:stCondLst>
+                                  <p:childTnLst>
+                                    <p:set>
+                                      <p:cBhvr>
+                                        <p:cTn id="16" dur="1" fill="hold">
+                                          <p:stCondLst>
+                                            <p:cond delay="0"/>
+                                          </p:stCondLst>
+                                        </p:cTn>
+                                        <p:tgtEl>
+                                          <p:spTgt spid="3"/>
+                                        </p:tgtEl>
+                                        <p:attrNameLst>
+                                          <p:attrName>style.visibility</p:attrName>
+                                        </p:attrNameLst>
+                                      </p:cBhvr>
+                                      <p:to>
+                                        <p:strVal val="visible"/>
+                                      </p:to>
+                                    </p:set>
+                                    <p:animEffect transition="in" filter="fade">
+                                      <p:cBhvr>
+                                        <p:cTn id="17" dur="250"/>
+                                        <p:tgtEl>
+                                          <p:spTgt spid="3"/>
+                                        </p:tgtEl>
+                                      </p:cBhvr>
+                                    </p:animEffect>
+                                  </p:childTnLst>
+                                </p:cTn>
+                              </p:par>
+                              <p:par>
+                                <p:cTn id="18" presetID="10" presetClass="entr" presetSubtype="0" fill="hold" nodeType="withEffect">
+                                  <p:stCondLst>
+                                    <p:cond delay="0"/>
+                                  </p:stCondLst>
+                                  <p:childTnLst>
+                                    <p:set>
+                                      <p:cBhvr>
+                                        <p:cTn id="19" dur="1" fill="hold">
+                                          <p:stCondLst>
+                                            <p:cond delay="0"/>
+                                          </p:stCondLst>
+                                        </p:cTn>
+                                        <p:tgtEl>
+                                          <p:spTgt spid="4"/>
+                                        </p:tgtEl>
+                                        <p:attrNameLst>
+                                          <p:attrName>style.visibility</p:attrName>
+                                        </p:attrNameLst>
+                                      </p:cBhvr>
+                                      <p:to>
+                                        <p:strVal val="visible"/>
+                                      </p:to>
+                                    </p:set>
+                                    <p:animEffect transition="in" filter="fade">
+                                      <p:cBhvr>
+                                        <p:cTn id="20" dur="250"/>
+                                        <p:tgtEl>
+                                          <p:spTgt spid="4"/>
+                                        </p:tgtEl>
+                                      </p:cBhvr>
+                                    </p:animEffect>
+                                  </p:childTnLst>
+                                </p:cTn>
+                              </p:par>
+                              <p:par>
+                                <p:cTn id="21" presetID="10" presetClass="entr" presetSubtype="0" fill="hold" nodeType="withEffect">
+                                  <p:stCondLst>
+                                    <p:cond delay="0"/>
+                                  </p:stCondLst>
+                                  <p:childTnLst>
+                                    <p:set>
+                                      <p:cBhvr>
+                                        <p:cTn id="22" dur="1" fill="hold">
+                                          <p:stCondLst>
+                                            <p:cond delay="0"/>
+                                          </p:stCondLst>
+                                        </p:cTn>
+                                        <p:tgtEl>
+                                          <p:spTgt spid="5"/>
+                                        </p:tgtEl>
+                                        <p:attrNameLst>
+                                          <p:attrName>style.visibility</p:attrName>
+                                        </p:attrNameLst>
+                                      </p:cBhvr>
+                                      <p:to>
+                                        <p:strVal val="visible"/>
+                                      </p:to>
+                                    </p:set>
+                                    <p:animEffect transition="in" filter="fade">
+                                      <p:cBhvr>
+                                        <p:cTn id="23" dur="250"/>
+                                        <p:tgtEl>
+                                          <p:spTgt spid="5"/>
                                         </p:tgtEl>
                                       </p:cBhvr>
                                     </p:animEffect>
@@ -16172,12 +17715,126 @@
               <a:defRPr/>
             </a:pPr>
             <a:r>
-              <a:rPr lang="en-US" altLang="zh-TW" sz="1800" dirty="0">
+              <a:rPr lang="zh-TW" altLang="en-US" sz="1800" dirty="0">
                 <a:latin typeface="Times New Roman" panose="02020603050405020304" pitchFamily="18" charset="0"/>
                 <a:cs typeface="Times New Roman" panose="02020603050405020304" pitchFamily="18" charset="0"/>
               </a:rPr>
-              <a:t>Conclusion</a:t>
-            </a:r>
+              <a:t>結論</a:t>
+            </a:r>
+            <a:endParaRPr lang="en-US" altLang="zh-TW" sz="1800" dirty="0">
+              <a:latin typeface="Times New Roman" panose="02020603050405020304" pitchFamily="18" charset="0"/>
+              <a:cs typeface="Times New Roman" panose="02020603050405020304" pitchFamily="18" charset="0"/>
+            </a:endParaRPr>
+          </a:p>
+          <a:p>
+            <a:pPr marL="742950" lvl="2" indent="-342900" eaLnBrk="1" hangingPunct="1">
+              <a:buFont typeface="Arial" charset="0"/>
+              <a:buChar char="•"/>
+              <a:defRPr/>
+            </a:pPr>
+            <a:r>
+              <a:rPr lang="zh-TW" altLang="en-US" sz="1400" dirty="0" smtClean="0">
+                <a:latin typeface="Times New Roman" panose="02020603050405020304" pitchFamily="18" charset="0"/>
+                <a:cs typeface="Times New Roman" panose="02020603050405020304" pitchFamily="18" charset="0"/>
+              </a:rPr>
+              <a:t>透過 </a:t>
+            </a:r>
+            <a:r>
+              <a:rPr lang="en-US" altLang="zh-TW" sz="1400" dirty="0" err="1" smtClean="0">
+                <a:latin typeface="Times New Roman" panose="02020603050405020304" pitchFamily="18" charset="0"/>
+                <a:cs typeface="Times New Roman" panose="02020603050405020304" pitchFamily="18" charset="0"/>
+              </a:rPr>
+              <a:t>BurnInTest</a:t>
+            </a:r>
+            <a:r>
+              <a:rPr lang="zh-TW" altLang="en-US" sz="1400" dirty="0">
+                <a:latin typeface="Times New Roman" panose="02020603050405020304" pitchFamily="18" charset="0"/>
+                <a:cs typeface="Times New Roman" panose="02020603050405020304" pitchFamily="18" charset="0"/>
+              </a:rPr>
+              <a:t> </a:t>
+            </a:r>
+            <a:r>
+              <a:rPr lang="zh-TW" altLang="en-US" sz="1400" dirty="0" smtClean="0">
+                <a:latin typeface="Times New Roman" panose="02020603050405020304" pitchFamily="18" charset="0"/>
+                <a:cs typeface="Times New Roman" panose="02020603050405020304" pitchFamily="18" charset="0"/>
+              </a:rPr>
+              <a:t>的</a:t>
+            </a:r>
+            <a:r>
+              <a:rPr lang="en-US" altLang="zh-TW" sz="1400" dirty="0">
+                <a:latin typeface="Times New Roman" panose="02020603050405020304" pitchFamily="18" charset="0"/>
+                <a:cs typeface="Times New Roman" panose="02020603050405020304" pitchFamily="18" charset="0"/>
+              </a:rPr>
+              <a:t> </a:t>
+            </a:r>
+            <a:r>
+              <a:rPr lang="en-US" altLang="zh-TW" sz="1400" dirty="0" smtClean="0">
+                <a:latin typeface="Times New Roman" panose="02020603050405020304" pitchFamily="18" charset="0"/>
+                <a:cs typeface="Times New Roman" panose="02020603050405020304" pitchFamily="18" charset="0"/>
+              </a:rPr>
+              <a:t>Bash Script</a:t>
+            </a:r>
+            <a:r>
+              <a:rPr lang="zh-TW" altLang="en-US" sz="1400" dirty="0" smtClean="0">
+                <a:latin typeface="Times New Roman" panose="02020603050405020304" pitchFamily="18" charset="0"/>
+                <a:cs typeface="Times New Roman" panose="02020603050405020304" pitchFamily="18" charset="0"/>
+              </a:rPr>
+              <a:t> 做長時間壓力測試</a:t>
+            </a:r>
+            <a:endParaRPr lang="en-US" altLang="zh-TW" sz="1400" dirty="0">
+              <a:latin typeface="Times New Roman" panose="02020603050405020304" pitchFamily="18" charset="0"/>
+              <a:cs typeface="Times New Roman" panose="02020603050405020304" pitchFamily="18" charset="0"/>
+            </a:endParaRPr>
+          </a:p>
+          <a:p>
+            <a:pPr marL="742950" lvl="2" indent="-342900" eaLnBrk="1" hangingPunct="1">
+              <a:buFont typeface="Arial" charset="0"/>
+              <a:buChar char="•"/>
+              <a:defRPr/>
+            </a:pPr>
+            <a:r>
+              <a:rPr lang="zh-TW" altLang="en-US" sz="1400" dirty="0">
+                <a:latin typeface="Times New Roman" panose="02020603050405020304" pitchFamily="18" charset="0"/>
+                <a:cs typeface="Times New Roman" panose="02020603050405020304" pitchFamily="18" charset="0"/>
+              </a:rPr>
+              <a:t>自動</a:t>
+            </a:r>
+            <a:r>
+              <a:rPr lang="zh-TW" altLang="en-US" sz="1400" dirty="0" smtClean="0">
+                <a:latin typeface="Times New Roman" panose="02020603050405020304" pitchFamily="18" charset="0"/>
+                <a:cs typeface="Times New Roman" panose="02020603050405020304" pitchFamily="18" charset="0"/>
+              </a:rPr>
+              <a:t>產生及備份 </a:t>
+            </a:r>
+            <a:r>
+              <a:rPr lang="en-US" altLang="zh-TW" sz="1400" dirty="0" smtClean="0">
+                <a:latin typeface="Times New Roman" panose="02020603050405020304" pitchFamily="18" charset="0"/>
+                <a:cs typeface="Times New Roman" panose="02020603050405020304" pitchFamily="18" charset="0"/>
+              </a:rPr>
+              <a:t>Log</a:t>
+            </a:r>
+            <a:r>
+              <a:rPr lang="zh-TW" altLang="en-US" sz="1400" dirty="0" smtClean="0">
+                <a:latin typeface="Times New Roman" panose="02020603050405020304" pitchFamily="18" charset="0"/>
+                <a:cs typeface="Times New Roman" panose="02020603050405020304" pitchFamily="18" charset="0"/>
+              </a:rPr>
+              <a:t> 檔案</a:t>
+            </a:r>
+            <a:endParaRPr lang="en-US" altLang="zh-TW" sz="1400" dirty="0">
+              <a:latin typeface="Times New Roman" panose="02020603050405020304" pitchFamily="18" charset="0"/>
+              <a:cs typeface="Times New Roman" panose="02020603050405020304" pitchFamily="18" charset="0"/>
+            </a:endParaRPr>
+          </a:p>
+          <a:p>
+            <a:pPr marL="342900" lvl="1" indent="-342900" eaLnBrk="1" hangingPunct="1">
+              <a:buFont typeface="Arial" charset="0"/>
+              <a:buChar char="•"/>
+              <a:defRPr/>
+            </a:pPr>
+            <a:endParaRPr lang="en-US" altLang="zh-TW" sz="1800" dirty="0">
+              <a:latin typeface="Times New Roman" panose="02020603050405020304" pitchFamily="18" charset="0"/>
+              <a:cs typeface="Times New Roman" panose="02020603050405020304" pitchFamily="18" charset="0"/>
+            </a:endParaRPr>
           </a:p>
         </p:txBody>
       </p:sp>
@@ -16358,6 +18015,92 @@
                                           <p:spTgt spid="15362">
                                             <p:txEl>
                                               <p:pRg st="0" end="0"/>
+                                            </p:txEl>
+                                          </p:spTgt>
+                                        </p:tgtEl>
+                                      </p:cBhvr>
+                                    </p:animEffect>
+                                  </p:childTnLst>
+                                </p:cTn>
+                              </p:par>
+                              <p:par>
+                                <p:cTn id="12" presetID="10" presetClass="entr" presetSubtype="0" fill="hold" grpId="0" nodeType="withEffect">
+                                  <p:stCondLst>
+                                    <p:cond delay="0"/>
+                                  </p:stCondLst>
+                                  <p:childTnLst>
+                                    <p:set>
+                                      <p:cBhvr>
+                                        <p:cTn id="13" dur="1" fill="hold">
+                                          <p:stCondLst>
+                                            <p:cond delay="0"/>
+                                          </p:stCondLst>
+                                        </p:cTn>
+                                        <p:tgtEl>
+                                          <p:spTgt spid="15362">
+                                            <p:txEl>
+                                              <p:pRg st="1" end="1"/>
+                                            </p:txEl>
+                                          </p:spTgt>
+                                        </p:tgtEl>
+                                        <p:attrNameLst>
+                                          <p:attrName>style.visibility</p:attrName>
+                                        </p:attrNameLst>
+                                      </p:cBhvr>
+                                      <p:to>
+                                        <p:strVal val="visible"/>
+                                      </p:to>
+                                    </p:set>
+                                    <p:animEffect transition="in" filter="fade">
+                                      <p:cBhvr>
+                                        <p:cTn id="14" dur="250"/>
+                                        <p:tgtEl>
+                                          <p:spTgt spid="15362">
+                                            <p:txEl>
+                                              <p:pRg st="1" end="1"/>
+                                            </p:txEl>
+                                          </p:spTgt>
+                                        </p:tgtEl>
+                                      </p:cBhvr>
+                                    </p:animEffect>
+                                  </p:childTnLst>
+                                </p:cTn>
+                              </p:par>
+                              <p:par>
+                                <p:cTn id="15" presetID="10" presetClass="entr" presetSubtype="0" fill="hold" grpId="0" nodeType="withEffect">
+                                  <p:stCondLst>
+                                    <p:cond delay="0"/>
+                                  </p:stCondLst>
+                                  <p:childTnLst>
+                                    <p:set>
+                                      <p:cBhvr>
+                                        <p:cTn id="16" dur="1" fill="hold">
+                                          <p:stCondLst>
+                                            <p:cond delay="0"/>
+                                          </p:stCondLst>
+                                        </p:cTn>
+                                        <p:tgtEl>
+                                          <p:spTgt spid="15362">
+                                            <p:txEl>
+                                              <p:pRg st="2" end="2"/>
+                                            </p:txEl>
+                                          </p:spTgt>
+                                        </p:tgtEl>
+                                        <p:attrNameLst>
+                                          <p:attrName>style.visibility</p:attrName>
+                                        </p:attrNameLst>
+                                      </p:cBhvr>
+                                      <p:to>
+                                        <p:strVal val="visible"/>
+                                      </p:to>
+                                    </p:set>
+                                    <p:animEffect transition="in" filter="fade">
+                                      <p:cBhvr>
+                                        <p:cTn id="17" dur="250"/>
+                                        <p:tgtEl>
+                                          <p:spTgt spid="15362">
+                                            <p:txEl>
+                                              <p:pRg st="2" end="2"/>
                                             </p:txEl>
                                           </p:spTgt>
                                         </p:tgtEl>
@@ -16711,7 +18454,7 @@
                                     </p:set>
                                     <p:animEffect transition="in" filter="fade">
                                       <p:cBhvr>
-                                        <p:cTn id="15" dur="500"/>
+                                        <p:cTn id="15" dur="250"/>
                                         <p:tgtEl>
                                           <p:spTgt spid="4099"/>
                                         </p:tgtEl>
@@ -17973,7 +19716,7 @@
                                     </p:set>
                                     <p:animEffect transition="in" filter="fade">
                                       <p:cBhvr>
-                                        <p:cTn id="38" dur="500"/>
+                                        <p:cTn id="38" dur="250"/>
                                         <p:tgtEl>
                                           <p:spTgt spid="4"/>
                                         </p:tgtEl>
@@ -21120,7 +22863,7 @@
                                     </p:set>
                                     <p:animEffect transition="in" filter="fade">
                                       <p:cBhvr>
-                                        <p:cTn id="26" dur="500"/>
+                                        <p:cTn id="26" dur="250"/>
                                         <p:tgtEl>
                                           <p:spTgt spid="5"/>
                                         </p:tgtEl>
@@ -21896,24 +23639,15 @@
                                   </p:childTnLst>
                                 </p:cTn>
                               </p:par>
-                            </p:childTnLst>
-                          </p:cTn>
-                        </p:par>
-                        <p:par>
-                          <p:cTn id="8" fill="hold">
-                            <p:stCondLst>
-                              <p:cond delay="250"/>
-                            </p:stCondLst>
-                            <p:childTnLst>
                               <p:par>
-                                <p:cTn id="9" presetID="10" presetClass="entr" presetSubtype="0" fill="hold" grpId="0" nodeType="afterEffect">
+                                <p:cTn id="8" presetID="10" presetClass="entr" presetSubtype="0" fill="hold" grpId="0" nodeType="withEffect">
                                   <p:stCondLst>
                                     <p:cond delay="0"/>
                                   </p:stCondLst>
                                   <p:childTnLst>
                                     <p:set>
                                       <p:cBhvr>
-                                        <p:cTn id="10" dur="1" fill="hold">
+                                        <p:cTn id="9" dur="1" fill="hold">
                                           <p:stCondLst>
                                             <p:cond delay="0"/>
                                           </p:stCondLst>
@@ -21935,7 +23669,7 @@
                                     </p:set>
                                     <p:animEffect transition="in" filter="fade">
                                       <p:cBhvr>
-                                        <p:cTn id="11" dur="250"/>
+                                        <p:cTn id="10" dur="250"/>
                                         <p:tgtEl>
                                           <p:spTgt spid="15362">
                                             <p:txEl>
@@ -21948,32 +23682,57 @@
                                   </p:childTnLst>
                                 </p:cTn>
                               </p:par>
-                            </p:childTnLst>
-                          </p:cTn>
-                        </p:par>
-                      </p:childTnLst>
-                    </p:cTn>
-                  </p:par>
-                  <p:par>
-                    <p:cTn id="12" fill="hold">
-                      <p:stCondLst>
-                        <p:cond delay="indefinite"/>
-                      </p:stCondLst>
-                      <p:childTnLst>
-                        <p:par>
-                          <p:cTn id="13" fill="hold">
-                            <p:stCondLst>
-                              <p:cond delay="0"/>
-                            </p:stCondLst>
-                            <p:childTnLst>
                               <p:par>
-                                <p:cTn id="14" presetID="10" presetClass="entr" presetSubtype="0" fill="hold" grpId="0" nodeType="clickEffect">
+                                <p:cTn id="11" presetID="10" presetClass="entr" presetSubtype="0" fill="hold" grpId="0" nodeType="withEffect">
                                   <p:stCondLst>
                                     <p:cond delay="0"/>
                                   </p:stCondLst>
                                   <p:childTnLst>
                                     <p:set>
                                       <p:cBhvr>
+                                        <p:cTn id="12" dur="1" fill="hold">
+                                          <p:stCondLst>
+                                            <p:cond delay="0"/>
+                                          </p:stCondLst>
+                                        </p:cTn>
+                                        <p:tgtEl>
+                                          <p:spTgt spid="15362">
+                                            <p:txEl>
+                                              <p:pRg st="1" end="1"/>
+                                            </p:txEl>
+                                          </p:spTgt>
+                                        </p:tgtEl>
+                                        <p:attrNameLst>
+                                          <p:attrName>style.visibility</p:attrName>
+                                        </p:attrNameLst>
+                                      </p:cBhvr>
+                                      <p:to>
+                                        <p:strVal val="visible"/>
+                                      </p:to>
+                                    </p:set>
+                                    <p:animEffect transition="in" filter="fade">
+                                      <p:cBhvr>
+                                        <p:cTn id="13" dur="250"/>
+                                        <p:tgtEl>
+                                          <p:spTgt spid="15362">
+                                            <p:txEl>
+                                              <p:pRg st="1" end="1"/>
+                                            </p:txEl>
+                                          </p:spTgt>
+                                        </p:tgtEl>
+                                      </p:cBhvr>
+                                    </p:animEffect>
+                                  </p:childTnLst>
+                                </p:cTn>
+                              </p:par>
+                              <p:par>
+                                <p:cTn id="14" presetID="10" presetClass="entr" presetSubtype="0" fill="hold" grpId="0" nodeType="withEffect">
+                                  <p:stCondLst>
+                                    <p:cond delay="0"/>
+                                  </p:stCondLst>
+                                  <p:childTnLst>
+                                    <p:set>
+                                      <p:cBhvr>
                                         <p:cTn id="15" dur="1" fill="hold">
                                           <p:stCondLst>
                                             <p:cond delay="0"/>
@@ -21982,7 +23741,7 @@
                                         <p:tgtEl>
                                           <p:spTgt spid="15362">
                                             <p:txEl>
-                                              <p:pRg st="1" end="1"/>
+                                              <p:pRg st="2" end="2"/>
                                             </p:txEl>
                                           </p:spTgt>
                                         </p:tgtEl>
@@ -22000,7 +23759,7 @@
                                         <p:tgtEl>
                                           <p:spTgt spid="15362">
                                             <p:txEl>
-                                              <p:pRg st="1" end="1"/>
+                                              <p:pRg st="2" end="2"/>
                                             </p:txEl>
                                           </p:spTgt>
                                         </p:tgtEl>
@@ -22009,24 +23768,15 @@
                                   </p:childTnLst>
                                 </p:cTn>
                               </p:par>
-                            </p:childTnLst>
-                          </p:cTn>
-                        </p:par>
-                        <p:par>
-                          <p:cTn id="17" fill="hold">
-                            <p:stCondLst>
-                              <p:cond delay="250"/>
-                            </p:stCondLst>
-                            <p:childTnLst>
                               <p:par>
-                                <p:cTn id="18" presetID="10" presetClass="entr" presetSubtype="0" fill="hold" grpId="0" nodeType="afterEffect">
+                                <p:cTn id="17" presetID="10" presetClass="entr" presetSubtype="0" fill="hold" grpId="0" nodeType="withEffect">
                                   <p:stCondLst>
                                     <p:cond delay="0"/>
                                   </p:stCondLst>
                                   <p:childTnLst>
                                     <p:set>
                                       <p:cBhvr>
-                                        <p:cTn id="19" dur="1" fill="hold">
+                                        <p:cTn id="18" dur="1" fill="hold">
                                           <p:stCondLst>
                                             <p:cond delay="0"/>
                                           </p:stCondLst>
@@ -22034,7 +23784,7 @@
                                         <p:tgtEl>
                                           <p:spTgt spid="15362">
                                             <p:txEl>
-                                              <p:pRg st="2" end="2"/>
+                                              <p:pRg st="3" end="3"/>
                                             </p:txEl>
                                           </p:spTgt>
                                         </p:tgtEl>
@@ -22048,11 +23798,11 @@
                                     </p:set>
                                     <p:animEffect transition="in" filter="fade">
                                       <p:cBhvr>
-                                        <p:cTn id="20" dur="250"/>
+                                        <p:cTn id="19" dur="250"/>
                                         <p:tgtEl>
                                           <p:spTgt spid="15362">
                                             <p:txEl>
-                                              <p:pRg st="2" end="2"/>
+                                              <p:pRg st="3" end="3"/>
                                             </p:txEl>
                                           </p:spTgt>
                                         </p:tgtEl>
@@ -22061,24 +23811,15 @@
                                   </p:childTnLst>
                                 </p:cTn>
                               </p:par>
-                            </p:childTnLst>
-                          </p:cTn>
-                        </p:par>
-                        <p:par>
-                          <p:cTn id="21" fill="hold">
-                            <p:stCondLst>
-                              <p:cond delay="500"/>
-                            </p:stCondLst>
-                            <p:childTnLst>
                               <p:par>
-                                <p:cTn id="22" presetID="10" presetClass="entr" presetSubtype="0" fill="hold" grpId="0" nodeType="afterEffect">
+                                <p:cTn id="20" presetID="10" presetClass="entr" presetSubtype="0" fill="hold" grpId="0" nodeType="withEffect">
                                   <p:stCondLst>
                                     <p:cond delay="0"/>
                                   </p:stCondLst>
                                   <p:childTnLst>
                                     <p:set>
                                       <p:cBhvr>
-                                        <p:cTn id="23" dur="1" fill="hold">
+                                        <p:cTn id="21" dur="1" fill="hold">
                                           <p:stCondLst>
                                             <p:cond delay="0"/>
                                           </p:stCondLst>
@@ -22086,7 +23827,7 @@
                                         <p:tgtEl>
                                           <p:spTgt spid="15362">
                                             <p:txEl>
-                                              <p:pRg st="3" end="3"/>
+                                              <p:pRg st="4" end="4"/>
                                             </p:txEl>
                                           </p:spTgt>
                                         </p:tgtEl>
@@ -22100,11 +23841,11 @@
                                     </p:set>
                                     <p:animEffect transition="in" filter="fade">
                                       <p:cBhvr>
-                                        <p:cTn id="24" dur="250"/>
+                                        <p:cTn id="22" dur="250"/>
                                         <p:tgtEl>
                                           <p:spTgt spid="15362">
                                             <p:txEl>
-                                              <p:pRg st="3" end="3"/>
+                                              <p:pRg st="4" end="4"/>
                                             </p:txEl>
                                           </p:spTgt>
                                         </p:tgtEl>
@@ -22113,23 +23854,57 @@
                                   </p:childTnLst>
                                 </p:cTn>
                               </p:par>
-                            </p:childTnLst>
-                          </p:cTn>
-                        </p:par>
-                        <p:par>
-                          <p:cTn id="25" fill="hold">
-                            <p:stCondLst>
-                              <p:cond delay="750"/>
-                            </p:stCondLst>
-                            <p:childTnLst>
                               <p:par>
-                                <p:cTn id="26" presetID="10" presetClass="entr" presetSubtype="0" fill="hold" grpId="0" nodeType="afterEffect">
+                                <p:cTn id="23" presetID="10" presetClass="entr" presetSubtype="0" fill="hold" grpId="0" nodeType="withEffect">
                                   <p:stCondLst>
                                     <p:cond delay="0"/>
                                   </p:stCondLst>
                                   <p:childTnLst>
                                     <p:set>
                                       <p:cBhvr>
+                                        <p:cTn id="24" dur="1" fill="hold">
+                                          <p:stCondLst>
+                                            <p:cond delay="0"/>
+                                          </p:stCondLst>
+                                        </p:cTn>
+                                        <p:tgtEl>
+                                          <p:spTgt spid="15362">
+                                            <p:txEl>
+                                              <p:pRg st="5" end="5"/>
+                                            </p:txEl>
+                                          </p:spTgt>
+                                        </p:tgtEl>
+                                        <p:attrNameLst>
+                                          <p:attrName>style.visibility</p:attrName>
+                                        </p:attrNameLst>
+                                      </p:cBhvr>
+                                      <p:to>
+                                        <p:strVal val="visible"/>
+                                      </p:to>
+                                    </p:set>
+                                    <p:animEffect transition="in" filter="fade">
+                                      <p:cBhvr>
+                                        <p:cTn id="25" dur="250"/>
+                                        <p:tgtEl>
+                                          <p:spTgt spid="15362">
+                                            <p:txEl>
+                                              <p:pRg st="5" end="5"/>
+                                            </p:txEl>
+                                          </p:spTgt>
+                                        </p:tgtEl>
+                                      </p:cBhvr>
+                                    </p:animEffect>
+                                  </p:childTnLst>
+                                </p:cTn>
+                              </p:par>
+                              <p:par>
+                                <p:cTn id="26" presetID="10" presetClass="entr" presetSubtype="0" fill="hold" grpId="0" nodeType="withEffect">
+                                  <p:stCondLst>
+                                    <p:cond delay="0"/>
+                                  </p:stCondLst>
+                                  <p:childTnLst>
+                                    <p:set>
+                                      <p:cBhvr>
                                         <p:cTn id="27" dur="1" fill="hold">
                                           <p:stCondLst>
                                             <p:cond delay="0"/>
@@ -22138,7 +23913,7 @@
                                         <p:tgtEl>
                                           <p:spTgt spid="15362">
                                             <p:txEl>
-                                              <p:pRg st="4" end="4"/>
+                                              <p:pRg st="6" end="6"/>
                                             </p:txEl>
                                           </p:spTgt>
                                         </p:tgtEl>
@@ -22156,7 +23931,7 @@
                                         <p:tgtEl>
                                           <p:spTgt spid="15362">
                                             <p:txEl>
-                                              <p:pRg st="4" end="4"/>
+                                              <p:pRg st="6" end="6"/>
                                             </p:txEl>
                                           </p:spTgt>
                                         </p:tgtEl>
@@ -22165,24 +23940,15 @@
                                   </p:childTnLst>
                                 </p:cTn>
                               </p:par>
-                            </p:childTnLst>
-                          </p:cTn>
-                        </p:par>
-                        <p:par>
-                          <p:cTn id="29" fill="hold">
-                            <p:stCondLst>
-                              <p:cond delay="1000"/>
-                            </p:stCondLst>
-                            <p:childTnLst>
                               <p:par>
-                                <p:cTn id="30" presetID="10" presetClass="entr" presetSubtype="0" fill="hold" grpId="0" nodeType="afterEffect">
+                                <p:cTn id="29" presetID="10" presetClass="entr" presetSubtype="0" fill="hold" grpId="0" nodeType="withEffect">
                                   <p:stCondLst>
                                     <p:cond delay="0"/>
                                   </p:stCondLst>
                                   <p:childTnLst>
                                     <p:set>
                                       <p:cBhvr>
-                                        <p:cTn id="31" dur="1" fill="hold">
+                                        <p:cTn id="30" dur="1" fill="hold">
                                           <p:stCondLst>
                                             <p:cond delay="0"/>
                                           </p:stCondLst>
@@ -22190,7 +23956,7 @@
                                         <p:tgtEl>
                                           <p:spTgt spid="15362">
                                             <p:txEl>
-                                              <p:pRg st="5" end="5"/>
+                                              <p:pRg st="7" end="7"/>
                                             </p:txEl>
                                           </p:spTgt>
                                         </p:tgtEl>
@@ -22204,11 +23970,11 @@
                                     </p:set>
                                     <p:animEffect transition="in" filter="fade">
                                       <p:cBhvr>
-                                        <p:cTn id="32" dur="250"/>
+                                        <p:cTn id="31" dur="250"/>
                                         <p:tgtEl>
                                           <p:spTgt spid="15362">
                                             <p:txEl>
-                                              <p:pRg st="5" end="5"/>
+                                              <p:pRg st="7" end="7"/>
                                             </p:txEl>
                                           </p:spTgt>
                                         </p:tgtEl>
@@ -22217,24 +23983,15 @@
                                   </p:childTnLst>
                                 </p:cTn>
                               </p:par>
-                            </p:childTnLst>
-                          </p:cTn>
-                        </p:par>
-                        <p:par>
-                          <p:cTn id="33" fill="hold">
-                            <p:stCondLst>
-                              <p:cond delay="1250"/>
-                            </p:stCondLst>
-                            <p:childTnLst>
                               <p:par>
-                                <p:cTn id="34" presetID="10" presetClass="entr" presetSubtype="0" fill="hold" grpId="0" nodeType="afterEffect">
+                                <p:cTn id="32" presetID="10" presetClass="entr" presetSubtype="0" fill="hold" grpId="0" nodeType="withEffect">
                                   <p:stCondLst>
                                     <p:cond delay="0"/>
                                   </p:stCondLst>
                                   <p:childTnLst>
                                     <p:set>
                                       <p:cBhvr>
-                                        <p:cTn id="35" dur="1" fill="hold">
+                                        <p:cTn id="33" dur="1" fill="hold">
                                           <p:stCondLst>
                                             <p:cond delay="0"/>
                                           </p:stCondLst>
@@ -22242,7 +23999,7 @@
                                         <p:tgtEl>
                                           <p:spTgt spid="15362">
                                             <p:txEl>
-                                              <p:pRg st="6" end="6"/>
+                                              <p:pRg st="8" end="8"/>
                                             </p:txEl>
                                           </p:spTgt>
                                         </p:tgtEl>
@@ -22256,11 +24013,11 @@
                                     </p:set>
                                     <p:animEffect transition="in" filter="fade">
                                       <p:cBhvr>
-                                        <p:cTn id="36" dur="250"/>
+                                        <p:cTn id="34" dur="250"/>
                                         <p:tgtEl>
                                           <p:spTgt spid="15362">
                                             <p:txEl>
-                                              <p:pRg st="6" end="6"/>
+                                              <p:pRg st="8" end="8"/>
                                             </p:txEl>
                                           </p:spTgt>
                                         </p:tgtEl>
@@ -22269,23 +24026,57 @@
                                   </p:childTnLst>
                                 </p:cTn>
                               </p:par>
-                            </p:childTnLst>
-                          </p:cTn>
-                        </p:par>
-                        <p:par>
-                          <p:cTn id="37" fill="hold">
-                            <p:stCondLst>
-                              <p:cond delay="1500"/>
-                            </p:stCondLst>
-                            <p:childTnLst>
                               <p:par>
-                                <p:cTn id="38" presetID="10" presetClass="entr" presetSubtype="0" fill="hold" grpId="0" nodeType="afterEffect">
+                                <p:cTn id="35" presetID="10" presetClass="entr" presetSubtype="0" fill="hold" grpId="0" nodeType="withEffect">
                                   <p:stCondLst>
                                     <p:cond delay="0"/>
                                   </p:stCondLst>
                                   <p:childTnLst>
                                     <p:set>
                                       <p:cBhvr>
+                                        <p:cTn id="36" dur="1" fill="hold">
+                                          <p:stCondLst>
+                                            <p:cond delay="0"/>
+                                          </p:stCondLst>
+                                        </p:cTn>
+                                        <p:tgtEl>
+                                          <p:spTgt spid="15362">
+                                            <p:txEl>
+                                              <p:pRg st="9" end="9"/>
+                                            </p:txEl>
+                                          </p:spTgt>
+                                        </p:tgtEl>
+                                        <p:attrNameLst>
+                                          <p:attrName>style.visibility</p:attrName>
+                                        </p:attrNameLst>
+                                      </p:cBhvr>
+                                      <p:to>
+                                        <p:strVal val="visible"/>
+                                      </p:to>
+                                    </p:set>
+                                    <p:animEffect transition="in" filter="fade">
+                                      <p:cBhvr>
+                                        <p:cTn id="37" dur="250"/>
+                                        <p:tgtEl>
+                                          <p:spTgt spid="15362">
+                                            <p:txEl>
+                                              <p:pRg st="9" end="9"/>
+                                            </p:txEl>
+                                          </p:spTgt>
+                                        </p:tgtEl>
+                                      </p:cBhvr>
+                                    </p:animEffect>
+                                  </p:childTnLst>
+                                </p:cTn>
+                              </p:par>
+                              <p:par>
+                                <p:cTn id="38" presetID="10" presetClass="entr" presetSubtype="0" fill="hold" grpId="0" nodeType="withEffect">
+                                  <p:stCondLst>
+                                    <p:cond delay="0"/>
+                                  </p:stCondLst>
+                                  <p:childTnLst>
+                                    <p:set>
+                                      <p:cBhvr>
                                         <p:cTn id="39" dur="1" fill="hold">
                                           <p:stCondLst>
                                             <p:cond delay="0"/>
@@ -22294,7 +24085,7 @@
                                         <p:tgtEl>
                                           <p:spTgt spid="15362">
                                             <p:txEl>
-                                              <p:pRg st="7" end="7"/>
+                                              <p:pRg st="10" end="10"/>
                                             </p:txEl>
                                           </p:spTgt>
                                         </p:tgtEl>
@@ -22309,162 +24100,6 @@
                                     <p:animEffect transition="in" filter="fade">
                                       <p:cBhvr>
                                         <p:cTn id="40" dur="250"/>
-                                        <p:tgtEl>
-                                          <p:spTgt spid="15362">
-                                            <p:txEl>
-                                              <p:pRg st="7" end="7"/>
-                                            </p:txEl>
-                                          </p:spTgt>
-                                        </p:tgtEl>
-                                      </p:cBhvr>
-                                    </p:animEffect>
-                                  </p:childTnLst>
-                                </p:cTn>
-                              </p:par>
-                            </p:childTnLst>
-                          </p:cTn>
-                        </p:par>
-                        <p:par>
-                          <p:cTn id="41" fill="hold">
-                            <p:stCondLst>
-                              <p:cond delay="1750"/>
-                            </p:stCondLst>
-                            <p:childTnLst>
-                              <p:par>
-                                <p:cTn id="42" presetID="10" presetClass="entr" presetSubtype="0" fill="hold" grpId="0" nodeType="afterEffect">
-                                  <p:stCondLst>
-                                    <p:cond delay="0"/>
-                                  </p:stCondLst>
-                                  <p:childTnLst>
-                                    <p:set>
-                                      <p:cBhvr>
-                                        <p:cTn id="43" dur="1" fill="hold">
-                                          <p:stCondLst>
-                                            <p:cond delay="0"/>
-                                          </p:stCondLst>
-                                        </p:cTn>
-                                        <p:tgtEl>
-                                          <p:spTgt spid="15362">
-                                            <p:txEl>
-                                              <p:pRg st="8" end="8"/>
-                                            </p:txEl>
-                                          </p:spTgt>
-                                        </p:tgtEl>
-                                        <p:attrNameLst>
-                                          <p:attrName>style.visibility</p:attrName>
-                                        </p:attrNameLst>
-                                      </p:cBhvr>
-                                      <p:to>
-                                        <p:strVal val="visible"/>
-                                      </p:to>
-                                    </p:set>
-                                    <p:animEffect transition="in" filter="fade">
-                                      <p:cBhvr>
-                                        <p:cTn id="44" dur="250"/>
-                                        <p:tgtEl>
-                                          <p:spTgt spid="15362">
-                                            <p:txEl>
-                                              <p:pRg st="8" end="8"/>
-                                            </p:txEl>
-                                          </p:spTgt>
-                                        </p:tgtEl>
-                                      </p:cBhvr>
-                                    </p:animEffect>
-                                  </p:childTnLst>
-                                </p:cTn>
-                              </p:par>
-                            </p:childTnLst>
-                          </p:cTn>
-                        </p:par>
-                        <p:par>
-                          <p:cTn id="45" fill="hold">
-                            <p:stCondLst>
-                              <p:cond delay="2000"/>
-                            </p:stCondLst>
-                            <p:childTnLst>
-                              <p:par>
-                                <p:cTn id="46" presetID="10" presetClass="entr" presetSubtype="0" fill="hold" grpId="0" nodeType="afterEffect">
-                                  <p:stCondLst>
-                                    <p:cond delay="0"/>
-                                  </p:stCondLst>
-                                  <p:childTnLst>
-                                    <p:set>
-                                      <p:cBhvr>
-                                        <p:cTn id="47" dur="1" fill="hold">
-                                          <p:stCondLst>
-                                            <p:cond delay="0"/>
-                                          </p:stCondLst>
-                                        </p:cTn>
-                                        <p:tgtEl>
-                                          <p:spTgt spid="15362">
-                                            <p:txEl>
-                                              <p:pRg st="9" end="9"/>
-                                            </p:txEl>
-                                          </p:spTgt>
-                                        </p:tgtEl>
-                                        <p:attrNameLst>
-                                          <p:attrName>style.visibility</p:attrName>
-                                        </p:attrNameLst>
-                                      </p:cBhvr>
-                                      <p:to>
-                                        <p:strVal val="visible"/>
-                                      </p:to>
-                                    </p:set>
-                                    <p:animEffect transition="in" filter="fade">
-                                      <p:cBhvr>
-                                        <p:cTn id="48" dur="250"/>
-                                        <p:tgtEl>
-                                          <p:spTgt spid="15362">
-                                            <p:txEl>
-                                              <p:pRg st="9" end="9"/>
-                                            </p:txEl>
-                                          </p:spTgt>
-                                        </p:tgtEl>
-                                      </p:cBhvr>
-                                    </p:animEffect>
-                                  </p:childTnLst>
-                                </p:cTn>
-                              </p:par>
-                            </p:childTnLst>
-                          </p:cTn>
-                        </p:par>
-                        <p:par>
-                          <p:cTn id="49" fill="hold">
-                            <p:stCondLst>
-                              <p:cond delay="2250"/>
-                            </p:stCondLst>
-                            <p:childTnLst>
-                              <p:par>
-                                <p:cTn id="50" presetID="10" presetClass="entr" presetSubtype="0" fill="hold" grpId="0" nodeType="afterEffect">
-                                  <p:stCondLst>
-                                    <p:cond delay="0"/>
-                                  </p:stCondLst>
-                                  <p:childTnLst>
-                                    <p:set>
-                                      <p:cBhvr>
-                                        <p:cTn id="51" dur="1" fill="hold">
-                                          <p:stCondLst>
-                                            <p:cond delay="0"/>
-                                          </p:stCondLst>
-                                        </p:cTn>
-                                        <p:tgtEl>
-                                          <p:spTgt spid="15362">
-                                            <p:txEl>
-                                              <p:pRg st="10" end="10"/>
-                                            </p:txEl>
-                                          </p:spTgt>
-                                        </p:tgtEl>
-                                        <p:attrNameLst>
-                                          <p:attrName>style.visibility</p:attrName>
-                                        </p:attrNameLst>
-                                      </p:cBhvr>
-                                      <p:to>
-                                        <p:strVal val="visible"/>
-                                      </p:to>
-                                    </p:set>
-                                    <p:animEffect transition="in" filter="fade">
-                                      <p:cBhvr>
-                                        <p:cTn id="52" dur="250"/>
                                         <p:tgtEl>
                                           <p:spTgt spid="15362">
                                             <p:txEl>

</xml_diff>